<commit_message>
tested online accuracy 3M electrodes with gel
</commit_message>
<xml_diff>
--- a/docs/pipeline.pptx
+++ b/docs/pipeline.pptx
@@ -6,6 +6,13 @@
   </p:sldMasterIdLst>
   <p:sldIdLst>
     <p:sldId id="256" r:id="rId2"/>
+    <p:sldId id="261" r:id="rId3"/>
+    <p:sldId id="260" r:id="rId4"/>
+    <p:sldId id="259" r:id="rId5"/>
+    <p:sldId id="257" r:id="rId6"/>
+    <p:sldId id="262" r:id="rId7"/>
+    <p:sldId id="258" r:id="rId8"/>
+    <p:sldId id="263" r:id="rId9"/>
   </p:sldIdLst>
   <p:sldSz cx="12192000" cy="6858000"/>
   <p:notesSz cx="6858000" cy="9144000"/>
@@ -104,7 +111,236 @@
       </a:defRPr>
     </a:lvl9pPr>
   </p:defaultTextStyle>
+  <p:extLst>
+    <p:ext uri="{EFAFB233-063F-42B5-8137-9DF3F51BA10A}">
+      <p15:sldGuideLst xmlns:p15="http://schemas.microsoft.com/office/powerpoint/2012/main"/>
+    </p:ext>
+  </p:extLst>
 </p:presentation>
+</file>
+
+<file path=ppt/ink/ink1.xml><?xml version="1.0" encoding="utf-8"?>
+<inkml:ink xmlns:inkml="http://www.w3.org/2003/InkML">
+  <inkml:definitions>
+    <inkml:context xml:id="ctx0">
+      <inkml:inkSource xml:id="inkSrc0">
+        <inkml:traceFormat>
+          <inkml:channel name="X" type="integer" min="-2.14748E9" max="2.14748E9" units="cm"/>
+          <inkml:channel name="Y" type="integer" min="-2.14748E9" max="2.14748E9" units="cm"/>
+          <inkml:channel name="F" type="integer" max="32767" units="dev"/>
+        </inkml:traceFormat>
+        <inkml:channelProperties>
+          <inkml:channelProperty channel="X" name="resolution" value="1000" units="1/cm"/>
+          <inkml:channelProperty channel="Y" name="resolution" value="1000" units="1/cm"/>
+          <inkml:channelProperty channel="F" name="resolution" value="0" units="1/dev"/>
+        </inkml:channelProperties>
+      </inkml:inkSource>
+      <inkml:timestamp xml:id="ts0" timeString="2025-06-18T13:26:16.273"/>
+    </inkml:context>
+    <inkml:brush xml:id="br0">
+      <inkml:brushProperty name="width" value="0.035" units="cm"/>
+      <inkml:brushProperty name="height" value="0.035" units="cm"/>
+      <inkml:brushProperty name="color" value="#E71224"/>
+    </inkml:brush>
+  </inkml:definitions>
+  <inkml:trace contextRef="#ctx0" brushRef="#br0">108 1 24575,'2'9'0,"0"1"0,1 0 0,0 0 0,1-1 0,0 0 0,0 0 0,1 0 0,10 14 0,1 5 0,24 44 0,-14-27 0,-2 2 0,-1 0 0,19 64 0,-25-48 0,11 84 0,-21-67 0,-7 133 0,-3-86 0,15 111 0,-1 5 0,-10-217 0,9 46 0,0 19 0,-10 16 0,-2-56 0,3-1 0,13 98 0,-1-63 0,4 128 0,-15-163 0,9 58 0,0 44 0,-12 910 0,-11-920 0,1 4 0,8-105 0,-1 0 0,-2 0 0,-14 47 0,0 1 0,-19 64 0,25-108 0,13-42 0,-1 0 0,0 0 0,0 0 0,0 0 0,0 0 0,-1-1 0,1 1 0,-1-1 0,0 1 0,1-1 0,-1 0 0,0 0 0,0 0 0,0-1 0,-1 1 0,1-1 0,0 1 0,-1-1 0,1 0 0,-1 0 0,-3 0 0,-14 3 0,-1 0 0,-24 0 0,41-3 0,-166 0-1365,150-1-5461</inkml:trace>
+</inkml:ink>
+</file>
+
+<file path=ppt/ink/ink2.xml><?xml version="1.0" encoding="utf-8"?>
+<inkml:ink xmlns:inkml="http://www.w3.org/2003/InkML">
+  <inkml:definitions>
+    <inkml:context xml:id="ctx0">
+      <inkml:inkSource xml:id="inkSrc0">
+        <inkml:traceFormat>
+          <inkml:channel name="X" type="integer" min="-2.14748E9" max="2.14748E9" units="cm"/>
+          <inkml:channel name="Y" type="integer" min="-2.14748E9" max="2.14748E9" units="cm"/>
+          <inkml:channel name="F" type="integer" max="32767" units="dev"/>
+        </inkml:traceFormat>
+        <inkml:channelProperties>
+          <inkml:channelProperty channel="X" name="resolution" value="1000" units="1/cm"/>
+          <inkml:channelProperty channel="Y" name="resolution" value="1000" units="1/cm"/>
+          <inkml:channelProperty channel="F" name="resolution" value="0" units="1/dev"/>
+        </inkml:channelProperties>
+      </inkml:inkSource>
+      <inkml:timestamp xml:id="ts0" timeString="2025-06-18T13:26:20.522"/>
+    </inkml:context>
+    <inkml:brush xml:id="br0">
+      <inkml:brushProperty name="width" value="0.035" units="cm"/>
+      <inkml:brushProperty name="height" value="0.035" units="cm"/>
+      <inkml:brushProperty name="color" value="#E71224"/>
+    </inkml:brush>
+  </inkml:definitions>
+  <inkml:trace contextRef="#ctx0" brushRef="#br0">82 1 24575,'2'0'0,"-1"0"0,1 1 0,-1 0 0,1-1 0,-1 1 0,1 0 0,-1 0 0,0 0 0,1 0 0,-1 0 0,0 0 0,0 0 0,0 0 0,0 0 0,0 1 0,0-1 0,1 3 0,19 30 0,-14-21 0,9 12 0,-8-14 0,0 1 0,-1-1 0,0 1 0,-1 1 0,0-1 0,-1 1 0,0 0 0,-1 0 0,-1 0 0,0 1 0,2 26 0,-4 49 0,-4 0 0,-3 1 0,-19 89 0,17-136 0,3 0 0,0 72 0,-5 47 0,6-117 0,2 78 0,-1 11 0,-7-75 0,-1 13 0,10-55 0,-1 0 0,0 0 0,-1 0 0,0-1 0,-2 1 0,-10 26 0,13-40-59,-1 0 0,1-1-1,0 1 1,-1-1-1,1 0 1,-1 1 0,0-1-1,0 0 1,0-1 0,0 1-1,0 0 1,0-1 0,-1 0-1,1 0 1,0 0-1,-1 0 1,1 0 0,0-1-1,-1 1 1,1-1 0,-1 0-1,-6-1 1,-8 2-6767</inkml:trace>
+</inkml:ink>
+</file>
+
+<file path=ppt/ink/ink3.xml><?xml version="1.0" encoding="utf-8"?>
+<inkml:ink xmlns:inkml="http://www.w3.org/2003/InkML">
+  <inkml:definitions>
+    <inkml:context xml:id="ctx0">
+      <inkml:inkSource xml:id="inkSrc0">
+        <inkml:traceFormat>
+          <inkml:channel name="X" type="integer" min="-2.14748E9" max="2.14748E9" units="cm"/>
+          <inkml:channel name="Y" type="integer" min="-2.14748E9" max="2.14748E9" units="cm"/>
+          <inkml:channel name="F" type="integer" max="32767" units="dev"/>
+        </inkml:traceFormat>
+        <inkml:channelProperties>
+          <inkml:channelProperty channel="X" name="resolution" value="1000" units="1/cm"/>
+          <inkml:channelProperty channel="Y" name="resolution" value="1000" units="1/cm"/>
+          <inkml:channelProperty channel="F" name="resolution" value="0" units="1/dev"/>
+        </inkml:channelProperties>
+      </inkml:inkSource>
+      <inkml:timestamp xml:id="ts0" timeString="2025-06-18T13:26:23.974"/>
+    </inkml:context>
+    <inkml:brush xml:id="br0">
+      <inkml:brushProperty name="width" value="0.035" units="cm"/>
+      <inkml:brushProperty name="height" value="0.035" units="cm"/>
+      <inkml:brushProperty name="color" value="#E71224"/>
+    </inkml:brush>
+  </inkml:definitions>
+  <inkml:trace contextRef="#ctx0" brushRef="#br0">1 1 24575,'5'4'0,"0"1"0,0-1 0,1-1 0,0 1 0,-1-1 0,1 0 0,0 0 0,1-1 0,-1 1 0,0-2 0,1 1 0,8 1 0,9 0 0,1-2 0,25 0 0,8 0 0,-56-1 0,0 0 0,1 1 0,-1 0 0,0 0 0,1-1 0,-1 1 0,0 0 0,0 1 0,0-1 0,0 0 0,0 1 0,0-1 0,0 1 0,0 0 0,0-1 0,-1 1 0,1 0 0,-1 0 0,1 0 0,-1 0 0,0 0 0,0 1 0,0-1 0,0 0 0,0 0 0,-1 1 0,1-1 0,-1 0 0,1 1 0,-1-1 0,0 5 0,2 11 0,-2 0 0,0 1 0,-3 24 0,1-13 0,1-6 0,1 0 0,1-1 0,1 1 0,2 0 0,9 37 0,1-3 0,-2 2 0,5 86 0,-3 30 0,-5-82 0,-7 189 0,-4-136 0,2 1352 0,-11-1319 0,0-12 0,11 506 0,-1-649 0,-2-1 0,-1 0 0,-10 39 0,7-36 0,1-1 0,-3 43 0,-14 122 0,23-186 0,-2 1 0,1-1 0,-1 1 0,1-1 0,-2 0 0,1 1 0,0-1 0,-1 0 0,0-1 0,0 1 0,-1-1 0,1 1 0,-1-1 0,0 0 0,-6 5 0,-8 5 0,0-1 0,-30 17 0,31-20 0,9-7 7,0 1 0,0-1 0,-1-1 0,1 1 0,-1-2 0,-14 3 0,-12 2-1421,16-2-5412</inkml:trace>
+</inkml:ink>
+</file>
+
+<file path=ppt/ink/ink4.xml><?xml version="1.0" encoding="utf-8"?>
+<inkml:ink xmlns:inkml="http://www.w3.org/2003/InkML">
+  <inkml:definitions>
+    <inkml:context xml:id="ctx0">
+      <inkml:inkSource xml:id="inkSrc0">
+        <inkml:traceFormat>
+          <inkml:channel name="X" type="integer" min="-2.14748E9" max="2.14748E9" units="cm"/>
+          <inkml:channel name="Y" type="integer" min="-2.14748E9" max="2.14748E9" units="cm"/>
+          <inkml:channel name="F" type="integer" max="32767" units="dev"/>
+        </inkml:traceFormat>
+        <inkml:channelProperties>
+          <inkml:channelProperty channel="X" name="resolution" value="1000" units="1/cm"/>
+          <inkml:channelProperty channel="Y" name="resolution" value="1000" units="1/cm"/>
+          <inkml:channelProperty channel="F" name="resolution" value="0" units="1/dev"/>
+        </inkml:channelProperties>
+      </inkml:inkSource>
+      <inkml:timestamp xml:id="ts0" timeString="2025-06-18T13:26:27.319"/>
+    </inkml:context>
+    <inkml:brush xml:id="br0">
+      <inkml:brushProperty name="width" value="0.035" units="cm"/>
+      <inkml:brushProperty name="height" value="0.035" units="cm"/>
+      <inkml:brushProperty name="color" value="#E71224"/>
+    </inkml:brush>
+  </inkml:definitions>
+  <inkml:trace contextRef="#ctx0" brushRef="#br0">1 1 24575,'11'1'0,"0"1"0,1 0 0,-1 1 0,0 0 0,14 6 0,20 6 0,-18-9 0,-14-4 0,0 1 0,-1 1 0,19 7 0,-28-10 0,0 1 0,0-1 0,0 1 0,0 0 0,0 0 0,-1 0 0,1 0 0,-1 0 0,1 1 0,-1-1 0,0 1 0,0 0 0,0-1 0,0 1 0,-1 0 0,1 0 0,-1 0 0,2 5 0,8 38 0,-1 1 0,5 86 0,-11 96 0,-4-157 0,0-69 0,0 0 0,0 0 0,0 0 0,-1 1 0,1-1 0,-1 0 0,1 0 0,-1 0 0,0 0 0,-1 0 0,1 0 0,0 0 0,-1-1 0,-2 5 0,2-5 0,1-1 0,-1 0 0,1 0 0,-1 0 0,1-1 0,-1 1 0,0 0 0,1 0 0,-1-1 0,0 1 0,0-1 0,0 0 0,1 1 0,-1-1 0,0 0 0,0 0 0,0 0 0,1 0 0,-1-1 0,0 1 0,0 0 0,0-1 0,1 1 0,-1-1 0,0 1 0,-2-3 0,-35-13-110,22 9-47,0 0 0,0 0 0,-1 2 0,0 0 1,0 1-1,0 1 0,-21-1 0,20 4-6669</inkml:trace>
+</inkml:ink>
+</file>
+
+<file path=ppt/ink/ink5.xml><?xml version="1.0" encoding="utf-8"?>
+<inkml:ink xmlns:inkml="http://www.w3.org/2003/InkML">
+  <inkml:definitions>
+    <inkml:context xml:id="ctx0">
+      <inkml:inkSource xml:id="inkSrc0">
+        <inkml:traceFormat>
+          <inkml:channel name="X" type="integer" min="-2.14748E9" max="2.14748E9" units="cm"/>
+          <inkml:channel name="Y" type="integer" min="-2.14748E9" max="2.14748E9" units="cm"/>
+          <inkml:channel name="F" type="integer" max="32767" units="dev"/>
+        </inkml:traceFormat>
+        <inkml:channelProperties>
+          <inkml:channelProperty channel="X" name="resolution" value="1000" units="1/cm"/>
+          <inkml:channelProperty channel="Y" name="resolution" value="1000" units="1/cm"/>
+          <inkml:channelProperty channel="F" name="resolution" value="0" units="1/dev"/>
+        </inkml:channelProperties>
+      </inkml:inkSource>
+      <inkml:timestamp xml:id="ts0" timeString="2025-06-18T13:26:29.631"/>
+    </inkml:context>
+    <inkml:brush xml:id="br0">
+      <inkml:brushProperty name="width" value="0.035" units="cm"/>
+      <inkml:brushProperty name="height" value="0.035" units="cm"/>
+      <inkml:brushProperty name="color" value="#E71224"/>
+    </inkml:brush>
+  </inkml:definitions>
+  <inkml:trace contextRef="#ctx0" brushRef="#br0">22 0 24575,'9'1'0,"0"1"0,0 0 0,0 0 0,13 5 0,9 3 0,-3-5 0,-18-3 0,0 0 0,0 0 0,0 1 0,0 0 0,10 6 0,-18-8 0,1 1 0,0-1 0,-1 1 0,0 0 0,1 0 0,-1 0 0,0 0 0,0 1 0,0-1 0,0 1 0,0-1 0,-1 1 0,1 0 0,-1-1 0,0 1 0,1 0 0,-1 0 0,-1 0 0,1 0 0,0 0 0,0 5 0,1 37 0,-6 73 0,0-15 0,5-11 0,1 5 0,-18 162 0,13-205 0,3-42 0,0 0 0,-1 0 0,-1 0 0,1-1 0,-7 20 0,7-28 0,0-1 0,-1 1 0,0-1 0,1 1 0,-1-1 0,0 0 0,0 0 0,0 1 0,0-1 0,0-1 0,-1 1 0,1 0 0,-1 0 0,1-1 0,-1 0 0,1 1 0,-1-1 0,0 0 0,-4 1 0,-6 1 0,0-1 0,-1 0 0,-15 0 0,-16 3 0,9 1-1365,20-3-5461</inkml:trace>
+</inkml:ink>
+</file>
+
+<file path=ppt/ink/ink6.xml><?xml version="1.0" encoding="utf-8"?>
+<inkml:ink xmlns:inkml="http://www.w3.org/2003/InkML">
+  <inkml:definitions>
+    <inkml:context xml:id="ctx0">
+      <inkml:inkSource xml:id="inkSrc0">
+        <inkml:traceFormat>
+          <inkml:channel name="X" type="integer" min="-2.14748E9" max="2.14748E9" units="cm"/>
+          <inkml:channel name="Y" type="integer" min="-2.14748E9" max="2.14748E9" units="cm"/>
+          <inkml:channel name="F" type="integer" max="32767" units="dev"/>
+        </inkml:traceFormat>
+        <inkml:channelProperties>
+          <inkml:channelProperty channel="X" name="resolution" value="1000" units="1/cm"/>
+          <inkml:channelProperty channel="Y" name="resolution" value="1000" units="1/cm"/>
+          <inkml:channelProperty channel="F" name="resolution" value="0" units="1/dev"/>
+        </inkml:channelProperties>
+      </inkml:inkSource>
+      <inkml:timestamp xml:id="ts0" timeString="2025-06-18T13:26:37.285"/>
+    </inkml:context>
+    <inkml:brush xml:id="br0">
+      <inkml:brushProperty name="width" value="0.035" units="cm"/>
+      <inkml:brushProperty name="height" value="0.035" units="cm"/>
+      <inkml:brushProperty name="color" value="#E71224"/>
+    </inkml:brush>
+  </inkml:definitions>
+  <inkml:trace contextRef="#ctx0" brushRef="#br0">1 3 24575,'62'0'0,"-14"-2"0,1 3 0,-1 1 0,74 14 0,-119-14 0,0-1 0,0 0 0,-1 1 0,1-1 0,0 1 0,0 0 0,-1 0 0,1 0 0,-1 0 0,1 0 0,-1 1 0,0-1 0,0 1 0,0-1 0,0 1 0,-1 0 0,1 0 0,-1 0 0,1 0 0,-1 0 0,0 0 0,0 0 0,-1 0 0,1 0 0,-1 0 0,1 1 0,-1-1 0,0 5 0,0 13 0,0 1 0,-2-1 0,-4 26 0,3-28 0,-47 334 0,42-301 0,-4 21 0,-4 137 0,16 64 0,2 132 0,31 34 0,-30-405 0,21 139 0,-11-94 0,3 108 0,-17-64 0,0-46 0,15 147 0,-5-131 0,-4 0 0,-8 100 0,1-44 0,2-86 0,2-26 0,-2 1 0,-2-1 0,-12 72 0,9-83 0,-3 48 0,-1 8 0,4-49 0,3 1 0,2 59 0,-2 29 0,2-121 3,-1 0-1,1 0 0,-1 0 0,1 0 1,-1 0-1,0 0 0,0 0 1,0 0-1,0 0 0,0 0 1,-1 0-1,1 0 0,-1-1 1,1 1-1,-1 0 0,1-1 1,-1 0-1,0 1 0,0-1 0,0 0 1,1 0-1,-1 0 0,0 0 1,-1 0-1,-2 1 0,-6 1-96,-1 0-1,1-1 1,-21 2-1,7-1-952,5 0-5779</inkml:trace>
+</inkml:ink>
+</file>
+
+<file path=ppt/ink/ink7.xml><?xml version="1.0" encoding="utf-8"?>
+<inkml:ink xmlns:inkml="http://www.w3.org/2003/InkML">
+  <inkml:definitions>
+    <inkml:context xml:id="ctx0">
+      <inkml:inkSource xml:id="inkSrc0">
+        <inkml:traceFormat>
+          <inkml:channel name="X" type="integer" min="-2.14748E9" max="2.14748E9" units="cm"/>
+          <inkml:channel name="Y" type="integer" min="-2.14748E9" max="2.14748E9" units="cm"/>
+          <inkml:channel name="F" type="integer" max="32767" units="dev"/>
+        </inkml:traceFormat>
+        <inkml:channelProperties>
+          <inkml:channelProperty channel="X" name="resolution" value="1000" units="1/cm"/>
+          <inkml:channelProperty channel="Y" name="resolution" value="1000" units="1/cm"/>
+          <inkml:channelProperty channel="F" name="resolution" value="0" units="1/dev"/>
+        </inkml:channelProperties>
+      </inkml:inkSource>
+      <inkml:timestamp xml:id="ts0" timeString="2025-06-18T13:26:44.894"/>
+    </inkml:context>
+    <inkml:brush xml:id="br0">
+      <inkml:brushProperty name="width" value="0.035" units="cm"/>
+      <inkml:brushProperty name="height" value="0.035" units="cm"/>
+      <inkml:brushProperty name="color" value="#E71224"/>
+    </inkml:brush>
+  </inkml:definitions>
+  <inkml:trace contextRef="#ctx0" brushRef="#br0">0 0 24338,'0'3792'0</inkml:trace>
+</inkml:ink>
+</file>
+
+<file path=ppt/ink/ink8.xml><?xml version="1.0" encoding="utf-8"?>
+<inkml:ink xmlns:inkml="http://www.w3.org/2003/InkML">
+  <inkml:definitions>
+    <inkml:context xml:id="ctx0">
+      <inkml:inkSource xml:id="inkSrc0">
+        <inkml:traceFormat>
+          <inkml:channel name="X" type="integer" min="-2.14748E9" max="2.14748E9" units="cm"/>
+          <inkml:channel name="Y" type="integer" min="-2.14748E9" max="2.14748E9" units="cm"/>
+          <inkml:channel name="F" type="integer" max="32767" units="dev"/>
+        </inkml:traceFormat>
+        <inkml:channelProperties>
+          <inkml:channelProperty channel="X" name="resolution" value="1000" units="1/cm"/>
+          <inkml:channelProperty channel="Y" name="resolution" value="1000" units="1/cm"/>
+          <inkml:channelProperty channel="F" name="resolution" value="0" units="1/dev"/>
+        </inkml:channelProperties>
+      </inkml:inkSource>
+      <inkml:timestamp xml:id="ts0" timeString="2025-06-18T13:26:47.673"/>
+    </inkml:context>
+    <inkml:brush xml:id="br0">
+      <inkml:brushProperty name="width" value="0.035" units="cm"/>
+      <inkml:brushProperty name="height" value="0.035" units="cm"/>
+      <inkml:brushProperty name="color" value="#E71224"/>
+    </inkml:brush>
+  </inkml:definitions>
+  <inkml:trace contextRef="#ctx0" brushRef="#br0">41 0 24575,'7'0'0,"1"0"0,0 0 0,-1 1 0,1 0 0,-1 0 0,1 1 0,10 3 0,-15-3 0,-1-1 0,1 1 0,0 0 0,-1 0 0,1 0 0,-1 0 0,0 0 0,0 1 0,0-1 0,0 1 0,0-1 0,0 1 0,-1 0 0,1-1 0,-1 1 0,0 0 0,0 0 0,0 0 0,0 0 0,1 5 0,6 34 0,-1 0 0,-2 1 0,-2 0 0,-2 0 0,-5 52 0,3-89 7,1 0 0,-1-1-1,0 1 1,-1-1 0,1 1-1,-1-1 1,0 1-1,0-1 1,-1 0 0,0 0-1,0 0 1,0 0 0,0-1-1,-1 1 1,1-1 0,-1 0-1,-6 5 1,3-4-131,0-1 0,0 0 1,-1 0-1,1-1 0,-1 0 0,0 0 1,1-1-1,-1 0 0,0 0 0,-1-1 1,-11 1-1,1-1-6702</inkml:trace>
+</inkml:ink>
 </file>
 
 <file path=ppt/slideLayouts/slideLayout1.xml><?xml version="1.0" encoding="utf-8"?>
@@ -256,7 +492,7 @@
           <a:p>
             <a:fld id="{BE15E71B-42F9-4A17-848E-B7CB04EE6CEA}" type="datetimeFigureOut">
               <a:rPr lang="en-GB" smtClean="0"/>
-              <a:t>17/06/2025</a:t>
+              <a:t>18/06/2025</a:t>
             </a:fld>
             <a:endParaRPr lang="en-GB"/>
           </a:p>
@@ -456,7 +692,7 @@
           <a:p>
             <a:fld id="{BE15E71B-42F9-4A17-848E-B7CB04EE6CEA}" type="datetimeFigureOut">
               <a:rPr lang="en-GB" smtClean="0"/>
-              <a:t>17/06/2025</a:t>
+              <a:t>18/06/2025</a:t>
             </a:fld>
             <a:endParaRPr lang="en-GB"/>
           </a:p>
@@ -666,7 +902,7 @@
           <a:p>
             <a:fld id="{BE15E71B-42F9-4A17-848E-B7CB04EE6CEA}" type="datetimeFigureOut">
               <a:rPr lang="en-GB" smtClean="0"/>
-              <a:t>17/06/2025</a:t>
+              <a:t>18/06/2025</a:t>
             </a:fld>
             <a:endParaRPr lang="en-GB"/>
           </a:p>
@@ -866,7 +1102,7 @@
           <a:p>
             <a:fld id="{BE15E71B-42F9-4A17-848E-B7CB04EE6CEA}" type="datetimeFigureOut">
               <a:rPr lang="en-GB" smtClean="0"/>
-              <a:t>17/06/2025</a:t>
+              <a:t>18/06/2025</a:t>
             </a:fld>
             <a:endParaRPr lang="en-GB"/>
           </a:p>
@@ -1142,7 +1378,7 @@
           <a:p>
             <a:fld id="{BE15E71B-42F9-4A17-848E-B7CB04EE6CEA}" type="datetimeFigureOut">
               <a:rPr lang="en-GB" smtClean="0"/>
-              <a:t>17/06/2025</a:t>
+              <a:t>18/06/2025</a:t>
             </a:fld>
             <a:endParaRPr lang="en-GB"/>
           </a:p>
@@ -1410,7 +1646,7 @@
           <a:p>
             <a:fld id="{BE15E71B-42F9-4A17-848E-B7CB04EE6CEA}" type="datetimeFigureOut">
               <a:rPr lang="en-GB" smtClean="0"/>
-              <a:t>17/06/2025</a:t>
+              <a:t>18/06/2025</a:t>
             </a:fld>
             <a:endParaRPr lang="en-GB"/>
           </a:p>
@@ -1825,7 +2061,7 @@
           <a:p>
             <a:fld id="{BE15E71B-42F9-4A17-848E-B7CB04EE6CEA}" type="datetimeFigureOut">
               <a:rPr lang="en-GB" smtClean="0"/>
-              <a:t>17/06/2025</a:t>
+              <a:t>18/06/2025</a:t>
             </a:fld>
             <a:endParaRPr lang="en-GB"/>
           </a:p>
@@ -1967,7 +2203,7 @@
           <a:p>
             <a:fld id="{BE15E71B-42F9-4A17-848E-B7CB04EE6CEA}" type="datetimeFigureOut">
               <a:rPr lang="en-GB" smtClean="0"/>
-              <a:t>17/06/2025</a:t>
+              <a:t>18/06/2025</a:t>
             </a:fld>
             <a:endParaRPr lang="en-GB"/>
           </a:p>
@@ -2080,7 +2316,7 @@
           <a:p>
             <a:fld id="{BE15E71B-42F9-4A17-848E-B7CB04EE6CEA}" type="datetimeFigureOut">
               <a:rPr lang="en-GB" smtClean="0"/>
-              <a:t>17/06/2025</a:t>
+              <a:t>18/06/2025</a:t>
             </a:fld>
             <a:endParaRPr lang="en-GB"/>
           </a:p>
@@ -2393,7 +2629,7 @@
           <a:p>
             <a:fld id="{BE15E71B-42F9-4A17-848E-B7CB04EE6CEA}" type="datetimeFigureOut">
               <a:rPr lang="en-GB" smtClean="0"/>
-              <a:t>17/06/2025</a:t>
+              <a:t>18/06/2025</a:t>
             </a:fld>
             <a:endParaRPr lang="en-GB"/>
           </a:p>
@@ -2682,7 +2918,7 @@
           <a:p>
             <a:fld id="{BE15E71B-42F9-4A17-848E-B7CB04EE6CEA}" type="datetimeFigureOut">
               <a:rPr lang="en-GB" smtClean="0"/>
-              <a:t>17/06/2025</a:t>
+              <a:t>18/06/2025</a:t>
             </a:fld>
             <a:endParaRPr lang="en-GB"/>
           </a:p>
@@ -2925,7 +3161,7 @@
           <a:p>
             <a:fld id="{BE15E71B-42F9-4A17-848E-B7CB04EE6CEA}" type="datetimeFigureOut">
               <a:rPr lang="en-GB" smtClean="0"/>
-              <a:t>17/06/2025</a:t>
+              <a:t>18/06/2025</a:t>
             </a:fld>
             <a:endParaRPr lang="en-GB"/>
           </a:p>
@@ -3344,10 +3580,646 @@
       </p:grpSpPr>
       <p:sp>
         <p:nvSpPr>
+          <p:cNvPr id="56" name="TextBox 55">
+            <a:extLst>
+              <a:ext uri="{FF2B5EF4-FFF2-40B4-BE49-F238E27FC236}">
+                <a16:creationId xmlns:a16="http://schemas.microsoft.com/office/drawing/2014/main" id="{77A8A9C8-5DEA-19A4-42EE-E0E2DE5D8BDE}"/>
+              </a:ext>
+            </a:extLst>
+          </p:cNvPr>
+          <p:cNvSpPr txBox="1"/>
+          <p:nvPr/>
+        </p:nvSpPr>
+        <p:spPr>
+          <a:xfrm>
+            <a:off x="570809" y="1137967"/>
+            <a:ext cx="9038898" cy="2585323"/>
+          </a:xfrm>
+          <a:prstGeom prst="rect">
+            <a:avLst/>
+          </a:prstGeom>
+          <a:noFill/>
+        </p:spPr>
+        <p:txBody>
+          <a:bodyPr wrap="square" rtlCol="0">
+            <a:spAutoFit/>
+          </a:bodyPr>
+          <a:lstStyle/>
+          <a:p>
+            <a:pPr marL="285750" indent="-285750" fontAlgn="base">
+              <a:buFont typeface="Arial" panose="020B0604020202020204" pitchFamily="34" charset="0"/>
+              <a:buChar char="•"/>
+            </a:pPr>
+            <a:r>
+              <a:rPr lang="en-US" b="1" dirty="0"/>
+              <a:t>P</a:t>
+            </a:r>
+            <a:r>
+              <a:rPr lang="en-GB" b="1" dirty="0"/>
+              <a:t>reviously…</a:t>
+            </a:r>
+          </a:p>
+          <a:p>
+            <a:pPr marL="742950" lvl="1" indent="-285750" fontAlgn="base">
+              <a:buFont typeface="Arial" panose="020B0604020202020204" pitchFamily="34" charset="0"/>
+              <a:buChar char="•"/>
+            </a:pPr>
+            <a:r>
+              <a:rPr lang="en-GB" dirty="0"/>
+              <a:t>Recorded data with the 3M electrodes</a:t>
+            </a:r>
+          </a:p>
+          <a:p>
+            <a:pPr marL="742950" lvl="1" indent="-285750" fontAlgn="base">
+              <a:buFont typeface="Arial" panose="020B0604020202020204" pitchFamily="34" charset="0"/>
+              <a:buChar char="•"/>
+            </a:pPr>
+            <a:r>
+              <a:rPr lang="en-GB" dirty="0"/>
+              <a:t>Pipeline finished</a:t>
+            </a:r>
+          </a:p>
+          <a:p>
+            <a:pPr marL="742950" lvl="1" indent="-285750" fontAlgn="base">
+              <a:buFont typeface="Arial" panose="020B0604020202020204" pitchFamily="34" charset="0"/>
+              <a:buChar char="•"/>
+            </a:pPr>
+            <a:r>
+              <a:rPr lang="en-GB" dirty="0"/>
+              <a:t>Real-time accuracy: worse than bad, shameful</a:t>
+            </a:r>
+          </a:p>
+          <a:p>
+            <a:pPr marL="742950" lvl="1" indent="-285750" fontAlgn="base">
+              <a:buFont typeface="Arial" panose="020B0604020202020204" pitchFamily="34" charset="0"/>
+              <a:buChar char="•"/>
+            </a:pPr>
+            <a:r>
+              <a:rPr lang="en-GB" dirty="0"/>
+              <a:t>What is happening??</a:t>
+            </a:r>
+          </a:p>
+          <a:p>
+            <a:pPr marL="742950" lvl="1" indent="-285750" fontAlgn="base">
+              <a:buFont typeface="Arial" panose="020B0604020202020204" pitchFamily="34" charset="0"/>
+              <a:buChar char="•"/>
+            </a:pPr>
+            <a:endParaRPr lang="en-GB" dirty="0"/>
+          </a:p>
+          <a:p>
+            <a:pPr marL="742950" lvl="1" indent="-285750" fontAlgn="base">
+              <a:buFont typeface="Arial" panose="020B0604020202020204" pitchFamily="34" charset="0"/>
+              <a:buChar char="•"/>
+            </a:pPr>
+            <a:endParaRPr lang="en-GB" dirty="0"/>
+          </a:p>
+          <a:p>
+            <a:pPr marL="285750" indent="-285750" fontAlgn="base">
+              <a:buFont typeface="Arial" panose="020B0604020202020204" pitchFamily="34" charset="0"/>
+              <a:buChar char="•"/>
+            </a:pPr>
+            <a:r>
+              <a:rPr lang="en-GB" dirty="0"/>
+              <a:t> Recorded again with Ambu electrodes</a:t>
+            </a:r>
+          </a:p>
+          <a:p>
+            <a:pPr marL="285750" indent="-285750" fontAlgn="base">
+              <a:buFont typeface="Arial" panose="020B0604020202020204" pitchFamily="34" charset="0"/>
+              <a:buChar char="•"/>
+            </a:pPr>
+            <a:r>
+              <a:rPr lang="en-GB" dirty="0"/>
+              <a:t>Discovered that OpenBCI is NOT FILTERING the stored signal!!</a:t>
+            </a:r>
+            <a:endParaRPr lang="en-US" dirty="0"/>
+          </a:p>
+        </p:txBody>
+      </p:sp>
+      <p:sp>
+        <p:nvSpPr>
+          <p:cNvPr id="2" name="TextBox 1">
+            <a:extLst>
+              <a:ext uri="{FF2B5EF4-FFF2-40B4-BE49-F238E27FC236}">
+                <a16:creationId xmlns:a16="http://schemas.microsoft.com/office/drawing/2014/main" id="{96B6AAAA-382F-275C-0C78-B9A34EC66BAB}"/>
+              </a:ext>
+            </a:extLst>
+          </p:cNvPr>
+          <p:cNvSpPr txBox="1"/>
+          <p:nvPr/>
+        </p:nvSpPr>
+        <p:spPr>
+          <a:xfrm>
+            <a:off x="370125" y="285432"/>
+            <a:ext cx="9038898" cy="523220"/>
+          </a:xfrm>
+          <a:prstGeom prst="rect">
+            <a:avLst/>
+          </a:prstGeom>
+          <a:noFill/>
+        </p:spPr>
+        <p:txBody>
+          <a:bodyPr wrap="square" rtlCol="0">
+            <a:spAutoFit/>
+          </a:bodyPr>
+          <a:lstStyle/>
+          <a:p>
+            <a:pPr fontAlgn="base"/>
+            <a:r>
+              <a:rPr lang="en-US" sz="2800" dirty="0"/>
+              <a:t>Update 18/06/2025</a:t>
+            </a:r>
+          </a:p>
+        </p:txBody>
+      </p:sp>
+    </p:spTree>
+    <p:extLst>
+      <p:ext uri="{BB962C8B-B14F-4D97-AF65-F5344CB8AC3E}">
+        <p14:creationId xmlns:p14="http://schemas.microsoft.com/office/powerpoint/2010/main" val="3849239103"/>
+      </p:ext>
+    </p:extLst>
+  </p:cSld>
+  <p:clrMapOvr>
+    <a:masterClrMapping/>
+  </p:clrMapOvr>
+</p:sld>
+</file>
+
+<file path=ppt/slides/slide2.xml><?xml version="1.0" encoding="utf-8"?>
+<p:sld xmlns:a="http://schemas.openxmlformats.org/drawingml/2006/main" xmlns:r="http://schemas.openxmlformats.org/officeDocument/2006/relationships" xmlns:p="http://schemas.openxmlformats.org/presentationml/2006/main">
+  <p:cSld>
+    <p:spTree>
+      <p:nvGrpSpPr>
+        <p:cNvPr id="1" name="">
+          <a:extLst>
+            <a:ext uri="{FF2B5EF4-FFF2-40B4-BE49-F238E27FC236}">
+              <a16:creationId xmlns:a16="http://schemas.microsoft.com/office/drawing/2014/main" id="{D0DDBFED-38CD-9593-46DB-7177F3FC2761}"/>
+            </a:ext>
+          </a:extLst>
+        </p:cNvPr>
+        <p:cNvGrpSpPr/>
+        <p:nvPr/>
+      </p:nvGrpSpPr>
+      <p:grpSpPr>
+        <a:xfrm>
+          <a:off x="0" y="0"/>
+          <a:ext cx="0" cy="0"/>
+          <a:chOff x="0" y="0"/>
+          <a:chExt cx="0" cy="0"/>
+        </a:xfrm>
+      </p:grpSpPr>
+      <p:sp>
+        <p:nvSpPr>
+          <p:cNvPr id="56" name="TextBox 55">
+            <a:extLst>
+              <a:ext uri="{FF2B5EF4-FFF2-40B4-BE49-F238E27FC236}">
+                <a16:creationId xmlns:a16="http://schemas.microsoft.com/office/drawing/2014/main" id="{BA594058-84F6-3988-1AC2-CFE0DEC82E26}"/>
+              </a:ext>
+            </a:extLst>
+          </p:cNvPr>
+          <p:cNvSpPr txBox="1"/>
+          <p:nvPr/>
+        </p:nvSpPr>
+        <p:spPr>
+          <a:xfrm>
+            <a:off x="444061" y="133031"/>
+            <a:ext cx="9038898" cy="3970318"/>
+          </a:xfrm>
+          <a:prstGeom prst="rect">
+            <a:avLst/>
+          </a:prstGeom>
+          <a:noFill/>
+        </p:spPr>
+        <p:txBody>
+          <a:bodyPr wrap="square" rtlCol="0">
+            <a:spAutoFit/>
+          </a:bodyPr>
+          <a:lstStyle/>
+          <a:p>
+            <a:pPr marL="285750" indent="-285750" fontAlgn="base">
+              <a:buFont typeface="Arial" panose="020B0604020202020204" pitchFamily="34" charset="0"/>
+              <a:buChar char="•"/>
+            </a:pPr>
+            <a:endParaRPr lang="en-US" b="1" dirty="0"/>
+          </a:p>
+          <a:p>
+            <a:pPr marL="285750" indent="-285750" fontAlgn="base">
+              <a:buFont typeface="Arial" panose="020B0604020202020204" pitchFamily="34" charset="0"/>
+              <a:buChar char="•"/>
+            </a:pPr>
+            <a:r>
+              <a:rPr lang="en-US" b="1" dirty="0"/>
+              <a:t>With Ambu electrodes &amp; discrete movement</a:t>
+            </a:r>
+          </a:p>
+          <a:p>
+            <a:pPr marL="742950" lvl="1" indent="-285750" fontAlgn="base">
+              <a:buFont typeface="Arial" panose="020B0604020202020204" pitchFamily="34" charset="0"/>
+              <a:buChar char="•"/>
+            </a:pPr>
+            <a:r>
+              <a:rPr lang="en-US" dirty="0"/>
+              <a:t>Around </a:t>
+            </a:r>
+            <a:r>
+              <a:rPr lang="en-US" b="1" dirty="0"/>
+              <a:t>82%</a:t>
+            </a:r>
+            <a:r>
+              <a:rPr lang="en-US" dirty="0"/>
+              <a:t> of offline accuracy with </a:t>
+            </a:r>
+            <a:r>
+              <a:rPr lang="en-US" b="1" dirty="0"/>
+              <a:t>samples that were not in the same recording session</a:t>
+            </a:r>
+            <a:r>
+              <a:rPr lang="en-US" dirty="0"/>
+              <a:t> as those use for training! I use session 1,2 for training and session 3 for testing. </a:t>
+            </a:r>
+          </a:p>
+          <a:p>
+            <a:pPr marL="742950" lvl="1" indent="-285750" fontAlgn="base">
+              <a:buFont typeface="Arial" panose="020B0604020202020204" pitchFamily="34" charset="0"/>
+              <a:buChar char="•"/>
+            </a:pPr>
+            <a:r>
+              <a:rPr lang="en-US" dirty="0"/>
+              <a:t>This is </a:t>
+            </a:r>
+            <a:r>
+              <a:rPr lang="en-US" b="1" dirty="0"/>
+              <a:t>double the accuracy </a:t>
+            </a:r>
+            <a:r>
+              <a:rPr lang="en-US" dirty="0"/>
+              <a:t>with the 100 3M electrodes!</a:t>
+            </a:r>
+          </a:p>
+          <a:p>
+            <a:pPr marL="742950" lvl="1" indent="-285750" fontAlgn="base">
+              <a:buFont typeface="Arial" panose="020B0604020202020204" pitchFamily="34" charset="0"/>
+              <a:buChar char="•"/>
+            </a:pPr>
+            <a:r>
+              <a:rPr lang="en-US" dirty="0"/>
+              <a:t>If using samples from the same session I can get more than 90% accuracy</a:t>
+            </a:r>
+          </a:p>
+          <a:p>
+            <a:pPr marL="742950" lvl="1" indent="-285750" fontAlgn="base">
+              <a:buFont typeface="Arial" panose="020B0604020202020204" pitchFamily="34" charset="0"/>
+              <a:buChar char="•"/>
+            </a:pPr>
+            <a:r>
+              <a:rPr lang="en-US" dirty="0"/>
+              <a:t>Real time: works well but does not detect classes l, </a:t>
+            </a:r>
+            <a:r>
+              <a:rPr lang="en-US" dirty="0" err="1"/>
+              <a:t>lf</a:t>
+            </a:r>
+            <a:r>
+              <a:rPr lang="en-US" dirty="0"/>
+              <a:t>, and f. </a:t>
+            </a:r>
+          </a:p>
+          <a:p>
+            <a:pPr marL="742950" lvl="1" indent="-285750" fontAlgn="base">
+              <a:buFont typeface="Arial" panose="020B0604020202020204" pitchFamily="34" charset="0"/>
+              <a:buChar char="•"/>
+            </a:pPr>
+            <a:r>
+              <a:rPr lang="en-US" b="1" dirty="0"/>
+              <a:t>Promising if I train it with continuous </a:t>
+            </a:r>
+            <a:r>
+              <a:rPr lang="en-US" dirty="0"/>
+              <a:t>rather than discrete tongue movements</a:t>
+            </a:r>
+          </a:p>
+          <a:p>
+            <a:pPr lvl="1" fontAlgn="base"/>
+            <a:endParaRPr lang="en-US" dirty="0"/>
+          </a:p>
+          <a:p>
+            <a:pPr marL="285750" indent="-285750" fontAlgn="base">
+              <a:buFont typeface="Arial" panose="020B0604020202020204" pitchFamily="34" charset="0"/>
+              <a:buChar char="•"/>
+            </a:pPr>
+            <a:r>
+              <a:rPr lang="en-US" b="1" dirty="0"/>
+              <a:t>Bought 100 3M electrodes myself for Spain</a:t>
+            </a:r>
+          </a:p>
+          <a:p>
+            <a:pPr marL="742950" lvl="1" indent="-285750" fontAlgn="base">
+              <a:buFont typeface="Arial" panose="020B0604020202020204" pitchFamily="34" charset="0"/>
+              <a:buChar char="•"/>
+            </a:pPr>
+            <a:r>
+              <a:rPr lang="en-US" dirty="0"/>
+              <a:t>The Ambu ones are too expensive</a:t>
+            </a:r>
+          </a:p>
+          <a:p>
+            <a:pPr marL="742950" lvl="1" indent="-285750" fontAlgn="base">
+              <a:buFont typeface="Arial" panose="020B0604020202020204" pitchFamily="34" charset="0"/>
+              <a:buChar char="•"/>
+            </a:pPr>
+            <a:r>
+              <a:rPr lang="en-US" dirty="0"/>
+              <a:t>3M are very noisy. Can I apply gel to the 100 3M electrodes? Yes</a:t>
+            </a:r>
+          </a:p>
+          <a:p>
+            <a:endParaRPr lang="en-GB" dirty="0"/>
+          </a:p>
+        </p:txBody>
+      </p:sp>
+    </p:spTree>
+    <p:extLst>
+      <p:ext uri="{BB962C8B-B14F-4D97-AF65-F5344CB8AC3E}">
+        <p14:creationId xmlns:p14="http://schemas.microsoft.com/office/powerpoint/2010/main" val="229947146"/>
+      </p:ext>
+    </p:extLst>
+  </p:cSld>
+  <p:clrMapOvr>
+    <a:masterClrMapping/>
+  </p:clrMapOvr>
+</p:sld>
+</file>
+
+<file path=ppt/slides/slide3.xml><?xml version="1.0" encoding="utf-8"?>
+<p:sld xmlns:a="http://schemas.openxmlformats.org/drawingml/2006/main" xmlns:r="http://schemas.openxmlformats.org/officeDocument/2006/relationships" xmlns:p="http://schemas.openxmlformats.org/presentationml/2006/main">
+  <p:cSld>
+    <p:spTree>
+      <p:nvGrpSpPr>
+        <p:cNvPr id="1" name="">
+          <a:extLst>
+            <a:ext uri="{FF2B5EF4-FFF2-40B4-BE49-F238E27FC236}">
+              <a16:creationId xmlns:a16="http://schemas.microsoft.com/office/drawing/2014/main" id="{D2113474-6E83-439B-011F-37EF3F2A5B32}"/>
+            </a:ext>
+          </a:extLst>
+        </p:cNvPr>
+        <p:cNvGrpSpPr/>
+        <p:nvPr/>
+      </p:nvGrpSpPr>
+      <p:grpSpPr>
+        <a:xfrm>
+          <a:off x="0" y="0"/>
+          <a:ext cx="0" cy="0"/>
+          <a:chOff x="0" y="0"/>
+          <a:chExt cx="0" cy="0"/>
+        </a:xfrm>
+      </p:grpSpPr>
+      <p:sp>
+        <p:nvSpPr>
+          <p:cNvPr id="56" name="TextBox 55">
+            <a:extLst>
+              <a:ext uri="{FF2B5EF4-FFF2-40B4-BE49-F238E27FC236}">
+                <a16:creationId xmlns:a16="http://schemas.microsoft.com/office/drawing/2014/main" id="{F3FF1481-F32A-7BD2-2C03-F8FAA34F3B8B}"/>
+              </a:ext>
+            </a:extLst>
+          </p:cNvPr>
+          <p:cNvSpPr txBox="1"/>
+          <p:nvPr/>
+        </p:nvSpPr>
+        <p:spPr>
+          <a:xfrm>
+            <a:off x="444061" y="305047"/>
+            <a:ext cx="9038898" cy="3970318"/>
+          </a:xfrm>
+          <a:prstGeom prst="rect">
+            <a:avLst/>
+          </a:prstGeom>
+          <a:noFill/>
+        </p:spPr>
+        <p:txBody>
+          <a:bodyPr wrap="square" rtlCol="0">
+            <a:spAutoFit/>
+          </a:bodyPr>
+          <a:lstStyle/>
+          <a:p>
+            <a:pPr marL="285750" indent="-285750">
+              <a:buFont typeface="Arial" panose="020B0604020202020204" pitchFamily="34" charset="0"/>
+              <a:buChar char="•"/>
+            </a:pPr>
+            <a:r>
+              <a:rPr lang="en-US" b="1" dirty="0"/>
+              <a:t>Checked pitfalls and recommendations:</a:t>
+            </a:r>
+          </a:p>
+          <a:p>
+            <a:pPr marL="742950" lvl="1" indent="-285750">
+              <a:buFont typeface="Arial" panose="020B0604020202020204" pitchFamily="34" charset="0"/>
+              <a:buChar char="•"/>
+            </a:pPr>
+            <a:r>
+              <a:rPr lang="en-US" dirty="0"/>
+              <a:t>The pipeline doesn’t seem to fall on one of the mentioned common mistakes.</a:t>
+            </a:r>
+          </a:p>
+          <a:p>
+            <a:pPr marL="285750" indent="-285750">
+              <a:buFont typeface="Arial" panose="020B0604020202020204" pitchFamily="34" charset="0"/>
+              <a:buChar char="•"/>
+            </a:pPr>
+            <a:endParaRPr lang="en-US" dirty="0"/>
+          </a:p>
+          <a:p>
+            <a:pPr marL="285750" indent="-285750">
+              <a:buFont typeface="Arial" panose="020B0604020202020204" pitchFamily="34" charset="0"/>
+              <a:buChar char="•"/>
+            </a:pPr>
+            <a:r>
+              <a:rPr lang="en-US" b="1" dirty="0"/>
+              <a:t>Implemented TKEO used in Krabben 2016</a:t>
+            </a:r>
+            <a:endParaRPr lang="en-US" dirty="0"/>
+          </a:p>
+          <a:p>
+            <a:pPr marL="285750" indent="-285750">
+              <a:buFont typeface="Arial" panose="020B0604020202020204" pitchFamily="34" charset="0"/>
+              <a:buChar char="•"/>
+            </a:pPr>
+            <a:endParaRPr lang="en-US" dirty="0"/>
+          </a:p>
+          <a:p>
+            <a:pPr marL="285750" indent="-285750">
+              <a:buFont typeface="Arial" panose="020B0604020202020204" pitchFamily="34" charset="0"/>
+              <a:buChar char="•"/>
+            </a:pPr>
+            <a:r>
+              <a:rPr lang="en-US" b="1" dirty="0"/>
+              <a:t>Bought 100 3M electrodes myself for Spain</a:t>
+            </a:r>
+          </a:p>
+          <a:p>
+            <a:pPr marL="628650" lvl="1" indent="-171450">
+              <a:buFont typeface="Arial" panose="020B0604020202020204" pitchFamily="34" charset="0"/>
+              <a:buChar char="•"/>
+            </a:pPr>
+            <a:r>
+              <a:rPr lang="en-US" dirty="0"/>
+              <a:t>The Ambu ones are too expensive</a:t>
+            </a:r>
+          </a:p>
+          <a:p>
+            <a:pPr marL="628650" lvl="1" indent="-171450">
+              <a:buFont typeface="Arial" panose="020B0604020202020204" pitchFamily="34" charset="0"/>
+              <a:buChar char="•"/>
+            </a:pPr>
+            <a:r>
+              <a:rPr lang="en-US" dirty="0"/>
+              <a:t>They are very noisy. Can I apply gel to the 100 3M electrodes?</a:t>
+            </a:r>
+          </a:p>
+          <a:p>
+            <a:pPr marL="285750" indent="-285750">
+              <a:buFont typeface="Arial" panose="020B0604020202020204" pitchFamily="34" charset="0"/>
+              <a:buChar char="•"/>
+            </a:pPr>
+            <a:endParaRPr lang="en-US" b="1" dirty="0"/>
+          </a:p>
+          <a:p>
+            <a:pPr marL="285750" indent="-285750">
+              <a:buFont typeface="Arial" panose="020B0604020202020204" pitchFamily="34" charset="0"/>
+              <a:buChar char="•"/>
+            </a:pPr>
+            <a:r>
+              <a:rPr lang="en-US" b="1" dirty="0"/>
+              <a:t>Tested 3M electrodes with gel </a:t>
+            </a:r>
+          </a:p>
+          <a:p>
+            <a:pPr marL="628650" lvl="1" indent="-171450">
+              <a:buFont typeface="Arial" panose="020B0604020202020204" pitchFamily="34" charset="0"/>
+              <a:buChar char="•"/>
+            </a:pPr>
+            <a:r>
+              <a:rPr lang="en-US" dirty="0"/>
+              <a:t>Recorded continuous signal with those electrodes</a:t>
+            </a:r>
+          </a:p>
+          <a:p>
+            <a:pPr marL="628650" lvl="1" indent="-171450">
+              <a:buFont typeface="Arial" panose="020B0604020202020204" pitchFamily="34" charset="0"/>
+              <a:buChar char="•"/>
+            </a:pPr>
+            <a:r>
+              <a:rPr lang="en-US" dirty="0"/>
+              <a:t>Tested online</a:t>
+            </a:r>
+          </a:p>
+          <a:p>
+            <a:pPr marL="742950" lvl="1" indent="-285750">
+              <a:buFont typeface="Arial" panose="020B0604020202020204" pitchFamily="34" charset="0"/>
+              <a:buChar char="•"/>
+            </a:pPr>
+            <a:r>
+              <a:rPr lang="en-US" dirty="0"/>
+              <a:t>Better offline results </a:t>
+            </a:r>
+            <a:r>
+              <a:rPr lang="en-US" b="1" dirty="0"/>
+              <a:t>without bandpass, but very bad in online</a:t>
+            </a:r>
+          </a:p>
+          <a:p>
+            <a:endParaRPr lang="en-GB" dirty="0"/>
+          </a:p>
+        </p:txBody>
+      </p:sp>
+      <p:pic>
+        <p:nvPicPr>
+          <p:cNvPr id="2050" name="Picture 2">
+            <a:extLst>
+              <a:ext uri="{FF2B5EF4-FFF2-40B4-BE49-F238E27FC236}">
+                <a16:creationId xmlns:a16="http://schemas.microsoft.com/office/drawing/2014/main" id="{AE1D54AD-5177-ABFC-E69D-09EEDA533E63}"/>
+              </a:ext>
+            </a:extLst>
+          </p:cNvPr>
+          <p:cNvPicPr>
+            <a:picLocks noChangeAspect="1" noChangeArrowheads="1"/>
+          </p:cNvPicPr>
+          <p:nvPr/>
+        </p:nvPicPr>
+        <p:blipFill>
+          <a:blip r:embed="rId2">
+            <a:extLst>
+              <a:ext uri="{28A0092B-C50C-407E-A947-70E740481C1C}">
+                <a14:useLocalDpi xmlns:a14="http://schemas.microsoft.com/office/drawing/2010/main" val="0"/>
+              </a:ext>
+            </a:extLst>
+          </a:blip>
+          <a:srcRect/>
+          <a:stretch>
+            <a:fillRect/>
+          </a:stretch>
+        </p:blipFill>
+        <p:spPr bwMode="auto">
+          <a:xfrm>
+            <a:off x="931546" y="4575357"/>
+            <a:ext cx="2733675" cy="1314450"/>
+          </a:xfrm>
+          <a:prstGeom prst="rect">
+            <a:avLst/>
+          </a:prstGeom>
+          <a:noFill/>
+          <a:extLst>
+            <a:ext uri="{909E8E84-426E-40DD-AFC4-6F175D3DCCD1}">
+              <a14:hiddenFill xmlns:a14="http://schemas.microsoft.com/office/drawing/2010/main">
+                <a:solidFill>
+                  <a:srgbClr val="FFFFFF"/>
+                </a:solidFill>
+              </a14:hiddenFill>
+            </a:ext>
+          </a:extLst>
+        </p:spPr>
+      </p:pic>
+    </p:spTree>
+    <p:extLst>
+      <p:ext uri="{BB962C8B-B14F-4D97-AF65-F5344CB8AC3E}">
+        <p14:creationId xmlns:p14="http://schemas.microsoft.com/office/powerpoint/2010/main" val="1326368929"/>
+      </p:ext>
+    </p:extLst>
+  </p:cSld>
+  <p:clrMapOvr>
+    <a:masterClrMapping/>
+  </p:clrMapOvr>
+</p:sld>
+</file>
+
+<file path=ppt/slides/slide4.xml><?xml version="1.0" encoding="utf-8"?>
+<p:sld xmlns:a="http://schemas.openxmlformats.org/drawingml/2006/main" xmlns:r="http://schemas.openxmlformats.org/officeDocument/2006/relationships" xmlns:p="http://schemas.openxmlformats.org/presentationml/2006/main">
+  <p:cSld>
+    <p:spTree>
+      <p:nvGrpSpPr>
+        <p:cNvPr id="1" name="">
+          <a:extLst>
+            <a:ext uri="{FF2B5EF4-FFF2-40B4-BE49-F238E27FC236}">
+              <a16:creationId xmlns:a16="http://schemas.microsoft.com/office/drawing/2014/main" id="{F707CBFD-6817-CC22-2B8D-BECC32A52B3B}"/>
+            </a:ext>
+          </a:extLst>
+        </p:cNvPr>
+        <p:cNvGrpSpPr/>
+        <p:nvPr/>
+      </p:nvGrpSpPr>
+      <p:grpSpPr>
+        <a:xfrm>
+          <a:off x="0" y="0"/>
+          <a:ext cx="0" cy="0"/>
+          <a:chOff x="0" y="0"/>
+          <a:chExt cx="0" cy="0"/>
+        </a:xfrm>
+      </p:grpSpPr>
+      <p:sp>
+        <p:nvSpPr>
           <p:cNvPr id="4" name="Rectangle 3">
             <a:extLst>
               <a:ext uri="{FF2B5EF4-FFF2-40B4-BE49-F238E27FC236}">
-                <a16:creationId xmlns:a16="http://schemas.microsoft.com/office/drawing/2014/main" id="{D84A5D50-FCA5-82C6-8EA4-B5527739DCE0}"/>
+                <a16:creationId xmlns:a16="http://schemas.microsoft.com/office/drawing/2014/main" id="{0C7FD039-02AF-CCBE-3EEF-B2A4D75AFFB0}"/>
               </a:ext>
             </a:extLst>
           </p:cNvPr>
@@ -3397,7 +4269,7 @@
           <p:cNvPr id="5" name="Rectangle 4">
             <a:extLst>
               <a:ext uri="{FF2B5EF4-FFF2-40B4-BE49-F238E27FC236}">
-                <a16:creationId xmlns:a16="http://schemas.microsoft.com/office/drawing/2014/main" id="{2B7070F6-F6C7-B221-D173-BB55CE32E589}"/>
+                <a16:creationId xmlns:a16="http://schemas.microsoft.com/office/drawing/2014/main" id="{70E8CCDC-83A0-2265-631A-42552BC85202}"/>
               </a:ext>
             </a:extLst>
           </p:cNvPr>
@@ -3447,7 +4319,7 @@
           <p:cNvPr id="6" name="Rectangle 5">
             <a:extLst>
               <a:ext uri="{FF2B5EF4-FFF2-40B4-BE49-F238E27FC236}">
-                <a16:creationId xmlns:a16="http://schemas.microsoft.com/office/drawing/2014/main" id="{67A05C7C-FEDF-5EF9-0ACD-901DF480D29E}"/>
+                <a16:creationId xmlns:a16="http://schemas.microsoft.com/office/drawing/2014/main" id="{72AAFC9F-801B-869F-E952-35606EBDC245}"/>
               </a:ext>
             </a:extLst>
           </p:cNvPr>
@@ -3497,7 +4369,7 @@
           <p:cNvPr id="7" name="Rectangle 6">
             <a:extLst>
               <a:ext uri="{FF2B5EF4-FFF2-40B4-BE49-F238E27FC236}">
-                <a16:creationId xmlns:a16="http://schemas.microsoft.com/office/drawing/2014/main" id="{DF1F798C-3ADB-F0AA-216B-12D8E5454B2E}"/>
+                <a16:creationId xmlns:a16="http://schemas.microsoft.com/office/drawing/2014/main" id="{72473C48-F80D-2CDB-4BB8-A28BADE5B220}"/>
               </a:ext>
             </a:extLst>
           </p:cNvPr>
@@ -3546,7 +4418,7 @@
           <p:cNvPr id="9" name="Straight Arrow Connector 8">
             <a:extLst>
               <a:ext uri="{FF2B5EF4-FFF2-40B4-BE49-F238E27FC236}">
-                <a16:creationId xmlns:a16="http://schemas.microsoft.com/office/drawing/2014/main" id="{8DBE59C3-1B07-A4E8-02F5-C317D9F6575F}"/>
+                <a16:creationId xmlns:a16="http://schemas.microsoft.com/office/drawing/2014/main" id="{1FC20A87-2F61-77B5-4CB3-6EB4ED1C927E}"/>
               </a:ext>
             </a:extLst>
           </p:cNvPr>
@@ -3589,7 +4461,7 @@
           <p:cNvPr id="11" name="Rectangle 10">
             <a:extLst>
               <a:ext uri="{FF2B5EF4-FFF2-40B4-BE49-F238E27FC236}">
-                <a16:creationId xmlns:a16="http://schemas.microsoft.com/office/drawing/2014/main" id="{2A6C9872-965D-D693-C96C-3D23F8D7B68E}"/>
+                <a16:creationId xmlns:a16="http://schemas.microsoft.com/office/drawing/2014/main" id="{C8D5F4C4-776A-4BB6-6431-EF69D5411F03}"/>
               </a:ext>
             </a:extLst>
           </p:cNvPr>
@@ -3645,7 +4517,7 @@
           <p:cNvPr id="12" name="Rectangle 11">
             <a:extLst>
               <a:ext uri="{FF2B5EF4-FFF2-40B4-BE49-F238E27FC236}">
-                <a16:creationId xmlns:a16="http://schemas.microsoft.com/office/drawing/2014/main" id="{6320B21B-38A4-A80F-64DD-C5C8B1E4DBC2}"/>
+                <a16:creationId xmlns:a16="http://schemas.microsoft.com/office/drawing/2014/main" id="{48925386-6ACC-881B-5DA7-12FD00EB1A90}"/>
               </a:ext>
             </a:extLst>
           </p:cNvPr>
@@ -3701,7 +4573,7 @@
           <p:cNvPr id="14" name="Straight Arrow Connector 13">
             <a:extLst>
               <a:ext uri="{FF2B5EF4-FFF2-40B4-BE49-F238E27FC236}">
-                <a16:creationId xmlns:a16="http://schemas.microsoft.com/office/drawing/2014/main" id="{12457D14-7F5F-D461-C89B-CFC271CD573C}"/>
+                <a16:creationId xmlns:a16="http://schemas.microsoft.com/office/drawing/2014/main" id="{506E445F-C6E9-D873-3C86-625B852A6FB6}"/>
               </a:ext>
             </a:extLst>
           </p:cNvPr>
@@ -3743,7 +4615,7 @@
           <p:cNvPr id="16" name="Straight Arrow Connector 15">
             <a:extLst>
               <a:ext uri="{FF2B5EF4-FFF2-40B4-BE49-F238E27FC236}">
-                <a16:creationId xmlns:a16="http://schemas.microsoft.com/office/drawing/2014/main" id="{DD53CEE6-1EE6-13AD-8F4D-2DF01B4905D5}"/>
+                <a16:creationId xmlns:a16="http://schemas.microsoft.com/office/drawing/2014/main" id="{1376FE13-4A7F-169D-2267-E4E672A64ED2}"/>
               </a:ext>
             </a:extLst>
           </p:cNvPr>
@@ -3785,7 +4657,7 @@
           <p:cNvPr id="17" name="Rectangle 16">
             <a:extLst>
               <a:ext uri="{FF2B5EF4-FFF2-40B4-BE49-F238E27FC236}">
-                <a16:creationId xmlns:a16="http://schemas.microsoft.com/office/drawing/2014/main" id="{312DCC37-8F34-61C7-0B2E-C8A7E1A7F0B4}"/>
+                <a16:creationId xmlns:a16="http://schemas.microsoft.com/office/drawing/2014/main" id="{8568CF6B-BEBC-3DEC-837D-B649ABC33AD9}"/>
               </a:ext>
             </a:extLst>
           </p:cNvPr>
@@ -3834,7 +4706,7 @@
           <p:cNvPr id="18" name="Rectangle 17">
             <a:extLst>
               <a:ext uri="{FF2B5EF4-FFF2-40B4-BE49-F238E27FC236}">
-                <a16:creationId xmlns:a16="http://schemas.microsoft.com/office/drawing/2014/main" id="{20D4A59D-0A8F-EEBC-E567-5AA822BDFD28}"/>
+                <a16:creationId xmlns:a16="http://schemas.microsoft.com/office/drawing/2014/main" id="{3C9AAFD9-2848-3F7D-3D84-C507CCDA393E}"/>
               </a:ext>
             </a:extLst>
           </p:cNvPr>
@@ -3883,7 +4755,7 @@
           <p:cNvPr id="19" name="Rectangle 18">
             <a:extLst>
               <a:ext uri="{FF2B5EF4-FFF2-40B4-BE49-F238E27FC236}">
-                <a16:creationId xmlns:a16="http://schemas.microsoft.com/office/drawing/2014/main" id="{B7A43B16-CF47-79CF-00B7-BF2CFA964051}"/>
+                <a16:creationId xmlns:a16="http://schemas.microsoft.com/office/drawing/2014/main" id="{C9D1CA89-4FEF-9851-A00F-81BBF0E2F4FE}"/>
               </a:ext>
             </a:extLst>
           </p:cNvPr>
@@ -3932,7 +4804,7 @@
           <p:cNvPr id="20" name="Rectangle 19">
             <a:extLst>
               <a:ext uri="{FF2B5EF4-FFF2-40B4-BE49-F238E27FC236}">
-                <a16:creationId xmlns:a16="http://schemas.microsoft.com/office/drawing/2014/main" id="{6760C17E-CCF5-9FFE-52C5-AD174A58D2EF}"/>
+                <a16:creationId xmlns:a16="http://schemas.microsoft.com/office/drawing/2014/main" id="{118E9AC2-631E-B052-6FA6-6B4C2A6FFE06}"/>
               </a:ext>
             </a:extLst>
           </p:cNvPr>
@@ -3981,7 +4853,7 @@
           <p:cNvPr id="22" name="Straight Arrow Connector 21">
             <a:extLst>
               <a:ext uri="{FF2B5EF4-FFF2-40B4-BE49-F238E27FC236}">
-                <a16:creationId xmlns:a16="http://schemas.microsoft.com/office/drawing/2014/main" id="{D8605FE3-3144-7E0E-0F74-0B97B047FDCC}"/>
+                <a16:creationId xmlns:a16="http://schemas.microsoft.com/office/drawing/2014/main" id="{A90CB42B-BF18-6B7E-88C7-016A2087CA4F}"/>
               </a:ext>
             </a:extLst>
           </p:cNvPr>
@@ -4023,7 +4895,7 @@
           <p:cNvPr id="24" name="Straight Arrow Connector 23">
             <a:extLst>
               <a:ext uri="{FF2B5EF4-FFF2-40B4-BE49-F238E27FC236}">
-                <a16:creationId xmlns:a16="http://schemas.microsoft.com/office/drawing/2014/main" id="{99D10694-F2CB-A038-4C74-AEBC1B8B1D89}"/>
+                <a16:creationId xmlns:a16="http://schemas.microsoft.com/office/drawing/2014/main" id="{B30782F6-E18C-D6D6-FE76-AF1FD51EC6C7}"/>
               </a:ext>
             </a:extLst>
           </p:cNvPr>
@@ -4065,7 +4937,7 @@
           <p:cNvPr id="26" name="Straight Arrow Connector 25">
             <a:extLst>
               <a:ext uri="{FF2B5EF4-FFF2-40B4-BE49-F238E27FC236}">
-                <a16:creationId xmlns:a16="http://schemas.microsoft.com/office/drawing/2014/main" id="{9278DCB6-D461-7542-E8A7-87BAC510E2D8}"/>
+                <a16:creationId xmlns:a16="http://schemas.microsoft.com/office/drawing/2014/main" id="{E872019A-C383-1995-FD33-E1798C4630C1}"/>
               </a:ext>
             </a:extLst>
           </p:cNvPr>
@@ -4107,7 +4979,7 @@
           <p:cNvPr id="28" name="Straight Arrow Connector 27">
             <a:extLst>
               <a:ext uri="{FF2B5EF4-FFF2-40B4-BE49-F238E27FC236}">
-                <a16:creationId xmlns:a16="http://schemas.microsoft.com/office/drawing/2014/main" id="{085C127A-6583-3F90-A16C-537AE667DA6B}"/>
+                <a16:creationId xmlns:a16="http://schemas.microsoft.com/office/drawing/2014/main" id="{2BE38130-CFD7-85B5-DFDD-93A37082BD45}"/>
               </a:ext>
             </a:extLst>
           </p:cNvPr>
@@ -4149,7 +5021,7 @@
           <p:cNvPr id="29" name="TextBox 28">
             <a:extLst>
               <a:ext uri="{FF2B5EF4-FFF2-40B4-BE49-F238E27FC236}">
-                <a16:creationId xmlns:a16="http://schemas.microsoft.com/office/drawing/2014/main" id="{7BAF6843-2427-7452-F12B-8767CFC6CFC8}"/>
+                <a16:creationId xmlns:a16="http://schemas.microsoft.com/office/drawing/2014/main" id="{43845534-27E4-2C0F-BAAA-6A5EF2B271A2}"/>
               </a:ext>
             </a:extLst>
           </p:cNvPr>
@@ -4185,7 +5057,7 @@
           <p:cNvPr id="31" name="Rectangle 30">
             <a:extLst>
               <a:ext uri="{FF2B5EF4-FFF2-40B4-BE49-F238E27FC236}">
-                <a16:creationId xmlns:a16="http://schemas.microsoft.com/office/drawing/2014/main" id="{68A8FACF-4037-B3CE-6B61-A3491AE77A73}"/>
+                <a16:creationId xmlns:a16="http://schemas.microsoft.com/office/drawing/2014/main" id="{7D14398D-67E2-0CB8-B94A-97868599F119}"/>
               </a:ext>
             </a:extLst>
           </p:cNvPr>
@@ -4234,7 +5106,7 @@
           <p:cNvPr id="33" name="Straight Arrow Connector 32">
             <a:extLst>
               <a:ext uri="{FF2B5EF4-FFF2-40B4-BE49-F238E27FC236}">
-                <a16:creationId xmlns:a16="http://schemas.microsoft.com/office/drawing/2014/main" id="{81C92D40-158A-3903-F1A0-77CBBCD03F5A}"/>
+                <a16:creationId xmlns:a16="http://schemas.microsoft.com/office/drawing/2014/main" id="{C1B5E8BA-3F67-9A44-61EC-45950E90DC2B}"/>
               </a:ext>
             </a:extLst>
           </p:cNvPr>
@@ -4276,7 +5148,7 @@
           <p:cNvPr id="34" name="Rectangle 33">
             <a:extLst>
               <a:ext uri="{FF2B5EF4-FFF2-40B4-BE49-F238E27FC236}">
-                <a16:creationId xmlns:a16="http://schemas.microsoft.com/office/drawing/2014/main" id="{D1805787-74D6-3567-B870-2473DCD1D33A}"/>
+                <a16:creationId xmlns:a16="http://schemas.microsoft.com/office/drawing/2014/main" id="{F9234D3E-D8FF-7303-3B28-FC323C085994}"/>
               </a:ext>
             </a:extLst>
           </p:cNvPr>
@@ -4325,7 +5197,7 @@
           <p:cNvPr id="36" name="Straight Arrow Connector 35">
             <a:extLst>
               <a:ext uri="{FF2B5EF4-FFF2-40B4-BE49-F238E27FC236}">
-                <a16:creationId xmlns:a16="http://schemas.microsoft.com/office/drawing/2014/main" id="{949EA334-92D5-3387-7AA2-D8572E603180}"/>
+                <a16:creationId xmlns:a16="http://schemas.microsoft.com/office/drawing/2014/main" id="{9582185A-B7A8-999E-BD99-FAEB8BFB4731}"/>
               </a:ext>
             </a:extLst>
           </p:cNvPr>
@@ -4367,7 +5239,7 @@
           <p:cNvPr id="38" name="Straight Arrow Connector 37">
             <a:extLst>
               <a:ext uri="{FF2B5EF4-FFF2-40B4-BE49-F238E27FC236}">
-                <a16:creationId xmlns:a16="http://schemas.microsoft.com/office/drawing/2014/main" id="{AE982A91-1D8C-ABB2-FB3F-1093AA5DEB82}"/>
+                <a16:creationId xmlns:a16="http://schemas.microsoft.com/office/drawing/2014/main" id="{8AA9FF48-9184-8E15-5137-85096152FEB0}"/>
               </a:ext>
             </a:extLst>
           </p:cNvPr>
@@ -4409,7 +5281,7 @@
           <p:cNvPr id="39" name="TextBox 38">
             <a:extLst>
               <a:ext uri="{FF2B5EF4-FFF2-40B4-BE49-F238E27FC236}">
-                <a16:creationId xmlns:a16="http://schemas.microsoft.com/office/drawing/2014/main" id="{62B53A7E-C849-FA9A-B876-5FD21A1786E4}"/>
+                <a16:creationId xmlns:a16="http://schemas.microsoft.com/office/drawing/2014/main" id="{BE0B2D67-C3C1-294C-CFE8-FAB0104E16B0}"/>
               </a:ext>
             </a:extLst>
           </p:cNvPr>
@@ -4448,8 +5320,19 @@
           <a:p>
             <a:pPr algn="ctr"/>
             <a:r>
+              <a:rPr lang="en-US" sz="1200" dirty="0"/>
+              <a:t>Cross val. Mean accuracy =</a:t>
+            </a:r>
+          </a:p>
+          <a:p>
+            <a:pPr algn="ctr"/>
+            <a:r>
+              <a:rPr lang="en-US" sz="1200" dirty="0"/>
+              <a:t> </a:t>
+            </a:r>
+            <a:r>
               <a:rPr lang="en-US" sz="1200" b="1" dirty="0"/>
-              <a:t>Cross val. Mean accuracy = 0,754</a:t>
+              <a:t>0,754</a:t>
             </a:r>
             <a:endParaRPr lang="en-GB" sz="1200" b="1" dirty="0"/>
           </a:p>
@@ -4460,7 +5343,7 @@
           <p:cNvPr id="41" name="Straight Arrow Connector 40">
             <a:extLst>
               <a:ext uri="{FF2B5EF4-FFF2-40B4-BE49-F238E27FC236}">
-                <a16:creationId xmlns:a16="http://schemas.microsoft.com/office/drawing/2014/main" id="{45D25485-0BFC-B540-E85F-D84633E3147E}"/>
+                <a16:creationId xmlns:a16="http://schemas.microsoft.com/office/drawing/2014/main" id="{8A13EF26-3DC0-6410-5FEC-172772CE8DA8}"/>
               </a:ext>
             </a:extLst>
           </p:cNvPr>
@@ -4503,7 +5386,7 @@
           <p:cNvPr id="44" name="Straight Arrow Connector 43">
             <a:extLst>
               <a:ext uri="{FF2B5EF4-FFF2-40B4-BE49-F238E27FC236}">
-                <a16:creationId xmlns:a16="http://schemas.microsoft.com/office/drawing/2014/main" id="{6DE45F63-1040-528A-E038-B1FD40405AE8}"/>
+                <a16:creationId xmlns:a16="http://schemas.microsoft.com/office/drawing/2014/main" id="{23008B9C-3FE1-C26F-46CB-2FD3215D040E}"/>
               </a:ext>
             </a:extLst>
           </p:cNvPr>
@@ -4546,7 +5429,7 @@
           <p:cNvPr id="46" name="Straight Arrow Connector 45">
             <a:extLst>
               <a:ext uri="{FF2B5EF4-FFF2-40B4-BE49-F238E27FC236}">
-                <a16:creationId xmlns:a16="http://schemas.microsoft.com/office/drawing/2014/main" id="{94A7EF61-840B-83F6-7668-193838673DFB}"/>
+                <a16:creationId xmlns:a16="http://schemas.microsoft.com/office/drawing/2014/main" id="{4A07E04A-CC06-D558-28AD-0B2B337C8D78}"/>
               </a:ext>
             </a:extLst>
           </p:cNvPr>
@@ -4589,7 +5472,7 @@
           <p:cNvPr id="48" name="TextBox 47">
             <a:extLst>
               <a:ext uri="{FF2B5EF4-FFF2-40B4-BE49-F238E27FC236}">
-                <a16:creationId xmlns:a16="http://schemas.microsoft.com/office/drawing/2014/main" id="{2DC78575-3632-B376-C5A6-30873E1CCABB}"/>
+                <a16:creationId xmlns:a16="http://schemas.microsoft.com/office/drawing/2014/main" id="{E6968DE1-16EB-F82B-C7D6-EEC6BF94719A}"/>
               </a:ext>
             </a:extLst>
           </p:cNvPr>
@@ -4630,7 +5513,7 @@
           <p:cNvPr id="50" name="Straight Arrow Connector 49">
             <a:extLst>
               <a:ext uri="{FF2B5EF4-FFF2-40B4-BE49-F238E27FC236}">
-                <a16:creationId xmlns:a16="http://schemas.microsoft.com/office/drawing/2014/main" id="{97E0F135-68D3-830C-5B6E-2B444E799BAE}"/>
+                <a16:creationId xmlns:a16="http://schemas.microsoft.com/office/drawing/2014/main" id="{7879F786-9C64-717B-8E22-B5AE1C7F09FE}"/>
               </a:ext>
             </a:extLst>
           </p:cNvPr>
@@ -4672,7 +5555,7 @@
           <p:cNvPr id="51" name="TextBox 50">
             <a:extLst>
               <a:ext uri="{FF2B5EF4-FFF2-40B4-BE49-F238E27FC236}">
-                <a16:creationId xmlns:a16="http://schemas.microsoft.com/office/drawing/2014/main" id="{9D858D89-BB9A-E8A2-212D-BD038A3EF25B}"/>
+                <a16:creationId xmlns:a16="http://schemas.microsoft.com/office/drawing/2014/main" id="{2D934F96-8B33-3775-DA40-326529A725E7}"/>
               </a:ext>
             </a:extLst>
           </p:cNvPr>
@@ -4708,7 +5591,7 @@
           <p:cNvPr id="52" name="TextBox 51">
             <a:extLst>
               <a:ext uri="{FF2B5EF4-FFF2-40B4-BE49-F238E27FC236}">
-                <a16:creationId xmlns:a16="http://schemas.microsoft.com/office/drawing/2014/main" id="{9C733818-4920-A431-BAFC-FD6C2E85B705}"/>
+                <a16:creationId xmlns:a16="http://schemas.microsoft.com/office/drawing/2014/main" id="{9640A6EB-C48F-8173-AF3C-C83BD08787CA}"/>
               </a:ext>
             </a:extLst>
           </p:cNvPr>
@@ -4743,7 +5626,7 @@
           <p:cNvPr id="53" name="TextBox 52">
             <a:extLst>
               <a:ext uri="{FF2B5EF4-FFF2-40B4-BE49-F238E27FC236}">
-                <a16:creationId xmlns:a16="http://schemas.microsoft.com/office/drawing/2014/main" id="{45775209-92A2-32CB-931E-6051F0CDF035}"/>
+                <a16:creationId xmlns:a16="http://schemas.microsoft.com/office/drawing/2014/main" id="{B828DAD5-B744-1177-5E26-0102305B6D64}"/>
               </a:ext>
             </a:extLst>
           </p:cNvPr>
@@ -4779,7 +5662,7 @@
           <p:cNvPr id="55" name="Straight Connector 54">
             <a:extLst>
               <a:ext uri="{FF2B5EF4-FFF2-40B4-BE49-F238E27FC236}">
-                <a16:creationId xmlns:a16="http://schemas.microsoft.com/office/drawing/2014/main" id="{5144D436-23DC-AF0A-5F2C-96C54B4C7249}"/>
+                <a16:creationId xmlns:a16="http://schemas.microsoft.com/office/drawing/2014/main" id="{FD17FA41-9391-425C-3E47-28CD547863F2}"/>
               </a:ext>
             </a:extLst>
           </p:cNvPr>
@@ -4827,7 +5710,7 @@
           <p:cNvPr id="56" name="TextBox 55">
             <a:extLst>
               <a:ext uri="{FF2B5EF4-FFF2-40B4-BE49-F238E27FC236}">
-                <a16:creationId xmlns:a16="http://schemas.microsoft.com/office/drawing/2014/main" id="{77A8A9C8-5DEA-19A4-42EE-E0E2DE5D8BDE}"/>
+                <a16:creationId xmlns:a16="http://schemas.microsoft.com/office/drawing/2014/main" id="{FB80EB9D-50ED-A3B0-60C4-577CA77B4174}"/>
               </a:ext>
             </a:extLst>
           </p:cNvPr>
@@ -4837,7 +5720,7 @@
         <p:spPr>
           <a:xfrm>
             <a:off x="8224344" y="439053"/>
-            <a:ext cx="3444765" cy="6001643"/>
+            <a:ext cx="3444765" cy="6370975"/>
           </a:xfrm>
           <a:prstGeom prst="rect">
             <a:avLst/>
@@ -4991,6 +5874,16 @@
             <a:r>
               <a:rPr lang="en-US" sz="1200" dirty="0"/>
               <a:t>Parameters of the classifier</a:t>
+            </a:r>
+          </a:p>
+          <a:p>
+            <a:pPr marL="285750" indent="-285750">
+              <a:buFont typeface="Arial" panose="020B0604020202020204" pitchFamily="34" charset="0"/>
+              <a:buChar char="•"/>
+            </a:pPr>
+            <a:r>
+              <a:rPr lang="en-US" sz="1200" dirty="0"/>
+              <a:t>TKEO</a:t>
             </a:r>
           </a:p>
           <a:p>
@@ -5016,7 +5909,7 @@
           <a:p>
             <a:r>
               <a:rPr lang="en-US" sz="1200" b="1" dirty="0"/>
-              <a:t>Best online results with: </a:t>
+              <a:t>Best results with: </a:t>
             </a:r>
           </a:p>
           <a:p>
@@ -5087,6 +5980,16 @@
             <a:r>
               <a:rPr lang="en-US" sz="1200" dirty="0"/>
               <a:t>Classifier: RF with 500 estimators. </a:t>
+            </a:r>
+          </a:p>
+          <a:p>
+            <a:pPr marL="171450" indent="-171450">
+              <a:buFont typeface="Arial" panose="020B0604020202020204" pitchFamily="34" charset="0"/>
+              <a:buChar char="•"/>
+            </a:pPr>
+            <a:r>
+              <a:rPr lang="en-US" sz="1200" dirty="0"/>
+              <a:t>TKEO: No</a:t>
             </a:r>
           </a:p>
           <a:p>
@@ -5121,47 +6024,10 @@
       </p:sp>
       <p:sp>
         <p:nvSpPr>
-          <p:cNvPr id="57" name="TextBox 56">
-            <a:extLst>
-              <a:ext uri="{FF2B5EF4-FFF2-40B4-BE49-F238E27FC236}">
-                <a16:creationId xmlns:a16="http://schemas.microsoft.com/office/drawing/2014/main" id="{4BC3D2BF-58B5-9AC3-C83B-5BDBF11072A5}"/>
-              </a:ext>
-            </a:extLst>
-          </p:cNvPr>
-          <p:cNvSpPr txBox="1"/>
-          <p:nvPr/>
-        </p:nvSpPr>
-        <p:spPr>
-          <a:xfrm>
-            <a:off x="793672" y="547298"/>
-            <a:ext cx="2925285" cy="276999"/>
-          </a:xfrm>
-          <a:prstGeom prst="rect">
-            <a:avLst/>
-          </a:prstGeom>
-          <a:noFill/>
-        </p:spPr>
-        <p:txBody>
-          <a:bodyPr wrap="square" rtlCol="0">
-            <a:spAutoFit/>
-          </a:bodyPr>
-          <a:lstStyle/>
-          <a:p>
-            <a:pPr algn="r"/>
-            <a:r>
-              <a:rPr lang="en-US" sz="1200" dirty="0"/>
-              <a:t>Recorded with discrete movements!</a:t>
-            </a:r>
-            <a:endParaRPr lang="en-GB" sz="1200" dirty="0"/>
-          </a:p>
-        </p:txBody>
-      </p:sp>
-      <p:sp>
-        <p:nvSpPr>
           <p:cNvPr id="58" name="Rectangle 1">
             <a:extLst>
               <a:ext uri="{FF2B5EF4-FFF2-40B4-BE49-F238E27FC236}">
-                <a16:creationId xmlns:a16="http://schemas.microsoft.com/office/drawing/2014/main" id="{CF5B14C6-3AE3-55E6-5804-595ECA0E0E33}"/>
+                <a16:creationId xmlns:a16="http://schemas.microsoft.com/office/drawing/2014/main" id="{C6F0E5CB-7C47-AC80-FE35-C6938B85E2DC}"/>
               </a:ext>
             </a:extLst>
           </p:cNvPr>
@@ -5172,8 +6038,8 @@
         </p:nvSpPr>
         <p:spPr bwMode="auto">
           <a:xfrm>
-            <a:off x="0" y="0"/>
-            <a:ext cx="12192000" cy="457200"/>
+            <a:off x="180400" y="162054"/>
+            <a:ext cx="3425553" cy="276999"/>
           </a:xfrm>
           <a:prstGeom prst="rect">
             <a:avLst/>
@@ -5233,7 +6099,7 @@
               <a:tabLst/>
             </a:pPr>
             <a:r>
-              <a:rPr kumimoji="0" lang="en-US" altLang="en-US" sz="900" b="0" i="0" u="none" strike="noStrike" cap="none" normalizeH="0" baseline="0">
+              <a:rPr kumimoji="0" lang="en-US" altLang="en-US" b="1" i="0" u="none" strike="noStrike" cap="none" normalizeH="0" baseline="0" dirty="0">
                 <a:ln>
                   <a:noFill/>
                 </a:ln>
@@ -5243,21 +6109,9 @@
                 <a:effectLst/>
                 <a:latin typeface="menlo"/>
               </a:rPr>
-              <a:t>0.754</a:t>
-            </a:r>
-            <a:r>
-              <a:rPr kumimoji="0" lang="en-US" altLang="en-US" sz="800" b="0" i="0" u="none" strike="noStrike" cap="none" normalizeH="0" baseline="0">
-                <a:ln>
-                  <a:noFill/>
-                </a:ln>
-                <a:solidFill>
-                  <a:schemeClr val="tx1"/>
-                </a:solidFill>
-                <a:effectLst/>
-              </a:rPr>
-              <a:t> </a:t>
-            </a:r>
-            <a:endParaRPr kumimoji="0" lang="en-US" altLang="en-US" sz="1800" b="0" i="0" u="none" strike="noStrike" cap="none" normalizeH="0" baseline="0">
+              <a:t> Recorded with discrete movements</a:t>
+            </a:r>
+            <a:endParaRPr kumimoji="0" lang="en-US" altLang="en-US" sz="4400" b="1" i="0" u="none" strike="noStrike" cap="none" normalizeH="0" baseline="0" dirty="0">
               <a:ln>
                 <a:noFill/>
               </a:ln>
@@ -5273,7 +6127,3083 @@
     </p:spTree>
     <p:extLst>
       <p:ext uri="{BB962C8B-B14F-4D97-AF65-F5344CB8AC3E}">
-        <p14:creationId xmlns:p14="http://schemas.microsoft.com/office/powerpoint/2010/main" val="3849239103"/>
+        <p14:creationId xmlns:p14="http://schemas.microsoft.com/office/powerpoint/2010/main" val="1649257082"/>
+      </p:ext>
+    </p:extLst>
+  </p:cSld>
+  <p:clrMapOvr>
+    <a:masterClrMapping/>
+  </p:clrMapOvr>
+</p:sld>
+</file>
+
+<file path=ppt/slides/slide5.xml><?xml version="1.0" encoding="utf-8"?>
+<p:sld xmlns:a="http://schemas.openxmlformats.org/drawingml/2006/main" xmlns:r="http://schemas.openxmlformats.org/officeDocument/2006/relationships" xmlns:p="http://schemas.openxmlformats.org/presentationml/2006/main">
+  <p:cSld>
+    <p:spTree>
+      <p:nvGrpSpPr>
+        <p:cNvPr id="1" name="">
+          <a:extLst>
+            <a:ext uri="{FF2B5EF4-FFF2-40B4-BE49-F238E27FC236}">
+              <a16:creationId xmlns:a16="http://schemas.microsoft.com/office/drawing/2014/main" id="{1CBA17AF-11B2-EA27-8D90-D3AA7DCD0C50}"/>
+            </a:ext>
+          </a:extLst>
+        </p:cNvPr>
+        <p:cNvGrpSpPr/>
+        <p:nvPr/>
+      </p:nvGrpSpPr>
+      <p:grpSpPr>
+        <a:xfrm>
+          <a:off x="0" y="0"/>
+          <a:ext cx="0" cy="0"/>
+          <a:chOff x="0" y="0"/>
+          <a:chExt cx="0" cy="0"/>
+        </a:xfrm>
+      </p:grpSpPr>
+      <p:sp>
+        <p:nvSpPr>
+          <p:cNvPr id="4" name="Rectangle 3">
+            <a:extLst>
+              <a:ext uri="{FF2B5EF4-FFF2-40B4-BE49-F238E27FC236}">
+                <a16:creationId xmlns:a16="http://schemas.microsoft.com/office/drawing/2014/main" id="{A91EE7DD-A89E-C2E4-19E0-3220EF42D7FE}"/>
+              </a:ext>
+            </a:extLst>
+          </p:cNvPr>
+          <p:cNvSpPr/>
+          <p:nvPr/>
+        </p:nvSpPr>
+        <p:spPr>
+          <a:xfrm>
+            <a:off x="3799490" y="599090"/>
+            <a:ext cx="1150883" cy="173421"/>
+          </a:xfrm>
+          <a:prstGeom prst="rect">
+            <a:avLst/>
+          </a:prstGeom>
+        </p:spPr>
+        <p:style>
+          <a:lnRef idx="2">
+            <a:schemeClr val="accent4">
+              <a:shade val="15000"/>
+            </a:schemeClr>
+          </a:lnRef>
+          <a:fillRef idx="1">
+            <a:schemeClr val="accent4"/>
+          </a:fillRef>
+          <a:effectRef idx="0">
+            <a:schemeClr val="accent4"/>
+          </a:effectRef>
+          <a:fontRef idx="minor">
+            <a:schemeClr val="lt1"/>
+          </a:fontRef>
+        </p:style>
+        <p:txBody>
+          <a:bodyPr rtlCol="0" anchor="ctr"/>
+          <a:lstStyle/>
+          <a:p>
+            <a:pPr algn="ctr"/>
+            <a:r>
+              <a:rPr lang="en-US" sz="1200" dirty="0"/>
+              <a:t>Session1.csv</a:t>
+            </a:r>
+            <a:endParaRPr lang="en-GB" sz="1200" dirty="0"/>
+          </a:p>
+        </p:txBody>
+      </p:sp>
+      <p:sp>
+        <p:nvSpPr>
+          <p:cNvPr id="5" name="Rectangle 4">
+            <a:extLst>
+              <a:ext uri="{FF2B5EF4-FFF2-40B4-BE49-F238E27FC236}">
+                <a16:creationId xmlns:a16="http://schemas.microsoft.com/office/drawing/2014/main" id="{3A3B62D7-B34D-5BBC-C454-D0ED7FA3AF26}"/>
+              </a:ext>
+            </a:extLst>
+          </p:cNvPr>
+          <p:cNvSpPr/>
+          <p:nvPr/>
+        </p:nvSpPr>
+        <p:spPr>
+          <a:xfrm>
+            <a:off x="5205249" y="599090"/>
+            <a:ext cx="1150883" cy="173420"/>
+          </a:xfrm>
+          <a:prstGeom prst="rect">
+            <a:avLst/>
+          </a:prstGeom>
+        </p:spPr>
+        <p:style>
+          <a:lnRef idx="2">
+            <a:schemeClr val="accent4">
+              <a:shade val="15000"/>
+            </a:schemeClr>
+          </a:lnRef>
+          <a:fillRef idx="1">
+            <a:schemeClr val="accent4"/>
+          </a:fillRef>
+          <a:effectRef idx="0">
+            <a:schemeClr val="accent4"/>
+          </a:effectRef>
+          <a:fontRef idx="minor">
+            <a:schemeClr val="lt1"/>
+          </a:fontRef>
+        </p:style>
+        <p:txBody>
+          <a:bodyPr rtlCol="0" anchor="ctr"/>
+          <a:lstStyle/>
+          <a:p>
+            <a:pPr algn="ctr"/>
+            <a:r>
+              <a:rPr lang="en-US" sz="1200" dirty="0"/>
+              <a:t>Session2.csv</a:t>
+            </a:r>
+            <a:endParaRPr lang="en-GB" sz="1200" dirty="0"/>
+          </a:p>
+        </p:txBody>
+      </p:sp>
+      <p:sp>
+        <p:nvSpPr>
+          <p:cNvPr id="6" name="Rectangle 5">
+            <a:extLst>
+              <a:ext uri="{FF2B5EF4-FFF2-40B4-BE49-F238E27FC236}">
+                <a16:creationId xmlns:a16="http://schemas.microsoft.com/office/drawing/2014/main" id="{F9D696A5-E200-6A9A-A1BB-EA424E494CE2}"/>
+              </a:ext>
+            </a:extLst>
+          </p:cNvPr>
+          <p:cNvSpPr/>
+          <p:nvPr/>
+        </p:nvSpPr>
+        <p:spPr>
+          <a:xfrm>
+            <a:off x="6611008" y="599088"/>
+            <a:ext cx="1150883" cy="173421"/>
+          </a:xfrm>
+          <a:prstGeom prst="rect">
+            <a:avLst/>
+          </a:prstGeom>
+        </p:spPr>
+        <p:style>
+          <a:lnRef idx="2">
+            <a:schemeClr val="accent4">
+              <a:shade val="15000"/>
+            </a:schemeClr>
+          </a:lnRef>
+          <a:fillRef idx="1">
+            <a:schemeClr val="accent4"/>
+          </a:fillRef>
+          <a:effectRef idx="0">
+            <a:schemeClr val="accent4"/>
+          </a:effectRef>
+          <a:fontRef idx="minor">
+            <a:schemeClr val="lt1"/>
+          </a:fontRef>
+        </p:style>
+        <p:txBody>
+          <a:bodyPr rtlCol="0" anchor="ctr"/>
+          <a:lstStyle/>
+          <a:p>
+            <a:pPr algn="ctr"/>
+            <a:r>
+              <a:rPr lang="en-US" sz="1200" dirty="0"/>
+              <a:t>Session3.csv</a:t>
+            </a:r>
+            <a:endParaRPr lang="en-GB" sz="1200" dirty="0"/>
+          </a:p>
+        </p:txBody>
+      </p:sp>
+      <p:sp>
+        <p:nvSpPr>
+          <p:cNvPr id="7" name="Rectangle 6">
+            <a:extLst>
+              <a:ext uri="{FF2B5EF4-FFF2-40B4-BE49-F238E27FC236}">
+                <a16:creationId xmlns:a16="http://schemas.microsoft.com/office/drawing/2014/main" id="{29927C8D-3308-3D9C-1068-394A9406DB9C}"/>
+              </a:ext>
+            </a:extLst>
+          </p:cNvPr>
+          <p:cNvSpPr/>
+          <p:nvPr/>
+        </p:nvSpPr>
+        <p:spPr>
+          <a:xfrm>
+            <a:off x="5205249" y="1185041"/>
+            <a:ext cx="1150883" cy="173421"/>
+          </a:xfrm>
+          <a:prstGeom prst="rect">
+            <a:avLst/>
+          </a:prstGeom>
+        </p:spPr>
+        <p:style>
+          <a:lnRef idx="2">
+            <a:schemeClr val="accent6">
+              <a:shade val="15000"/>
+            </a:schemeClr>
+          </a:lnRef>
+          <a:fillRef idx="1">
+            <a:schemeClr val="accent6"/>
+          </a:fillRef>
+          <a:effectRef idx="0">
+            <a:schemeClr val="accent6"/>
+          </a:effectRef>
+          <a:fontRef idx="minor">
+            <a:schemeClr val="lt1"/>
+          </a:fontRef>
+        </p:style>
+        <p:txBody>
+          <a:bodyPr rtlCol="0" anchor="ctr"/>
+          <a:lstStyle/>
+          <a:p>
+            <a:pPr algn="ctr"/>
+            <a:r>
+              <a:rPr lang="en-US" sz="1200" dirty="0"/>
+              <a:t>Combined_df</a:t>
+            </a:r>
+          </a:p>
+        </p:txBody>
+      </p:sp>
+      <p:cxnSp>
+        <p:nvCxnSpPr>
+          <p:cNvPr id="9" name="Straight Arrow Connector 8">
+            <a:extLst>
+              <a:ext uri="{FF2B5EF4-FFF2-40B4-BE49-F238E27FC236}">
+                <a16:creationId xmlns:a16="http://schemas.microsoft.com/office/drawing/2014/main" id="{93EE061C-AC59-2D20-C4EE-D79528A786CA}"/>
+              </a:ext>
+            </a:extLst>
+          </p:cNvPr>
+          <p:cNvCxnSpPr>
+            <a:stCxn id="5" idx="2"/>
+            <a:endCxn id="7" idx="0"/>
+          </p:cNvCxnSpPr>
+          <p:nvPr/>
+        </p:nvCxnSpPr>
+        <p:spPr>
+          <a:xfrm>
+            <a:off x="5780691" y="772510"/>
+            <a:ext cx="0" cy="412531"/>
+          </a:xfrm>
+          <a:prstGeom prst="straightConnector1">
+            <a:avLst/>
+          </a:prstGeom>
+          <a:ln>
+            <a:headEnd type="none" w="med" len="med"/>
+            <a:tailEnd type="none" w="med" len="med"/>
+          </a:ln>
+        </p:spPr>
+        <p:style>
+          <a:lnRef idx="2">
+            <a:schemeClr val="accent1"/>
+          </a:lnRef>
+          <a:fillRef idx="0">
+            <a:schemeClr val="accent1"/>
+          </a:fillRef>
+          <a:effectRef idx="1">
+            <a:schemeClr val="accent1"/>
+          </a:effectRef>
+          <a:fontRef idx="minor">
+            <a:schemeClr val="tx1"/>
+          </a:fontRef>
+        </p:style>
+      </p:cxnSp>
+      <p:sp>
+        <p:nvSpPr>
+          <p:cNvPr id="11" name="Rectangle 10">
+            <a:extLst>
+              <a:ext uri="{FF2B5EF4-FFF2-40B4-BE49-F238E27FC236}">
+                <a16:creationId xmlns:a16="http://schemas.microsoft.com/office/drawing/2014/main" id="{3319B0A3-817F-A14C-DE37-6B1F0FF520C0}"/>
+              </a:ext>
+            </a:extLst>
+          </p:cNvPr>
+          <p:cNvSpPr/>
+          <p:nvPr/>
+        </p:nvSpPr>
+        <p:spPr>
+          <a:xfrm>
+            <a:off x="4188373" y="1873468"/>
+            <a:ext cx="1321675" cy="444063"/>
+          </a:xfrm>
+          <a:prstGeom prst="rect">
+            <a:avLst/>
+          </a:prstGeom>
+        </p:spPr>
+        <p:style>
+          <a:lnRef idx="2">
+            <a:schemeClr val="accent6">
+              <a:shade val="15000"/>
+            </a:schemeClr>
+          </a:lnRef>
+          <a:fillRef idx="1">
+            <a:schemeClr val="accent6"/>
+          </a:fillRef>
+          <a:effectRef idx="0">
+            <a:schemeClr val="accent6"/>
+          </a:effectRef>
+          <a:fontRef idx="minor">
+            <a:schemeClr val="lt1"/>
+          </a:fontRef>
+        </p:style>
+        <p:txBody>
+          <a:bodyPr rtlCol="0" anchor="ctr"/>
+          <a:lstStyle/>
+          <a:p>
+            <a:pPr algn="ctr"/>
+            <a:r>
+              <a:rPr lang="en-US" sz="1200" dirty="0"/>
+              <a:t>Windowed_data</a:t>
+            </a:r>
+          </a:p>
+          <a:p>
+            <a:pPr algn="ctr"/>
+            <a:r>
+              <a:rPr lang="en-US" sz="1200" dirty="0"/>
+              <a:t>(sessions 1,2)</a:t>
+            </a:r>
+          </a:p>
+        </p:txBody>
+      </p:sp>
+      <p:sp>
+        <p:nvSpPr>
+          <p:cNvPr id="12" name="Rectangle 11">
+            <a:extLst>
+              <a:ext uri="{FF2B5EF4-FFF2-40B4-BE49-F238E27FC236}">
+                <a16:creationId xmlns:a16="http://schemas.microsoft.com/office/drawing/2014/main" id="{5A2463F7-682F-F1F6-5FFC-BD808BB6D3EF}"/>
+              </a:ext>
+            </a:extLst>
+          </p:cNvPr>
+          <p:cNvSpPr/>
+          <p:nvPr/>
+        </p:nvSpPr>
+        <p:spPr>
+          <a:xfrm>
+            <a:off x="5841124" y="1873467"/>
+            <a:ext cx="1655379" cy="444063"/>
+          </a:xfrm>
+          <a:prstGeom prst="rect">
+            <a:avLst/>
+          </a:prstGeom>
+        </p:spPr>
+        <p:style>
+          <a:lnRef idx="2">
+            <a:schemeClr val="accent6">
+              <a:shade val="15000"/>
+            </a:schemeClr>
+          </a:lnRef>
+          <a:fillRef idx="1">
+            <a:schemeClr val="accent6"/>
+          </a:fillRef>
+          <a:effectRef idx="0">
+            <a:schemeClr val="accent6"/>
+          </a:effectRef>
+          <a:fontRef idx="minor">
+            <a:schemeClr val="lt1"/>
+          </a:fontRef>
+        </p:style>
+        <p:txBody>
+          <a:bodyPr rtlCol="0" anchor="ctr"/>
+          <a:lstStyle/>
+          <a:p>
+            <a:pPr algn="ctr"/>
+            <a:r>
+              <a:rPr lang="en-US" sz="1200" dirty="0"/>
+              <a:t>Windowed_data_test</a:t>
+            </a:r>
+          </a:p>
+          <a:p>
+            <a:pPr algn="ctr"/>
+            <a:r>
+              <a:rPr lang="en-US" sz="1200" dirty="0"/>
+              <a:t>(session 3)</a:t>
+            </a:r>
+          </a:p>
+        </p:txBody>
+      </p:sp>
+      <p:cxnSp>
+        <p:nvCxnSpPr>
+          <p:cNvPr id="14" name="Straight Arrow Connector 13">
+            <a:extLst>
+              <a:ext uri="{FF2B5EF4-FFF2-40B4-BE49-F238E27FC236}">
+                <a16:creationId xmlns:a16="http://schemas.microsoft.com/office/drawing/2014/main" id="{0CDE787C-CEBC-134C-CA66-68B6C629D3B8}"/>
+              </a:ext>
+            </a:extLst>
+          </p:cNvPr>
+          <p:cNvCxnSpPr>
+            <a:stCxn id="7" idx="2"/>
+            <a:endCxn id="11" idx="0"/>
+          </p:cNvCxnSpPr>
+          <p:nvPr/>
+        </p:nvCxnSpPr>
+        <p:spPr>
+          <a:xfrm flipH="1">
+            <a:off x="4849211" y="1358462"/>
+            <a:ext cx="931480" cy="515006"/>
+          </a:xfrm>
+          <a:prstGeom prst="straightConnector1">
+            <a:avLst/>
+          </a:prstGeom>
+          <a:ln>
+            <a:tailEnd type="triangle"/>
+          </a:ln>
+        </p:spPr>
+        <p:style>
+          <a:lnRef idx="2">
+            <a:schemeClr val="accent1"/>
+          </a:lnRef>
+          <a:fillRef idx="0">
+            <a:schemeClr val="accent1"/>
+          </a:fillRef>
+          <a:effectRef idx="1">
+            <a:schemeClr val="accent1"/>
+          </a:effectRef>
+          <a:fontRef idx="minor">
+            <a:schemeClr val="tx1"/>
+          </a:fontRef>
+        </p:style>
+      </p:cxnSp>
+      <p:cxnSp>
+        <p:nvCxnSpPr>
+          <p:cNvPr id="16" name="Straight Arrow Connector 15">
+            <a:extLst>
+              <a:ext uri="{FF2B5EF4-FFF2-40B4-BE49-F238E27FC236}">
+                <a16:creationId xmlns:a16="http://schemas.microsoft.com/office/drawing/2014/main" id="{8ADD0D05-3A19-CE0A-1FE1-811413303F80}"/>
+              </a:ext>
+            </a:extLst>
+          </p:cNvPr>
+          <p:cNvCxnSpPr>
+            <a:stCxn id="7" idx="2"/>
+            <a:endCxn id="12" idx="0"/>
+          </p:cNvCxnSpPr>
+          <p:nvPr/>
+        </p:nvCxnSpPr>
+        <p:spPr>
+          <a:xfrm>
+            <a:off x="5780691" y="1358462"/>
+            <a:ext cx="888123" cy="515005"/>
+          </a:xfrm>
+          <a:prstGeom prst="straightConnector1">
+            <a:avLst/>
+          </a:prstGeom>
+          <a:ln>
+            <a:tailEnd type="triangle"/>
+          </a:ln>
+        </p:spPr>
+        <p:style>
+          <a:lnRef idx="2">
+            <a:schemeClr val="accent1"/>
+          </a:lnRef>
+          <a:fillRef idx="0">
+            <a:schemeClr val="accent1"/>
+          </a:fillRef>
+          <a:effectRef idx="1">
+            <a:schemeClr val="accent1"/>
+          </a:effectRef>
+          <a:fontRef idx="minor">
+            <a:schemeClr val="tx1"/>
+          </a:fontRef>
+        </p:style>
+      </p:cxnSp>
+      <p:sp>
+        <p:nvSpPr>
+          <p:cNvPr id="17" name="Rectangle 16">
+            <a:extLst>
+              <a:ext uri="{FF2B5EF4-FFF2-40B4-BE49-F238E27FC236}">
+                <a16:creationId xmlns:a16="http://schemas.microsoft.com/office/drawing/2014/main" id="{238B11D1-870B-F53A-D2E4-E7A7780C3A8F}"/>
+              </a:ext>
+            </a:extLst>
+          </p:cNvPr>
+          <p:cNvSpPr/>
+          <p:nvPr/>
+        </p:nvSpPr>
+        <p:spPr>
+          <a:xfrm>
+            <a:off x="4188373" y="2610505"/>
+            <a:ext cx="1321675" cy="444063"/>
+          </a:xfrm>
+          <a:prstGeom prst="rect">
+            <a:avLst/>
+          </a:prstGeom>
+        </p:spPr>
+        <p:style>
+          <a:lnRef idx="2">
+            <a:schemeClr val="accent6">
+              <a:shade val="15000"/>
+            </a:schemeClr>
+          </a:lnRef>
+          <a:fillRef idx="1">
+            <a:schemeClr val="accent6"/>
+          </a:fillRef>
+          <a:effectRef idx="0">
+            <a:schemeClr val="accent6"/>
+          </a:effectRef>
+          <a:fontRef idx="minor">
+            <a:schemeClr val="lt1"/>
+          </a:fontRef>
+        </p:style>
+        <p:txBody>
+          <a:bodyPr rtlCol="0" anchor="ctr"/>
+          <a:lstStyle/>
+          <a:p>
+            <a:pPr algn="ctr"/>
+            <a:r>
+              <a:rPr lang="en-US" sz="1200" dirty="0"/>
+              <a:t>Filtered</a:t>
+            </a:r>
+          </a:p>
+        </p:txBody>
+      </p:sp>
+      <p:sp>
+        <p:nvSpPr>
+          <p:cNvPr id="18" name="Rectangle 17">
+            <a:extLst>
+              <a:ext uri="{FF2B5EF4-FFF2-40B4-BE49-F238E27FC236}">
+                <a16:creationId xmlns:a16="http://schemas.microsoft.com/office/drawing/2014/main" id="{E1952424-7AEF-4057-B7E6-255DE962B849}"/>
+              </a:ext>
+            </a:extLst>
+          </p:cNvPr>
+          <p:cNvSpPr/>
+          <p:nvPr/>
+        </p:nvSpPr>
+        <p:spPr>
+          <a:xfrm>
+            <a:off x="6007975" y="2596051"/>
+            <a:ext cx="1321675" cy="444063"/>
+          </a:xfrm>
+          <a:prstGeom prst="rect">
+            <a:avLst/>
+          </a:prstGeom>
+        </p:spPr>
+        <p:style>
+          <a:lnRef idx="2">
+            <a:schemeClr val="accent6">
+              <a:shade val="15000"/>
+            </a:schemeClr>
+          </a:lnRef>
+          <a:fillRef idx="1">
+            <a:schemeClr val="accent6"/>
+          </a:fillRef>
+          <a:effectRef idx="0">
+            <a:schemeClr val="accent6"/>
+          </a:effectRef>
+          <a:fontRef idx="minor">
+            <a:schemeClr val="lt1"/>
+          </a:fontRef>
+        </p:style>
+        <p:txBody>
+          <a:bodyPr rtlCol="0" anchor="ctr"/>
+          <a:lstStyle/>
+          <a:p>
+            <a:pPr algn="ctr"/>
+            <a:r>
+              <a:rPr lang="en-US" sz="1200" dirty="0"/>
+              <a:t>Filtered_test</a:t>
+            </a:r>
+          </a:p>
+        </p:txBody>
+      </p:sp>
+      <p:sp>
+        <p:nvSpPr>
+          <p:cNvPr id="19" name="Rectangle 18">
+            <a:extLst>
+              <a:ext uri="{FF2B5EF4-FFF2-40B4-BE49-F238E27FC236}">
+                <a16:creationId xmlns:a16="http://schemas.microsoft.com/office/drawing/2014/main" id="{5AA585F5-20FF-FB91-FE2D-7D0C57613978}"/>
+              </a:ext>
+            </a:extLst>
+          </p:cNvPr>
+          <p:cNvSpPr/>
+          <p:nvPr/>
+        </p:nvSpPr>
+        <p:spPr>
+          <a:xfrm>
+            <a:off x="4188373" y="3347542"/>
+            <a:ext cx="1321675" cy="444063"/>
+          </a:xfrm>
+          <a:prstGeom prst="rect">
+            <a:avLst/>
+          </a:prstGeom>
+        </p:spPr>
+        <p:style>
+          <a:lnRef idx="2">
+            <a:schemeClr val="accent5">
+              <a:shade val="15000"/>
+            </a:schemeClr>
+          </a:lnRef>
+          <a:fillRef idx="1">
+            <a:schemeClr val="accent5"/>
+          </a:fillRef>
+          <a:effectRef idx="0">
+            <a:schemeClr val="accent5"/>
+          </a:effectRef>
+          <a:fontRef idx="minor">
+            <a:schemeClr val="lt1"/>
+          </a:fontRef>
+        </p:style>
+        <p:txBody>
+          <a:bodyPr rtlCol="0" anchor="ctr"/>
+          <a:lstStyle/>
+          <a:p>
+            <a:pPr algn="ctr"/>
+            <a:r>
+              <a:rPr lang="en-US" sz="1200" dirty="0"/>
+              <a:t>X, y</a:t>
+            </a:r>
+          </a:p>
+        </p:txBody>
+      </p:sp>
+      <p:sp>
+        <p:nvSpPr>
+          <p:cNvPr id="20" name="Rectangle 19">
+            <a:extLst>
+              <a:ext uri="{FF2B5EF4-FFF2-40B4-BE49-F238E27FC236}">
+                <a16:creationId xmlns:a16="http://schemas.microsoft.com/office/drawing/2014/main" id="{343656E5-B29C-62F0-0BD1-5CEACA38381B}"/>
+              </a:ext>
+            </a:extLst>
+          </p:cNvPr>
+          <p:cNvSpPr/>
+          <p:nvPr/>
+        </p:nvSpPr>
+        <p:spPr>
+          <a:xfrm>
+            <a:off x="6007975" y="3347542"/>
+            <a:ext cx="1321675" cy="444063"/>
+          </a:xfrm>
+          <a:prstGeom prst="rect">
+            <a:avLst/>
+          </a:prstGeom>
+        </p:spPr>
+        <p:style>
+          <a:lnRef idx="2">
+            <a:schemeClr val="accent5">
+              <a:shade val="15000"/>
+            </a:schemeClr>
+          </a:lnRef>
+          <a:fillRef idx="1">
+            <a:schemeClr val="accent5"/>
+          </a:fillRef>
+          <a:effectRef idx="0">
+            <a:schemeClr val="accent5"/>
+          </a:effectRef>
+          <a:fontRef idx="minor">
+            <a:schemeClr val="lt1"/>
+          </a:fontRef>
+        </p:style>
+        <p:txBody>
+          <a:bodyPr rtlCol="0" anchor="ctr"/>
+          <a:lstStyle/>
+          <a:p>
+            <a:pPr algn="ctr"/>
+            <a:r>
+              <a:rPr lang="en-US" sz="1200" dirty="0"/>
+              <a:t>Xt, yt</a:t>
+            </a:r>
+          </a:p>
+        </p:txBody>
+      </p:sp>
+      <p:cxnSp>
+        <p:nvCxnSpPr>
+          <p:cNvPr id="22" name="Straight Arrow Connector 21">
+            <a:extLst>
+              <a:ext uri="{FF2B5EF4-FFF2-40B4-BE49-F238E27FC236}">
+                <a16:creationId xmlns:a16="http://schemas.microsoft.com/office/drawing/2014/main" id="{86F5A00A-1A95-016F-2A1D-37025A477766}"/>
+              </a:ext>
+            </a:extLst>
+          </p:cNvPr>
+          <p:cNvCxnSpPr>
+            <a:stCxn id="11" idx="2"/>
+            <a:endCxn id="17" idx="0"/>
+          </p:cNvCxnSpPr>
+          <p:nvPr/>
+        </p:nvCxnSpPr>
+        <p:spPr>
+          <a:xfrm>
+            <a:off x="4849211" y="2317531"/>
+            <a:ext cx="0" cy="292974"/>
+          </a:xfrm>
+          <a:prstGeom prst="straightConnector1">
+            <a:avLst/>
+          </a:prstGeom>
+          <a:ln>
+            <a:tailEnd type="triangle"/>
+          </a:ln>
+        </p:spPr>
+        <p:style>
+          <a:lnRef idx="2">
+            <a:schemeClr val="accent1"/>
+          </a:lnRef>
+          <a:fillRef idx="0">
+            <a:schemeClr val="accent1"/>
+          </a:fillRef>
+          <a:effectRef idx="1">
+            <a:schemeClr val="accent1"/>
+          </a:effectRef>
+          <a:fontRef idx="minor">
+            <a:schemeClr val="tx1"/>
+          </a:fontRef>
+        </p:style>
+      </p:cxnSp>
+      <p:cxnSp>
+        <p:nvCxnSpPr>
+          <p:cNvPr id="24" name="Straight Arrow Connector 23">
+            <a:extLst>
+              <a:ext uri="{FF2B5EF4-FFF2-40B4-BE49-F238E27FC236}">
+                <a16:creationId xmlns:a16="http://schemas.microsoft.com/office/drawing/2014/main" id="{AD6560E0-C1AD-C4AC-A529-24D8F0A373BB}"/>
+              </a:ext>
+            </a:extLst>
+          </p:cNvPr>
+          <p:cNvCxnSpPr>
+            <a:stCxn id="17" idx="2"/>
+            <a:endCxn id="19" idx="0"/>
+          </p:cNvCxnSpPr>
+          <p:nvPr/>
+        </p:nvCxnSpPr>
+        <p:spPr>
+          <a:xfrm>
+            <a:off x="4849211" y="3054568"/>
+            <a:ext cx="0" cy="292974"/>
+          </a:xfrm>
+          <a:prstGeom prst="straightConnector1">
+            <a:avLst/>
+          </a:prstGeom>
+          <a:ln>
+            <a:tailEnd type="triangle"/>
+          </a:ln>
+        </p:spPr>
+        <p:style>
+          <a:lnRef idx="2">
+            <a:schemeClr val="accent1"/>
+          </a:lnRef>
+          <a:fillRef idx="0">
+            <a:schemeClr val="accent1"/>
+          </a:fillRef>
+          <a:effectRef idx="1">
+            <a:schemeClr val="accent1"/>
+          </a:effectRef>
+          <a:fontRef idx="minor">
+            <a:schemeClr val="tx1"/>
+          </a:fontRef>
+        </p:style>
+      </p:cxnSp>
+      <p:cxnSp>
+        <p:nvCxnSpPr>
+          <p:cNvPr id="26" name="Straight Arrow Connector 25">
+            <a:extLst>
+              <a:ext uri="{FF2B5EF4-FFF2-40B4-BE49-F238E27FC236}">
+                <a16:creationId xmlns:a16="http://schemas.microsoft.com/office/drawing/2014/main" id="{C18952BD-3367-D59F-1AC2-4256EA3F66CD}"/>
+              </a:ext>
+            </a:extLst>
+          </p:cNvPr>
+          <p:cNvCxnSpPr>
+            <a:stCxn id="12" idx="2"/>
+            <a:endCxn id="18" idx="0"/>
+          </p:cNvCxnSpPr>
+          <p:nvPr/>
+        </p:nvCxnSpPr>
+        <p:spPr>
+          <a:xfrm flipH="1">
+            <a:off x="6668813" y="2317530"/>
+            <a:ext cx="1" cy="278521"/>
+          </a:xfrm>
+          <a:prstGeom prst="straightConnector1">
+            <a:avLst/>
+          </a:prstGeom>
+          <a:ln>
+            <a:tailEnd type="triangle"/>
+          </a:ln>
+        </p:spPr>
+        <p:style>
+          <a:lnRef idx="2">
+            <a:schemeClr val="accent1"/>
+          </a:lnRef>
+          <a:fillRef idx="0">
+            <a:schemeClr val="accent1"/>
+          </a:fillRef>
+          <a:effectRef idx="1">
+            <a:schemeClr val="accent1"/>
+          </a:effectRef>
+          <a:fontRef idx="minor">
+            <a:schemeClr val="tx1"/>
+          </a:fontRef>
+        </p:style>
+      </p:cxnSp>
+      <p:cxnSp>
+        <p:nvCxnSpPr>
+          <p:cNvPr id="28" name="Straight Arrow Connector 27">
+            <a:extLst>
+              <a:ext uri="{FF2B5EF4-FFF2-40B4-BE49-F238E27FC236}">
+                <a16:creationId xmlns:a16="http://schemas.microsoft.com/office/drawing/2014/main" id="{D20A7FB7-2213-480E-2069-57C375DC0452}"/>
+              </a:ext>
+            </a:extLst>
+          </p:cNvPr>
+          <p:cNvCxnSpPr>
+            <a:stCxn id="18" idx="2"/>
+            <a:endCxn id="20" idx="0"/>
+          </p:cNvCxnSpPr>
+          <p:nvPr/>
+        </p:nvCxnSpPr>
+        <p:spPr>
+          <a:xfrm>
+            <a:off x="6668813" y="3040114"/>
+            <a:ext cx="0" cy="307428"/>
+          </a:xfrm>
+          <a:prstGeom prst="straightConnector1">
+            <a:avLst/>
+          </a:prstGeom>
+          <a:ln>
+            <a:tailEnd type="triangle"/>
+          </a:ln>
+        </p:spPr>
+        <p:style>
+          <a:lnRef idx="2">
+            <a:schemeClr val="accent1"/>
+          </a:lnRef>
+          <a:fillRef idx="0">
+            <a:schemeClr val="accent1"/>
+          </a:fillRef>
+          <a:effectRef idx="1">
+            <a:schemeClr val="accent1"/>
+          </a:effectRef>
+          <a:fontRef idx="minor">
+            <a:schemeClr val="tx1"/>
+          </a:fontRef>
+        </p:style>
+      </p:cxnSp>
+      <p:sp>
+        <p:nvSpPr>
+          <p:cNvPr id="29" name="TextBox 28">
+            <a:extLst>
+              <a:ext uri="{FF2B5EF4-FFF2-40B4-BE49-F238E27FC236}">
+                <a16:creationId xmlns:a16="http://schemas.microsoft.com/office/drawing/2014/main" id="{C83724F8-19B4-CB31-35FB-16D8BC24FCEB}"/>
+              </a:ext>
+            </a:extLst>
+          </p:cNvPr>
+          <p:cNvSpPr txBox="1"/>
+          <p:nvPr/>
+        </p:nvSpPr>
+        <p:spPr>
+          <a:xfrm>
+            <a:off x="2649920" y="3439875"/>
+            <a:ext cx="2199290" cy="276999"/>
+          </a:xfrm>
+          <a:prstGeom prst="rect">
+            <a:avLst/>
+          </a:prstGeom>
+          <a:noFill/>
+        </p:spPr>
+        <p:txBody>
+          <a:bodyPr wrap="square" rtlCol="0">
+            <a:spAutoFit/>
+          </a:bodyPr>
+          <a:lstStyle/>
+          <a:p>
+            <a:r>
+              <a:rPr lang="en-US" sz="1200" dirty="0"/>
+              <a:t>X: features, y: labels</a:t>
+            </a:r>
+            <a:endParaRPr lang="en-GB" sz="1200" dirty="0"/>
+          </a:p>
+        </p:txBody>
+      </p:sp>
+      <p:sp>
+        <p:nvSpPr>
+          <p:cNvPr id="31" name="Rectangle 30">
+            <a:extLst>
+              <a:ext uri="{FF2B5EF4-FFF2-40B4-BE49-F238E27FC236}">
+                <a16:creationId xmlns:a16="http://schemas.microsoft.com/office/drawing/2014/main" id="{FBBCF022-FB7F-8DCC-D8F7-BE852793EDDD}"/>
+              </a:ext>
+            </a:extLst>
+          </p:cNvPr>
+          <p:cNvSpPr/>
+          <p:nvPr/>
+        </p:nvSpPr>
+        <p:spPr>
+          <a:xfrm>
+            <a:off x="4188373" y="4135051"/>
+            <a:ext cx="1321675" cy="444063"/>
+          </a:xfrm>
+          <a:prstGeom prst="rect">
+            <a:avLst/>
+          </a:prstGeom>
+        </p:spPr>
+        <p:style>
+          <a:lnRef idx="2">
+            <a:schemeClr val="accent5">
+              <a:shade val="15000"/>
+            </a:schemeClr>
+          </a:lnRef>
+          <a:fillRef idx="1">
+            <a:schemeClr val="accent5"/>
+          </a:fillRef>
+          <a:effectRef idx="0">
+            <a:schemeClr val="accent5"/>
+          </a:effectRef>
+          <a:fontRef idx="minor">
+            <a:schemeClr val="lt1"/>
+          </a:fontRef>
+        </p:style>
+        <p:txBody>
+          <a:bodyPr rtlCol="0" anchor="ctr"/>
+          <a:lstStyle/>
+          <a:p>
+            <a:pPr algn="ctr"/>
+            <a:r>
+              <a:rPr lang="en-US" sz="1200" dirty="0"/>
+              <a:t>X_train, X_test, y_train, y_test</a:t>
+            </a:r>
+          </a:p>
+        </p:txBody>
+      </p:sp>
+      <p:cxnSp>
+        <p:nvCxnSpPr>
+          <p:cNvPr id="33" name="Straight Arrow Connector 32">
+            <a:extLst>
+              <a:ext uri="{FF2B5EF4-FFF2-40B4-BE49-F238E27FC236}">
+                <a16:creationId xmlns:a16="http://schemas.microsoft.com/office/drawing/2014/main" id="{0510C69C-7E32-0DAD-1AAA-71A33E2E3E1F}"/>
+              </a:ext>
+            </a:extLst>
+          </p:cNvPr>
+          <p:cNvCxnSpPr>
+            <a:stCxn id="19" idx="2"/>
+            <a:endCxn id="31" idx="0"/>
+          </p:cNvCxnSpPr>
+          <p:nvPr/>
+        </p:nvCxnSpPr>
+        <p:spPr>
+          <a:xfrm>
+            <a:off x="4849211" y="3791605"/>
+            <a:ext cx="0" cy="343446"/>
+          </a:xfrm>
+          <a:prstGeom prst="straightConnector1">
+            <a:avLst/>
+          </a:prstGeom>
+          <a:ln>
+            <a:tailEnd type="triangle"/>
+          </a:ln>
+        </p:spPr>
+        <p:style>
+          <a:lnRef idx="2">
+            <a:schemeClr val="accent1"/>
+          </a:lnRef>
+          <a:fillRef idx="0">
+            <a:schemeClr val="accent1"/>
+          </a:fillRef>
+          <a:effectRef idx="1">
+            <a:schemeClr val="accent1"/>
+          </a:effectRef>
+          <a:fontRef idx="minor">
+            <a:schemeClr val="tx1"/>
+          </a:fontRef>
+        </p:style>
+      </p:cxnSp>
+      <p:sp>
+        <p:nvSpPr>
+          <p:cNvPr id="34" name="Rectangle 33">
+            <a:extLst>
+              <a:ext uri="{FF2B5EF4-FFF2-40B4-BE49-F238E27FC236}">
+                <a16:creationId xmlns:a16="http://schemas.microsoft.com/office/drawing/2014/main" id="{54D2B70F-D07D-D80D-D9CE-C10866F72311}"/>
+              </a:ext>
+            </a:extLst>
+          </p:cNvPr>
+          <p:cNvSpPr/>
+          <p:nvPr/>
+        </p:nvSpPr>
+        <p:spPr>
+          <a:xfrm>
+            <a:off x="4188373" y="4922560"/>
+            <a:ext cx="1321675" cy="444063"/>
+          </a:xfrm>
+          <a:prstGeom prst="rect">
+            <a:avLst/>
+          </a:prstGeom>
+        </p:spPr>
+        <p:style>
+          <a:lnRef idx="2">
+            <a:schemeClr val="accent5">
+              <a:shade val="15000"/>
+            </a:schemeClr>
+          </a:lnRef>
+          <a:fillRef idx="1">
+            <a:schemeClr val="accent5"/>
+          </a:fillRef>
+          <a:effectRef idx="0">
+            <a:schemeClr val="accent5"/>
+          </a:effectRef>
+          <a:fontRef idx="minor">
+            <a:schemeClr val="lt1"/>
+          </a:fontRef>
+        </p:style>
+        <p:txBody>
+          <a:bodyPr rtlCol="0" anchor="ctr"/>
+          <a:lstStyle/>
+          <a:p>
+            <a:pPr algn="ctr"/>
+            <a:r>
+              <a:rPr lang="en-US" sz="1200" dirty="0"/>
+              <a:t>Trained Random Forest classifier</a:t>
+            </a:r>
+          </a:p>
+        </p:txBody>
+      </p:sp>
+      <p:cxnSp>
+        <p:nvCxnSpPr>
+          <p:cNvPr id="36" name="Straight Arrow Connector 35">
+            <a:extLst>
+              <a:ext uri="{FF2B5EF4-FFF2-40B4-BE49-F238E27FC236}">
+                <a16:creationId xmlns:a16="http://schemas.microsoft.com/office/drawing/2014/main" id="{E6D63579-FE4C-A62E-2D91-6180A3F3103F}"/>
+              </a:ext>
+            </a:extLst>
+          </p:cNvPr>
+          <p:cNvCxnSpPr>
+            <a:stCxn id="31" idx="2"/>
+            <a:endCxn id="34" idx="0"/>
+          </p:cNvCxnSpPr>
+          <p:nvPr/>
+        </p:nvCxnSpPr>
+        <p:spPr>
+          <a:xfrm>
+            <a:off x="4849211" y="4579114"/>
+            <a:ext cx="0" cy="343446"/>
+          </a:xfrm>
+          <a:prstGeom prst="straightConnector1">
+            <a:avLst/>
+          </a:prstGeom>
+          <a:ln>
+            <a:tailEnd type="triangle"/>
+          </a:ln>
+        </p:spPr>
+        <p:style>
+          <a:lnRef idx="2">
+            <a:schemeClr val="accent1"/>
+          </a:lnRef>
+          <a:fillRef idx="0">
+            <a:schemeClr val="accent1"/>
+          </a:fillRef>
+          <a:effectRef idx="1">
+            <a:schemeClr val="accent1"/>
+          </a:effectRef>
+          <a:fontRef idx="minor">
+            <a:schemeClr val="tx1"/>
+          </a:fontRef>
+        </p:style>
+      </p:cxnSp>
+      <p:cxnSp>
+        <p:nvCxnSpPr>
+          <p:cNvPr id="38" name="Straight Arrow Connector 37">
+            <a:extLst>
+              <a:ext uri="{FF2B5EF4-FFF2-40B4-BE49-F238E27FC236}">
+                <a16:creationId xmlns:a16="http://schemas.microsoft.com/office/drawing/2014/main" id="{BD95EE96-D84F-18E6-1AD2-6A284DA022A4}"/>
+              </a:ext>
+            </a:extLst>
+          </p:cNvPr>
+          <p:cNvCxnSpPr>
+            <a:stCxn id="20" idx="2"/>
+            <a:endCxn id="34" idx="3"/>
+          </p:cNvCxnSpPr>
+          <p:nvPr/>
+        </p:nvCxnSpPr>
+        <p:spPr>
+          <a:xfrm flipH="1">
+            <a:off x="5510048" y="3791605"/>
+            <a:ext cx="1158765" cy="1352987"/>
+          </a:xfrm>
+          <a:prstGeom prst="straightConnector1">
+            <a:avLst/>
+          </a:prstGeom>
+          <a:ln>
+            <a:tailEnd type="triangle"/>
+          </a:ln>
+        </p:spPr>
+        <p:style>
+          <a:lnRef idx="2">
+            <a:schemeClr val="accent1"/>
+          </a:lnRef>
+          <a:fillRef idx="0">
+            <a:schemeClr val="accent1"/>
+          </a:fillRef>
+          <a:effectRef idx="1">
+            <a:schemeClr val="accent1"/>
+          </a:effectRef>
+          <a:fontRef idx="minor">
+            <a:schemeClr val="tx1"/>
+          </a:fontRef>
+        </p:style>
+      </p:cxnSp>
+      <p:sp>
+        <p:nvSpPr>
+          <p:cNvPr id="39" name="TextBox 38">
+            <a:extLst>
+              <a:ext uri="{FF2B5EF4-FFF2-40B4-BE49-F238E27FC236}">
+                <a16:creationId xmlns:a16="http://schemas.microsoft.com/office/drawing/2014/main" id="{406C25F6-E41C-25AA-C47F-EAD3F12B4F41}"/>
+              </a:ext>
+            </a:extLst>
+          </p:cNvPr>
+          <p:cNvSpPr txBox="1"/>
+          <p:nvPr/>
+        </p:nvSpPr>
+        <p:spPr>
+          <a:xfrm>
+            <a:off x="2519858" y="5857653"/>
+            <a:ext cx="2430516" cy="830997"/>
+          </a:xfrm>
+          <a:prstGeom prst="rect">
+            <a:avLst/>
+          </a:prstGeom>
+          <a:noFill/>
+        </p:spPr>
+        <p:txBody>
+          <a:bodyPr wrap="square" rtlCol="0">
+            <a:spAutoFit/>
+          </a:bodyPr>
+          <a:lstStyle/>
+          <a:p>
+            <a:pPr algn="ctr"/>
+            <a:r>
+              <a:rPr lang="en-US" sz="1200" dirty="0"/>
+              <a:t>Accuracy with X_test and y_test: </a:t>
+            </a:r>
+          </a:p>
+          <a:p>
+            <a:pPr algn="ctr"/>
+            <a:r>
+              <a:rPr lang="en-US" sz="1200" b="1" dirty="0"/>
+              <a:t>0,853</a:t>
+            </a:r>
+          </a:p>
+          <a:p>
+            <a:pPr algn="ctr"/>
+            <a:r>
+              <a:rPr lang="en-US" sz="1200" dirty="0"/>
+              <a:t>Cross val. Mean accuracy = </a:t>
+            </a:r>
+          </a:p>
+          <a:p>
+            <a:pPr algn="ctr"/>
+            <a:r>
+              <a:rPr lang="en-US" sz="1200" b="1" dirty="0"/>
+              <a:t>0,844 (std 0,015)</a:t>
+            </a:r>
+            <a:endParaRPr lang="en-GB" sz="1200" b="1" dirty="0"/>
+          </a:p>
+        </p:txBody>
+      </p:sp>
+      <p:cxnSp>
+        <p:nvCxnSpPr>
+          <p:cNvPr id="41" name="Straight Arrow Connector 40">
+            <a:extLst>
+              <a:ext uri="{FF2B5EF4-FFF2-40B4-BE49-F238E27FC236}">
+                <a16:creationId xmlns:a16="http://schemas.microsoft.com/office/drawing/2014/main" id="{8BD5D2CF-67CA-1C47-3D68-1E3BB8ED5075}"/>
+              </a:ext>
+            </a:extLst>
+          </p:cNvPr>
+          <p:cNvCxnSpPr>
+            <a:cxnSpLocks/>
+            <a:stCxn id="34" idx="2"/>
+            <a:endCxn id="39" idx="0"/>
+          </p:cNvCxnSpPr>
+          <p:nvPr/>
+        </p:nvCxnSpPr>
+        <p:spPr>
+          <a:xfrm flipH="1">
+            <a:off x="3735116" y="5366623"/>
+            <a:ext cx="1114095" cy="491030"/>
+          </a:xfrm>
+          <a:prstGeom prst="straightConnector1">
+            <a:avLst/>
+          </a:prstGeom>
+          <a:ln>
+            <a:tailEnd type="triangle"/>
+          </a:ln>
+        </p:spPr>
+        <p:style>
+          <a:lnRef idx="2">
+            <a:schemeClr val="accent1"/>
+          </a:lnRef>
+          <a:fillRef idx="0">
+            <a:schemeClr val="accent1"/>
+          </a:fillRef>
+          <a:effectRef idx="1">
+            <a:schemeClr val="accent1"/>
+          </a:effectRef>
+          <a:fontRef idx="minor">
+            <a:schemeClr val="tx1"/>
+          </a:fontRef>
+        </p:style>
+      </p:cxnSp>
+      <p:cxnSp>
+        <p:nvCxnSpPr>
+          <p:cNvPr id="44" name="Straight Arrow Connector 43">
+            <a:extLst>
+              <a:ext uri="{FF2B5EF4-FFF2-40B4-BE49-F238E27FC236}">
+                <a16:creationId xmlns:a16="http://schemas.microsoft.com/office/drawing/2014/main" id="{48096955-2019-07EE-99B8-F4EF43B10FF4}"/>
+              </a:ext>
+            </a:extLst>
+          </p:cNvPr>
+          <p:cNvCxnSpPr>
+            <a:stCxn id="6" idx="2"/>
+            <a:endCxn id="7" idx="0"/>
+          </p:cNvCxnSpPr>
+          <p:nvPr/>
+        </p:nvCxnSpPr>
+        <p:spPr>
+          <a:xfrm flipH="1">
+            <a:off x="5780691" y="772509"/>
+            <a:ext cx="1405759" cy="412532"/>
+          </a:xfrm>
+          <a:prstGeom prst="straightConnector1">
+            <a:avLst/>
+          </a:prstGeom>
+          <a:ln>
+            <a:headEnd type="none" w="med" len="med"/>
+            <a:tailEnd type="none" w="med" len="med"/>
+          </a:ln>
+        </p:spPr>
+        <p:style>
+          <a:lnRef idx="2">
+            <a:schemeClr val="accent1"/>
+          </a:lnRef>
+          <a:fillRef idx="0">
+            <a:schemeClr val="accent1"/>
+          </a:fillRef>
+          <a:effectRef idx="1">
+            <a:schemeClr val="accent1"/>
+          </a:effectRef>
+          <a:fontRef idx="minor">
+            <a:schemeClr val="tx1"/>
+          </a:fontRef>
+        </p:style>
+      </p:cxnSp>
+      <p:cxnSp>
+        <p:nvCxnSpPr>
+          <p:cNvPr id="46" name="Straight Arrow Connector 45">
+            <a:extLst>
+              <a:ext uri="{FF2B5EF4-FFF2-40B4-BE49-F238E27FC236}">
+                <a16:creationId xmlns:a16="http://schemas.microsoft.com/office/drawing/2014/main" id="{5A438258-D611-62F9-C41B-A35F81F6481B}"/>
+              </a:ext>
+            </a:extLst>
+          </p:cNvPr>
+          <p:cNvCxnSpPr>
+            <a:stCxn id="4" idx="2"/>
+            <a:endCxn id="7" idx="0"/>
+          </p:cNvCxnSpPr>
+          <p:nvPr/>
+        </p:nvCxnSpPr>
+        <p:spPr>
+          <a:xfrm>
+            <a:off x="4374932" y="772511"/>
+            <a:ext cx="1405759" cy="412530"/>
+          </a:xfrm>
+          <a:prstGeom prst="straightConnector1">
+            <a:avLst/>
+          </a:prstGeom>
+          <a:ln>
+            <a:headEnd type="none" w="med" len="med"/>
+            <a:tailEnd type="none" w="med" len="med"/>
+          </a:ln>
+        </p:spPr>
+        <p:style>
+          <a:lnRef idx="2">
+            <a:schemeClr val="accent1"/>
+          </a:lnRef>
+          <a:fillRef idx="0">
+            <a:schemeClr val="accent1"/>
+          </a:fillRef>
+          <a:effectRef idx="1">
+            <a:schemeClr val="accent1"/>
+          </a:effectRef>
+          <a:fontRef idx="minor">
+            <a:schemeClr val="tx1"/>
+          </a:fontRef>
+        </p:style>
+      </p:cxnSp>
+      <p:sp>
+        <p:nvSpPr>
+          <p:cNvPr id="48" name="TextBox 47">
+            <a:extLst>
+              <a:ext uri="{FF2B5EF4-FFF2-40B4-BE49-F238E27FC236}">
+                <a16:creationId xmlns:a16="http://schemas.microsoft.com/office/drawing/2014/main" id="{E2347AF8-05DA-F510-95A2-E6A2014C5124}"/>
+              </a:ext>
+            </a:extLst>
+          </p:cNvPr>
+          <p:cNvSpPr txBox="1"/>
+          <p:nvPr/>
+        </p:nvSpPr>
+        <p:spPr>
+          <a:xfrm>
+            <a:off x="4987159" y="5857653"/>
+            <a:ext cx="1815662" cy="461665"/>
+          </a:xfrm>
+          <a:prstGeom prst="rect">
+            <a:avLst/>
+          </a:prstGeom>
+          <a:noFill/>
+        </p:spPr>
+        <p:txBody>
+          <a:bodyPr wrap="square" rtlCol="0">
+            <a:spAutoFit/>
+          </a:bodyPr>
+          <a:lstStyle/>
+          <a:p>
+            <a:pPr algn="ctr"/>
+            <a:r>
+              <a:rPr lang="en-US" sz="1200" dirty="0"/>
+              <a:t>Accuracy with Xt and yt: </a:t>
+            </a:r>
+            <a:r>
+              <a:rPr lang="en-US" sz="1200" b="1" dirty="0"/>
+              <a:t>0,810</a:t>
+            </a:r>
+            <a:endParaRPr lang="en-GB" sz="1200" b="1" dirty="0"/>
+          </a:p>
+        </p:txBody>
+      </p:sp>
+      <p:cxnSp>
+        <p:nvCxnSpPr>
+          <p:cNvPr id="50" name="Straight Arrow Connector 49">
+            <a:extLst>
+              <a:ext uri="{FF2B5EF4-FFF2-40B4-BE49-F238E27FC236}">
+                <a16:creationId xmlns:a16="http://schemas.microsoft.com/office/drawing/2014/main" id="{A85E6CBE-96CF-ABE5-D2CA-91932D1273B8}"/>
+              </a:ext>
+            </a:extLst>
+          </p:cNvPr>
+          <p:cNvCxnSpPr>
+            <a:stCxn id="34" idx="2"/>
+            <a:endCxn id="48" idx="0"/>
+          </p:cNvCxnSpPr>
+          <p:nvPr/>
+        </p:nvCxnSpPr>
+        <p:spPr>
+          <a:xfrm>
+            <a:off x="4849211" y="5366623"/>
+            <a:ext cx="1045779" cy="491030"/>
+          </a:xfrm>
+          <a:prstGeom prst="straightConnector1">
+            <a:avLst/>
+          </a:prstGeom>
+          <a:ln>
+            <a:tailEnd type="triangle"/>
+          </a:ln>
+        </p:spPr>
+        <p:style>
+          <a:lnRef idx="2">
+            <a:schemeClr val="accent1"/>
+          </a:lnRef>
+          <a:fillRef idx="0">
+            <a:schemeClr val="accent1"/>
+          </a:fillRef>
+          <a:effectRef idx="1">
+            <a:schemeClr val="accent1"/>
+          </a:effectRef>
+          <a:fontRef idx="minor">
+            <a:schemeClr val="tx1"/>
+          </a:fontRef>
+        </p:style>
+      </p:cxnSp>
+      <p:sp>
+        <p:nvSpPr>
+          <p:cNvPr id="51" name="TextBox 50">
+            <a:extLst>
+              <a:ext uri="{FF2B5EF4-FFF2-40B4-BE49-F238E27FC236}">
+                <a16:creationId xmlns:a16="http://schemas.microsoft.com/office/drawing/2014/main" id="{F33DCD54-E6A1-A5BE-435E-EC758E3137E8}"/>
+              </a:ext>
+            </a:extLst>
+          </p:cNvPr>
+          <p:cNvSpPr txBox="1"/>
+          <p:nvPr/>
+        </p:nvSpPr>
+        <p:spPr>
+          <a:xfrm>
+            <a:off x="2307023" y="2601510"/>
+            <a:ext cx="1923393" cy="276999"/>
+          </a:xfrm>
+          <a:prstGeom prst="rect">
+            <a:avLst/>
+          </a:prstGeom>
+          <a:noFill/>
+        </p:spPr>
+        <p:txBody>
+          <a:bodyPr wrap="square" rtlCol="0">
+            <a:spAutoFit/>
+          </a:bodyPr>
+          <a:lstStyle/>
+          <a:p>
+            <a:r>
+              <a:rPr lang="en-US" sz="1200" dirty="0"/>
+              <a:t>Filter window-by-window</a:t>
+            </a:r>
+            <a:endParaRPr lang="en-GB" sz="1200" dirty="0"/>
+          </a:p>
+        </p:txBody>
+      </p:sp>
+      <p:sp>
+        <p:nvSpPr>
+          <p:cNvPr id="52" name="TextBox 51">
+            <a:extLst>
+              <a:ext uri="{FF2B5EF4-FFF2-40B4-BE49-F238E27FC236}">
+                <a16:creationId xmlns:a16="http://schemas.microsoft.com/office/drawing/2014/main" id="{3975D76C-A645-4716-E193-0F583F1A706E}"/>
+              </a:ext>
+            </a:extLst>
+          </p:cNvPr>
+          <p:cNvSpPr txBox="1"/>
+          <p:nvPr/>
+        </p:nvSpPr>
+        <p:spPr>
+          <a:xfrm>
+            <a:off x="1474077" y="2832342"/>
+            <a:ext cx="2956034" cy="276999"/>
+          </a:xfrm>
+          <a:prstGeom prst="rect">
+            <a:avLst/>
+          </a:prstGeom>
+          <a:noFill/>
+        </p:spPr>
+        <p:txBody>
+          <a:bodyPr wrap="square" rtlCol="0">
+            <a:spAutoFit/>
+          </a:bodyPr>
+          <a:lstStyle/>
+          <a:p>
+            <a:r>
+              <a:rPr lang="en-US" sz="1200" dirty="0"/>
+              <a:t>Then, get features window-by-window</a:t>
+            </a:r>
+          </a:p>
+        </p:txBody>
+      </p:sp>
+      <p:sp>
+        <p:nvSpPr>
+          <p:cNvPr id="53" name="TextBox 52">
+            <a:extLst>
+              <a:ext uri="{FF2B5EF4-FFF2-40B4-BE49-F238E27FC236}">
+                <a16:creationId xmlns:a16="http://schemas.microsoft.com/office/drawing/2014/main" id="{AB505CDA-05D5-9FAD-40E4-CF749B1FD416}"/>
+              </a:ext>
+            </a:extLst>
+          </p:cNvPr>
+          <p:cNvSpPr txBox="1"/>
+          <p:nvPr/>
+        </p:nvSpPr>
+        <p:spPr>
+          <a:xfrm>
+            <a:off x="415160" y="4052599"/>
+            <a:ext cx="2956034" cy="830997"/>
+          </a:xfrm>
+          <a:prstGeom prst="rect">
+            <a:avLst/>
+          </a:prstGeom>
+          <a:noFill/>
+        </p:spPr>
+        <p:txBody>
+          <a:bodyPr wrap="square" rtlCol="0">
+            <a:spAutoFit/>
+          </a:bodyPr>
+          <a:lstStyle/>
+          <a:p>
+            <a:pPr algn="r"/>
+            <a:r>
+              <a:rPr lang="en-US" sz="1200" dirty="0"/>
+              <a:t>Is there data leakage here? I preprocess window by window, each feature can only ‘look’ to their window, thereby they are not affected by the test data</a:t>
+            </a:r>
+          </a:p>
+        </p:txBody>
+      </p:sp>
+      <p:cxnSp>
+        <p:nvCxnSpPr>
+          <p:cNvPr id="55" name="Straight Connector 54">
+            <a:extLst>
+              <a:ext uri="{FF2B5EF4-FFF2-40B4-BE49-F238E27FC236}">
+                <a16:creationId xmlns:a16="http://schemas.microsoft.com/office/drawing/2014/main" id="{C5FCC15D-4AEC-BCB9-DD69-73BDC4A3C266}"/>
+              </a:ext>
+            </a:extLst>
+          </p:cNvPr>
+          <p:cNvCxnSpPr>
+            <a:stCxn id="31" idx="1"/>
+            <a:endCxn id="53" idx="3"/>
+          </p:cNvCxnSpPr>
+          <p:nvPr/>
+        </p:nvCxnSpPr>
+        <p:spPr>
+          <a:xfrm flipH="1">
+            <a:off x="3371194" y="4357083"/>
+            <a:ext cx="817179" cy="111015"/>
+          </a:xfrm>
+          <a:prstGeom prst="line">
+            <a:avLst/>
+          </a:prstGeom>
+          <a:ln w="19050" cap="flat" cmpd="sng" algn="ctr">
+            <a:solidFill>
+              <a:schemeClr val="accent5"/>
+            </a:solidFill>
+            <a:prstDash val="dash"/>
+            <a:round/>
+            <a:headEnd type="none" w="med" len="med"/>
+            <a:tailEnd type="none" w="med" len="med"/>
+          </a:ln>
+        </p:spPr>
+        <p:style>
+          <a:lnRef idx="0">
+            <a:scrgbClr r="0" g="0" b="0"/>
+          </a:lnRef>
+          <a:fillRef idx="0">
+            <a:scrgbClr r="0" g="0" b="0"/>
+          </a:fillRef>
+          <a:effectRef idx="0">
+            <a:scrgbClr r="0" g="0" b="0"/>
+          </a:effectRef>
+          <a:fontRef idx="minor">
+            <a:schemeClr val="tx1"/>
+          </a:fontRef>
+        </p:style>
+      </p:cxnSp>
+      <p:sp>
+        <p:nvSpPr>
+          <p:cNvPr id="56" name="TextBox 55">
+            <a:extLst>
+              <a:ext uri="{FF2B5EF4-FFF2-40B4-BE49-F238E27FC236}">
+                <a16:creationId xmlns:a16="http://schemas.microsoft.com/office/drawing/2014/main" id="{57609683-3DF5-DFE0-728F-24FB10F624B6}"/>
+              </a:ext>
+            </a:extLst>
+          </p:cNvPr>
+          <p:cNvSpPr txBox="1"/>
+          <p:nvPr/>
+        </p:nvSpPr>
+        <p:spPr>
+          <a:xfrm>
+            <a:off x="8224344" y="439053"/>
+            <a:ext cx="3444765" cy="5632311"/>
+          </a:xfrm>
+          <a:prstGeom prst="rect">
+            <a:avLst/>
+          </a:prstGeom>
+          <a:noFill/>
+        </p:spPr>
+        <p:txBody>
+          <a:bodyPr wrap="square" rtlCol="0">
+            <a:spAutoFit/>
+          </a:bodyPr>
+          <a:lstStyle/>
+          <a:p>
+            <a:r>
+              <a:rPr lang="en-US" dirty="0"/>
+              <a:t>Played with:</a:t>
+            </a:r>
+          </a:p>
+          <a:p>
+            <a:pPr marL="285750" indent="-285750">
+              <a:buFont typeface="Arial" panose="020B0604020202020204" pitchFamily="34" charset="0"/>
+              <a:buChar char="•"/>
+            </a:pPr>
+            <a:r>
+              <a:rPr lang="en-US" sz="1200" dirty="0"/>
+              <a:t>Window size</a:t>
+            </a:r>
+          </a:p>
+          <a:p>
+            <a:pPr marL="285750" indent="-285750">
+              <a:buFont typeface="Arial" panose="020B0604020202020204" pitchFamily="34" charset="0"/>
+              <a:buChar char="•"/>
+            </a:pPr>
+            <a:r>
+              <a:rPr lang="en-US" sz="1200" dirty="0"/>
+              <a:t>Create windows from offset</a:t>
+            </a:r>
+          </a:p>
+          <a:p>
+            <a:pPr marL="285750" indent="-285750">
+              <a:buFont typeface="Arial" panose="020B0604020202020204" pitchFamily="34" charset="0"/>
+              <a:buChar char="•"/>
+            </a:pPr>
+            <a:r>
+              <a:rPr lang="en-US" sz="1200" dirty="0"/>
+              <a:t>Bandpass interval</a:t>
+            </a:r>
+          </a:p>
+          <a:p>
+            <a:pPr marL="285750" indent="-285750">
+              <a:buFont typeface="Arial" panose="020B0604020202020204" pitchFamily="34" charset="0"/>
+              <a:buChar char="•"/>
+            </a:pPr>
+            <a:r>
+              <a:rPr lang="en-US" sz="1200" dirty="0"/>
+              <a:t>Use or not bandpass</a:t>
+            </a:r>
+          </a:p>
+          <a:p>
+            <a:pPr marL="285750" indent="-285750">
+              <a:buFont typeface="Arial" panose="020B0604020202020204" pitchFamily="34" charset="0"/>
+              <a:buChar char="•"/>
+            </a:pPr>
+            <a:r>
+              <a:rPr lang="en-US" sz="1200" dirty="0"/>
+              <a:t>User or not notch</a:t>
+            </a:r>
+          </a:p>
+          <a:p>
+            <a:pPr marL="285750" indent="-285750">
+              <a:buFont typeface="Arial" panose="020B0604020202020204" pitchFamily="34" charset="0"/>
+              <a:buChar char="•"/>
+            </a:pPr>
+            <a:r>
+              <a:rPr lang="en-US" sz="1200" dirty="0"/>
+              <a:t>Use Z-score</a:t>
+            </a:r>
+          </a:p>
+          <a:p>
+            <a:pPr marL="285750" indent="-285750">
+              <a:buFont typeface="Arial" panose="020B0604020202020204" pitchFamily="34" charset="0"/>
+              <a:buChar char="•"/>
+            </a:pPr>
+            <a:r>
+              <a:rPr lang="en-US" sz="1200" dirty="0"/>
+              <a:t>Use or not feature scaling</a:t>
+            </a:r>
+          </a:p>
+          <a:p>
+            <a:pPr marL="285750" indent="-285750">
+              <a:buFont typeface="Arial" panose="020B0604020202020204" pitchFamily="34" charset="0"/>
+              <a:buChar char="•"/>
+            </a:pPr>
+            <a:r>
+              <a:rPr lang="en-US" sz="1200" dirty="0"/>
+              <a:t>Use or not feature selection</a:t>
+            </a:r>
+          </a:p>
+          <a:p>
+            <a:pPr marL="285750" indent="-285750">
+              <a:buFont typeface="Arial" panose="020B0604020202020204" pitchFamily="34" charset="0"/>
+              <a:buChar char="•"/>
+            </a:pPr>
+            <a:r>
+              <a:rPr lang="en-US" sz="1200" dirty="0"/>
+              <a:t>TKEO</a:t>
+            </a:r>
+          </a:p>
+          <a:p>
+            <a:pPr marL="285750" indent="-285750">
+              <a:buFont typeface="Arial" panose="020B0604020202020204" pitchFamily="34" charset="0"/>
+              <a:buChar char="•"/>
+            </a:pPr>
+            <a:r>
+              <a:rPr lang="en-US" sz="1200" dirty="0"/>
+              <a:t>Features</a:t>
+            </a:r>
+          </a:p>
+          <a:p>
+            <a:pPr marL="285750" indent="-285750">
+              <a:buFont typeface="Arial" panose="020B0604020202020204" pitchFamily="34" charset="0"/>
+              <a:buChar char="•"/>
+            </a:pPr>
+            <a:endParaRPr lang="en-US" sz="1200" dirty="0"/>
+          </a:p>
+          <a:p>
+            <a:r>
+              <a:rPr lang="en-US" sz="1200" b="1" dirty="0"/>
+              <a:t>Comments</a:t>
+            </a:r>
+          </a:p>
+          <a:p>
+            <a:r>
+              <a:rPr lang="en-US" sz="1200" dirty="0"/>
+              <a:t>If I use z-score, the accuracy drops.</a:t>
+            </a:r>
+          </a:p>
+          <a:p>
+            <a:r>
+              <a:rPr lang="en-US" sz="1200" dirty="0"/>
+              <a:t>Didn’t test the envelope</a:t>
+            </a:r>
+          </a:p>
+          <a:p>
+            <a:endParaRPr lang="en-US" sz="1200" b="1" dirty="0"/>
+          </a:p>
+          <a:p>
+            <a:r>
+              <a:rPr lang="en-US" sz="1200" b="1" dirty="0"/>
+              <a:t>Best results with: </a:t>
+            </a:r>
+          </a:p>
+          <a:p>
+            <a:pPr marL="171450" indent="-171450">
+              <a:buFont typeface="Arial" panose="020B0604020202020204" pitchFamily="34" charset="0"/>
+              <a:buChar char="•"/>
+            </a:pPr>
+            <a:r>
+              <a:rPr lang="en-US" sz="1200" dirty="0"/>
+              <a:t>Window size 0,5s</a:t>
+            </a:r>
+          </a:p>
+          <a:p>
+            <a:pPr marL="171450" indent="-171450">
+              <a:buFont typeface="Arial" panose="020B0604020202020204" pitchFamily="34" charset="0"/>
+              <a:buChar char="•"/>
+            </a:pPr>
+            <a:r>
+              <a:rPr lang="en-US" sz="1200" dirty="0"/>
+              <a:t>Train with offset: Yes</a:t>
+            </a:r>
+          </a:p>
+          <a:p>
+            <a:pPr marL="628650" lvl="1" indent="-171450">
+              <a:buFont typeface="Arial" panose="020B0604020202020204" pitchFamily="34" charset="0"/>
+              <a:buChar char="•"/>
+            </a:pPr>
+            <a:r>
+              <a:rPr lang="en-US" sz="1200" dirty="0"/>
+              <a:t>Offset: [0, -0.1, 0.1]</a:t>
+            </a:r>
+          </a:p>
+          <a:p>
+            <a:pPr marL="171450" indent="-171450">
+              <a:buFont typeface="Arial" panose="020B0604020202020204" pitchFamily="34" charset="0"/>
+              <a:buChar char="•"/>
+            </a:pPr>
+            <a:r>
+              <a:rPr lang="en-US" sz="1200" dirty="0"/>
+              <a:t>Bandpass 5-50 Hz</a:t>
+            </a:r>
+          </a:p>
+          <a:p>
+            <a:pPr marL="171450" indent="-171450">
+              <a:buFont typeface="Arial" panose="020B0604020202020204" pitchFamily="34" charset="0"/>
+              <a:buChar char="•"/>
+            </a:pPr>
+            <a:r>
+              <a:rPr lang="en-US" sz="1200" dirty="0"/>
+              <a:t>Notch 50 Hz</a:t>
+            </a:r>
+          </a:p>
+          <a:p>
+            <a:pPr marL="171450" indent="-171450">
+              <a:buFont typeface="Arial" panose="020B0604020202020204" pitchFamily="34" charset="0"/>
+              <a:buChar char="•"/>
+            </a:pPr>
+            <a:r>
+              <a:rPr lang="en-US" sz="1200" dirty="0"/>
+              <a:t>Features: RMS, RMS_SD, ZC, WL, MAV, STD, VAR, IAV, MF</a:t>
+            </a:r>
+          </a:p>
+          <a:p>
+            <a:pPr marL="171450" indent="-171450">
+              <a:buFont typeface="Arial" panose="020B0604020202020204" pitchFamily="34" charset="0"/>
+              <a:buChar char="•"/>
+            </a:pPr>
+            <a:r>
+              <a:rPr lang="en-US" sz="1200" dirty="0"/>
+              <a:t>Feature scaling: Yes</a:t>
+            </a:r>
+          </a:p>
+          <a:p>
+            <a:pPr marL="171450" indent="-171450">
+              <a:buFont typeface="Arial" panose="020B0604020202020204" pitchFamily="34" charset="0"/>
+              <a:buChar char="•"/>
+            </a:pPr>
+            <a:r>
+              <a:rPr lang="en-US" sz="1200" dirty="0"/>
+              <a:t>Feature selection: No</a:t>
+            </a:r>
+          </a:p>
+          <a:p>
+            <a:pPr marL="171450" indent="-171450">
+              <a:buFont typeface="Arial" panose="020B0604020202020204" pitchFamily="34" charset="0"/>
+              <a:buChar char="•"/>
+            </a:pPr>
+            <a:r>
+              <a:rPr lang="en-US" sz="1200" dirty="0"/>
+              <a:t>Classifier: RF with 500 estimators. </a:t>
+            </a:r>
+          </a:p>
+          <a:p>
+            <a:pPr marL="171450" indent="-171450">
+              <a:buFont typeface="Arial" panose="020B0604020202020204" pitchFamily="34" charset="0"/>
+              <a:buChar char="•"/>
+            </a:pPr>
+            <a:r>
+              <a:rPr lang="en-US" sz="1200" dirty="0"/>
+              <a:t>TKEO: Yes</a:t>
+            </a:r>
+          </a:p>
+          <a:p>
+            <a:endParaRPr lang="en-GB" dirty="0"/>
+          </a:p>
+        </p:txBody>
+      </p:sp>
+      <p:sp>
+        <p:nvSpPr>
+          <p:cNvPr id="58" name="Rectangle 1">
+            <a:extLst>
+              <a:ext uri="{FF2B5EF4-FFF2-40B4-BE49-F238E27FC236}">
+                <a16:creationId xmlns:a16="http://schemas.microsoft.com/office/drawing/2014/main" id="{A2D28C08-9C26-51C2-D2AE-E208FAEBC0A2}"/>
+              </a:ext>
+            </a:extLst>
+          </p:cNvPr>
+          <p:cNvSpPr>
+            <a:spLocks noChangeArrowheads="1"/>
+          </p:cNvSpPr>
+          <p:nvPr/>
+        </p:nvSpPr>
+        <p:spPr bwMode="auto">
+          <a:xfrm>
+            <a:off x="180400" y="162054"/>
+            <a:ext cx="3733843" cy="276999"/>
+          </a:xfrm>
+          <a:prstGeom prst="rect">
+            <a:avLst/>
+          </a:prstGeom>
+          <a:solidFill>
+            <a:srgbClr val="FFFFFF"/>
+          </a:solidFill>
+          <a:ln>
+            <a:noFill/>
+          </a:ln>
+          <a:effectLst/>
+          <a:extLst>
+            <a:ext uri="{91240B29-F687-4F45-9708-019B960494DF}">
+              <a14:hiddenLine xmlns:a14="http://schemas.microsoft.com/office/drawing/2010/main" w="9525">
+                <a:solidFill>
+                  <a:schemeClr val="tx1"/>
+                </a:solidFill>
+                <a:miter lim="800000"/>
+                <a:headEnd/>
+                <a:tailEnd/>
+              </a14:hiddenLine>
+            </a:ext>
+            <a:ext uri="{AF507438-7753-43E0-B8FC-AC1667EBCBE1}">
+              <a14:hiddenEffects xmlns:a14="http://schemas.microsoft.com/office/drawing/2010/main">
+                <a:effectLst>
+                  <a:outerShdw dist="35921" dir="2700000" algn="ctr" rotWithShape="0">
+                    <a:schemeClr val="bg2"/>
+                  </a:outerShdw>
+                </a:effectLst>
+              </a14:hiddenEffects>
+            </a:ext>
+          </a:extLst>
+        </p:spPr>
+        <p:txBody>
+          <a:bodyPr vert="horz" wrap="none" lIns="0" tIns="0" rIns="0" bIns="0" numCol="1" anchor="ctr" anchorCtr="0" compatLnSpc="1">
+            <a:prstTxWarp prst="textNoShape">
+              <a:avLst/>
+            </a:prstTxWarp>
+            <a:spAutoFit/>
+          </a:bodyPr>
+          <a:lstStyle/>
+          <a:p>
+            <a:pPr marL="0" marR="0" lvl="0" indent="0" algn="l" defTabSz="914400" rtl="0" eaLnBrk="0" fontAlgn="base" latinLnBrk="0" hangingPunct="0">
+              <a:lnSpc>
+                <a:spcPct val="100000"/>
+              </a:lnSpc>
+              <a:spcBef>
+                <a:spcPct val="0"/>
+              </a:spcBef>
+              <a:spcAft>
+                <a:spcPct val="0"/>
+              </a:spcAft>
+              <a:buClrTx/>
+              <a:buSzTx/>
+              <a:buFontTx/>
+              <a:buNone/>
+              <a:tabLst/>
+            </a:pPr>
+            <a:r>
+              <a:rPr kumimoji="0" lang="en-US" altLang="en-US" b="1" i="0" u="none" strike="noStrike" cap="none" normalizeH="0" baseline="0" dirty="0">
+                <a:ln>
+                  <a:noFill/>
+                </a:ln>
+                <a:solidFill>
+                  <a:schemeClr val="tx1"/>
+                </a:solidFill>
+                <a:effectLst/>
+                <a:latin typeface="menlo"/>
+              </a:rPr>
+              <a:t> Recorded with continuous movements</a:t>
+            </a:r>
+            <a:endParaRPr kumimoji="0" lang="en-US" altLang="en-US" sz="4400" b="1" i="0" u="none" strike="noStrike" cap="none" normalizeH="0" baseline="0" dirty="0">
+              <a:ln>
+                <a:noFill/>
+              </a:ln>
+              <a:solidFill>
+                <a:schemeClr val="tx1"/>
+              </a:solidFill>
+              <a:effectLst/>
+              <a:latin typeface="Arial" panose="020B0604020202020204" pitchFamily="34" charset="0"/>
+            </a:endParaRPr>
+          </a:p>
+        </p:txBody>
+      </p:sp>
+      <p:sp>
+        <p:nvSpPr>
+          <p:cNvPr id="10" name="TextBox 9">
+            <a:extLst>
+              <a:ext uri="{FF2B5EF4-FFF2-40B4-BE49-F238E27FC236}">
+                <a16:creationId xmlns:a16="http://schemas.microsoft.com/office/drawing/2014/main" id="{583D558F-98FE-C69E-17C9-120E089CCE09}"/>
+              </a:ext>
+            </a:extLst>
+          </p:cNvPr>
+          <p:cNvSpPr txBox="1"/>
+          <p:nvPr/>
+        </p:nvSpPr>
+        <p:spPr>
+          <a:xfrm>
+            <a:off x="7045988" y="6009460"/>
+            <a:ext cx="2356711" cy="461665"/>
+          </a:xfrm>
+          <a:prstGeom prst="rect">
+            <a:avLst/>
+          </a:prstGeom>
+          <a:noFill/>
+        </p:spPr>
+        <p:txBody>
+          <a:bodyPr wrap="square" rtlCol="0">
+            <a:spAutoFit/>
+          </a:bodyPr>
+          <a:lstStyle/>
+          <a:p>
+            <a:pPr algn="ctr"/>
+            <a:r>
+              <a:rPr lang="en-US" sz="1200" dirty="0"/>
+              <a:t>Training with the 3 sessions: 0,929 (cross </a:t>
+            </a:r>
+            <a:r>
+              <a:rPr lang="en-US" sz="1200" dirty="0" err="1"/>
+              <a:t>val</a:t>
+            </a:r>
+            <a:r>
+              <a:rPr lang="en-US" sz="1200" dirty="0"/>
+              <a:t> 0,919)</a:t>
+            </a:r>
+            <a:endParaRPr lang="en-GB" sz="1200" b="1" dirty="0"/>
+          </a:p>
+        </p:txBody>
+      </p:sp>
+      <p:sp>
+        <p:nvSpPr>
+          <p:cNvPr id="13" name="TextBox 12">
+            <a:extLst>
+              <a:ext uri="{FF2B5EF4-FFF2-40B4-BE49-F238E27FC236}">
+                <a16:creationId xmlns:a16="http://schemas.microsoft.com/office/drawing/2014/main" id="{874C9E99-065C-BBF4-FFE9-57D481C19645}"/>
+              </a:ext>
+            </a:extLst>
+          </p:cNvPr>
+          <p:cNvSpPr txBox="1"/>
+          <p:nvPr/>
+        </p:nvSpPr>
+        <p:spPr>
+          <a:xfrm>
+            <a:off x="9517117" y="6060882"/>
+            <a:ext cx="2356711" cy="276999"/>
+          </a:xfrm>
+          <a:prstGeom prst="rect">
+            <a:avLst/>
+          </a:prstGeom>
+          <a:noFill/>
+        </p:spPr>
+        <p:txBody>
+          <a:bodyPr wrap="square" rtlCol="0">
+            <a:spAutoFit/>
+          </a:bodyPr>
+          <a:lstStyle/>
+          <a:p>
+            <a:pPr algn="ctr"/>
+            <a:r>
+              <a:rPr lang="en-US" sz="1200" dirty="0"/>
+              <a:t>Good online accuracy!</a:t>
+            </a:r>
+            <a:endParaRPr lang="en-GB" sz="1200" b="1" dirty="0"/>
+          </a:p>
+        </p:txBody>
+      </p:sp>
+      <p:cxnSp>
+        <p:nvCxnSpPr>
+          <p:cNvPr id="21" name="Straight Arrow Connector 20">
+            <a:extLst>
+              <a:ext uri="{FF2B5EF4-FFF2-40B4-BE49-F238E27FC236}">
+                <a16:creationId xmlns:a16="http://schemas.microsoft.com/office/drawing/2014/main" id="{D2FB28A7-863B-B80D-2D0A-9902FD7B4719}"/>
+              </a:ext>
+            </a:extLst>
+          </p:cNvPr>
+          <p:cNvCxnSpPr>
+            <a:cxnSpLocks/>
+            <a:stCxn id="10" idx="3"/>
+          </p:cNvCxnSpPr>
+          <p:nvPr/>
+        </p:nvCxnSpPr>
+        <p:spPr>
+          <a:xfrm>
+            <a:off x="9402699" y="6240293"/>
+            <a:ext cx="411335" cy="0"/>
+          </a:xfrm>
+          <a:prstGeom prst="straightConnector1">
+            <a:avLst/>
+          </a:prstGeom>
+          <a:ln>
+            <a:tailEnd type="triangle"/>
+          </a:ln>
+        </p:spPr>
+        <p:style>
+          <a:lnRef idx="2">
+            <a:schemeClr val="accent1"/>
+          </a:lnRef>
+          <a:fillRef idx="0">
+            <a:schemeClr val="accent1"/>
+          </a:fillRef>
+          <a:effectRef idx="1">
+            <a:schemeClr val="accent1"/>
+          </a:effectRef>
+          <a:fontRef idx="minor">
+            <a:schemeClr val="tx1"/>
+          </a:fontRef>
+        </p:style>
+      </p:cxnSp>
+    </p:spTree>
+    <p:extLst>
+      <p:ext uri="{BB962C8B-B14F-4D97-AF65-F5344CB8AC3E}">
+        <p14:creationId xmlns:p14="http://schemas.microsoft.com/office/powerpoint/2010/main" val="3769340369"/>
+      </p:ext>
+    </p:extLst>
+  </p:cSld>
+  <p:clrMapOvr>
+    <a:masterClrMapping/>
+  </p:clrMapOvr>
+</p:sld>
+</file>
+
+<file path=ppt/slides/slide6.xml><?xml version="1.0" encoding="utf-8"?>
+<p:sld xmlns:a="http://schemas.openxmlformats.org/drawingml/2006/main" xmlns:r="http://schemas.openxmlformats.org/officeDocument/2006/relationships" xmlns:p="http://schemas.openxmlformats.org/presentationml/2006/main">
+  <p:cSld>
+    <p:spTree>
+      <p:nvGrpSpPr>
+        <p:cNvPr id="1" name=""/>
+        <p:cNvGrpSpPr/>
+        <p:nvPr/>
+      </p:nvGrpSpPr>
+      <p:grpSpPr>
+        <a:xfrm>
+          <a:off x="0" y="0"/>
+          <a:ext cx="0" cy="0"/>
+          <a:chOff x="0" y="0"/>
+          <a:chExt cx="0" cy="0"/>
+        </a:xfrm>
+      </p:grpSpPr>
+      <p:pic>
+        <p:nvPicPr>
+          <p:cNvPr id="5" name="Picture 4">
+            <a:extLst>
+              <a:ext uri="{FF2B5EF4-FFF2-40B4-BE49-F238E27FC236}">
+                <a16:creationId xmlns:a16="http://schemas.microsoft.com/office/drawing/2014/main" id="{365B681B-CC1B-08F9-C577-0E277FC18B52}"/>
+              </a:ext>
+            </a:extLst>
+          </p:cNvPr>
+          <p:cNvPicPr>
+            <a:picLocks noChangeAspect="1"/>
+          </p:cNvPicPr>
+          <p:nvPr/>
+        </p:nvPicPr>
+        <p:blipFill>
+          <a:blip r:embed="rId2"/>
+          <a:stretch>
+            <a:fillRect/>
+          </a:stretch>
+        </p:blipFill>
+        <p:spPr>
+          <a:xfrm>
+            <a:off x="1250288" y="1107455"/>
+            <a:ext cx="1889343" cy="3945393"/>
+          </a:xfrm>
+          <a:prstGeom prst="rect">
+            <a:avLst/>
+          </a:prstGeom>
+        </p:spPr>
+      </p:pic>
+      <p:pic>
+        <p:nvPicPr>
+          <p:cNvPr id="7" name="Picture 6">
+            <a:extLst>
+              <a:ext uri="{FF2B5EF4-FFF2-40B4-BE49-F238E27FC236}">
+                <a16:creationId xmlns:a16="http://schemas.microsoft.com/office/drawing/2014/main" id="{60F30D81-1123-45CD-F310-0685F940D5F4}"/>
+              </a:ext>
+            </a:extLst>
+          </p:cNvPr>
+          <p:cNvPicPr>
+            <a:picLocks noChangeAspect="1"/>
+          </p:cNvPicPr>
+          <p:nvPr/>
+        </p:nvPicPr>
+        <p:blipFill>
+          <a:blip r:embed="rId3"/>
+          <a:stretch>
+            <a:fillRect/>
+          </a:stretch>
+        </p:blipFill>
+        <p:spPr>
+          <a:xfrm>
+            <a:off x="3259220" y="1107455"/>
+            <a:ext cx="2085290" cy="3906104"/>
+          </a:xfrm>
+          <a:prstGeom prst="rect">
+            <a:avLst/>
+          </a:prstGeom>
+        </p:spPr>
+      </p:pic>
+      <p:pic>
+        <p:nvPicPr>
+          <p:cNvPr id="9" name="Picture 8">
+            <a:extLst>
+              <a:ext uri="{FF2B5EF4-FFF2-40B4-BE49-F238E27FC236}">
+                <a16:creationId xmlns:a16="http://schemas.microsoft.com/office/drawing/2014/main" id="{7166E218-950D-F672-9EB8-11C99AED82B8}"/>
+              </a:ext>
+            </a:extLst>
+          </p:cNvPr>
+          <p:cNvPicPr>
+            <a:picLocks noChangeAspect="1"/>
+          </p:cNvPicPr>
+          <p:nvPr/>
+        </p:nvPicPr>
+        <p:blipFill>
+          <a:blip r:embed="rId4"/>
+          <a:stretch>
+            <a:fillRect/>
+          </a:stretch>
+        </p:blipFill>
+        <p:spPr>
+          <a:xfrm>
+            <a:off x="5572992" y="1107455"/>
+            <a:ext cx="1889343" cy="4991730"/>
+          </a:xfrm>
+          <a:prstGeom prst="rect">
+            <a:avLst/>
+          </a:prstGeom>
+        </p:spPr>
+      </p:pic>
+      <p:pic>
+        <p:nvPicPr>
+          <p:cNvPr id="11" name="Picture 10">
+            <a:extLst>
+              <a:ext uri="{FF2B5EF4-FFF2-40B4-BE49-F238E27FC236}">
+                <a16:creationId xmlns:a16="http://schemas.microsoft.com/office/drawing/2014/main" id="{8CB74214-FB78-D945-0A77-F14E8925A6AE}"/>
+              </a:ext>
+            </a:extLst>
+          </p:cNvPr>
+          <p:cNvPicPr>
+            <a:picLocks noChangeAspect="1"/>
+          </p:cNvPicPr>
+          <p:nvPr/>
+        </p:nvPicPr>
+        <p:blipFill>
+          <a:blip r:embed="rId5"/>
+          <a:stretch>
+            <a:fillRect/>
+          </a:stretch>
+        </p:blipFill>
+        <p:spPr>
+          <a:xfrm>
+            <a:off x="7777871" y="1107455"/>
+            <a:ext cx="1495368" cy="4991730"/>
+          </a:xfrm>
+          <a:prstGeom prst="rect">
+            <a:avLst/>
+          </a:prstGeom>
+        </p:spPr>
+      </p:pic>
+      <p:sp>
+        <p:nvSpPr>
+          <p:cNvPr id="12" name="TextBox 11">
+            <a:extLst>
+              <a:ext uri="{FF2B5EF4-FFF2-40B4-BE49-F238E27FC236}">
+                <a16:creationId xmlns:a16="http://schemas.microsoft.com/office/drawing/2014/main" id="{1B6905B9-77F7-1942-222D-A93A8628F9CC}"/>
+              </a:ext>
+            </a:extLst>
+          </p:cNvPr>
+          <p:cNvSpPr txBox="1"/>
+          <p:nvPr/>
+        </p:nvSpPr>
+        <p:spPr>
+          <a:xfrm>
+            <a:off x="3772770" y="646386"/>
+            <a:ext cx="1889343" cy="370490"/>
+          </a:xfrm>
+          <a:prstGeom prst="rect">
+            <a:avLst/>
+          </a:prstGeom>
+          <a:noFill/>
+        </p:spPr>
+        <p:txBody>
+          <a:bodyPr wrap="square" rtlCol="0">
+            <a:spAutoFit/>
+          </a:bodyPr>
+          <a:lstStyle/>
+          <a:p>
+            <a:r>
+              <a:rPr lang="en-US" dirty="0"/>
+              <a:t>Swallow</a:t>
+            </a:r>
+            <a:endParaRPr lang="en-GB" dirty="0"/>
+          </a:p>
+        </p:txBody>
+      </p:sp>
+      <p:sp>
+        <p:nvSpPr>
+          <p:cNvPr id="13" name="TextBox 12">
+            <a:extLst>
+              <a:ext uri="{FF2B5EF4-FFF2-40B4-BE49-F238E27FC236}">
+                <a16:creationId xmlns:a16="http://schemas.microsoft.com/office/drawing/2014/main" id="{B89F1303-4ABD-3AD6-FBDA-23836C1B233E}"/>
+              </a:ext>
+            </a:extLst>
+          </p:cNvPr>
+          <p:cNvSpPr txBox="1"/>
+          <p:nvPr/>
+        </p:nvSpPr>
+        <p:spPr>
+          <a:xfrm>
+            <a:off x="1662819" y="727841"/>
+            <a:ext cx="1889343" cy="370490"/>
+          </a:xfrm>
+          <a:prstGeom prst="rect">
+            <a:avLst/>
+          </a:prstGeom>
+          <a:noFill/>
+        </p:spPr>
+        <p:txBody>
+          <a:bodyPr wrap="square" rtlCol="0">
+            <a:spAutoFit/>
+          </a:bodyPr>
+          <a:lstStyle/>
+          <a:p>
+            <a:r>
+              <a:rPr lang="en-US" dirty="0"/>
+              <a:t>Right-front</a:t>
+            </a:r>
+            <a:endParaRPr lang="en-GB" dirty="0"/>
+          </a:p>
+        </p:txBody>
+      </p:sp>
+      <p:sp>
+        <p:nvSpPr>
+          <p:cNvPr id="14" name="TextBox 13">
+            <a:extLst>
+              <a:ext uri="{FF2B5EF4-FFF2-40B4-BE49-F238E27FC236}">
+                <a16:creationId xmlns:a16="http://schemas.microsoft.com/office/drawing/2014/main" id="{6E6C598A-D1D2-54C6-C98A-5E5B9DD785DD}"/>
+              </a:ext>
+            </a:extLst>
+          </p:cNvPr>
+          <p:cNvSpPr txBox="1"/>
+          <p:nvPr/>
+        </p:nvSpPr>
+        <p:spPr>
+          <a:xfrm>
+            <a:off x="6096000" y="646386"/>
+            <a:ext cx="1889343" cy="370490"/>
+          </a:xfrm>
+          <a:prstGeom prst="rect">
+            <a:avLst/>
+          </a:prstGeom>
+          <a:noFill/>
+        </p:spPr>
+        <p:txBody>
+          <a:bodyPr wrap="square" rtlCol="0">
+            <a:spAutoFit/>
+          </a:bodyPr>
+          <a:lstStyle/>
+          <a:p>
+            <a:r>
+              <a:rPr lang="en-US" dirty="0"/>
+              <a:t>Left-front</a:t>
+            </a:r>
+            <a:endParaRPr lang="en-GB" dirty="0"/>
+          </a:p>
+        </p:txBody>
+      </p:sp>
+      <p:sp>
+        <p:nvSpPr>
+          <p:cNvPr id="15" name="TextBox 14">
+            <a:extLst>
+              <a:ext uri="{FF2B5EF4-FFF2-40B4-BE49-F238E27FC236}">
+                <a16:creationId xmlns:a16="http://schemas.microsoft.com/office/drawing/2014/main" id="{A56D5899-5484-7588-F713-077376BDEE60}"/>
+              </a:ext>
+            </a:extLst>
+          </p:cNvPr>
+          <p:cNvSpPr txBox="1"/>
+          <p:nvPr/>
+        </p:nvSpPr>
+        <p:spPr>
+          <a:xfrm>
+            <a:off x="7985343" y="646386"/>
+            <a:ext cx="1889343" cy="370490"/>
+          </a:xfrm>
+          <a:prstGeom prst="rect">
+            <a:avLst/>
+          </a:prstGeom>
+          <a:noFill/>
+        </p:spPr>
+        <p:txBody>
+          <a:bodyPr wrap="square" rtlCol="0">
+            <a:spAutoFit/>
+          </a:bodyPr>
+          <a:lstStyle/>
+          <a:p>
+            <a:r>
+              <a:rPr lang="en-US" dirty="0"/>
+              <a:t>Left</a:t>
+            </a:r>
+            <a:endParaRPr lang="en-GB" dirty="0"/>
+          </a:p>
+        </p:txBody>
+      </p:sp>
+      <mc:AlternateContent xmlns:mc="http://schemas.openxmlformats.org/markup-compatibility/2006">
+        <mc:Choice xmlns:p14="http://schemas.microsoft.com/office/powerpoint/2010/main" Requires="p14">
+          <p:contentPart p14:bwMode="auto" r:id="rId6">
+            <p14:nvContentPartPr>
+              <p14:cNvPr id="17" name="Ink 16">
+                <a:extLst>
+                  <a:ext uri="{FF2B5EF4-FFF2-40B4-BE49-F238E27FC236}">
+                    <a16:creationId xmlns:a16="http://schemas.microsoft.com/office/drawing/2014/main" id="{05FEA706-1E8F-1A59-271A-C8FDB50B1B48}"/>
+                  </a:ext>
+                </a:extLst>
+              </p14:cNvPr>
+              <p14:cNvContentPartPr/>
+              <p14:nvPr/>
+            </p14:nvContentPartPr>
+            <p14:xfrm>
+              <a:off x="2704432" y="2293473"/>
+              <a:ext cx="173160" cy="1663920"/>
+            </p14:xfrm>
+          </p:contentPart>
+        </mc:Choice>
+        <mc:Fallback>
+          <p:pic>
+            <p:nvPicPr>
+              <p:cNvPr id="17" name="Ink 16">
+                <a:extLst>
+                  <a:ext uri="{FF2B5EF4-FFF2-40B4-BE49-F238E27FC236}">
+                    <a16:creationId xmlns:a16="http://schemas.microsoft.com/office/drawing/2014/main" id="{05FEA706-1E8F-1A59-271A-C8FDB50B1B48}"/>
+                  </a:ext>
+                </a:extLst>
+              </p:cNvPr>
+              <p:cNvPicPr/>
+              <p:nvPr/>
+            </p:nvPicPr>
+            <p:blipFill>
+              <a:blip r:embed="rId7"/>
+              <a:stretch>
+                <a:fillRect/>
+              </a:stretch>
+            </p:blipFill>
+            <p:spPr>
+              <a:xfrm>
+                <a:off x="2698312" y="2287353"/>
+                <a:ext cx="185400" cy="1676160"/>
+              </a:xfrm>
+              <a:prstGeom prst="rect">
+                <a:avLst/>
+              </a:prstGeom>
+            </p:spPr>
+          </p:pic>
+        </mc:Fallback>
+      </mc:AlternateContent>
+      <mc:AlternateContent xmlns:mc="http://schemas.openxmlformats.org/markup-compatibility/2006">
+        <mc:Choice xmlns:p14="http://schemas.microsoft.com/office/powerpoint/2010/main" Requires="p14">
+          <p:contentPart p14:bwMode="auto" r:id="rId8">
+            <p14:nvContentPartPr>
+              <p14:cNvPr id="18" name="Ink 17">
+                <a:extLst>
+                  <a:ext uri="{FF2B5EF4-FFF2-40B4-BE49-F238E27FC236}">
+                    <a16:creationId xmlns:a16="http://schemas.microsoft.com/office/drawing/2014/main" id="{68F2C1BD-0788-23D5-3902-702075E7D8CC}"/>
+                  </a:ext>
+                </a:extLst>
+              </p14:cNvPr>
+              <p14:cNvContentPartPr/>
+              <p14:nvPr/>
+            </p14:nvContentPartPr>
+            <p14:xfrm>
+              <a:off x="4487152" y="2025633"/>
+              <a:ext cx="78840" cy="608400"/>
+            </p14:xfrm>
+          </p:contentPart>
+        </mc:Choice>
+        <mc:Fallback>
+          <p:pic>
+            <p:nvPicPr>
+              <p:cNvPr id="18" name="Ink 17">
+                <a:extLst>
+                  <a:ext uri="{FF2B5EF4-FFF2-40B4-BE49-F238E27FC236}">
+                    <a16:creationId xmlns:a16="http://schemas.microsoft.com/office/drawing/2014/main" id="{68F2C1BD-0788-23D5-3902-702075E7D8CC}"/>
+                  </a:ext>
+                </a:extLst>
+              </p:cNvPr>
+              <p:cNvPicPr/>
+              <p:nvPr/>
+            </p:nvPicPr>
+            <p:blipFill>
+              <a:blip r:embed="rId9"/>
+              <a:stretch>
+                <a:fillRect/>
+              </a:stretch>
+            </p:blipFill>
+            <p:spPr>
+              <a:xfrm>
+                <a:off x="4481032" y="2019513"/>
+                <a:ext cx="91080" cy="620640"/>
+              </a:xfrm>
+              <a:prstGeom prst="rect">
+                <a:avLst/>
+              </a:prstGeom>
+            </p:spPr>
+          </p:pic>
+        </mc:Fallback>
+      </mc:AlternateContent>
+      <mc:AlternateContent xmlns:mc="http://schemas.openxmlformats.org/markup-compatibility/2006">
+        <mc:Choice xmlns:p14="http://schemas.microsoft.com/office/powerpoint/2010/main" Requires="p14">
+          <p:contentPart p14:bwMode="auto" r:id="rId10">
+            <p14:nvContentPartPr>
+              <p14:cNvPr id="19" name="Ink 18">
+                <a:extLst>
+                  <a:ext uri="{FF2B5EF4-FFF2-40B4-BE49-F238E27FC236}">
+                    <a16:creationId xmlns:a16="http://schemas.microsoft.com/office/drawing/2014/main" id="{7BA9DABF-8C4F-F8BB-D874-498EDF14694D}"/>
+                  </a:ext>
+                </a:extLst>
+              </p14:cNvPr>
+              <p14:cNvContentPartPr/>
+              <p14:nvPr/>
+            </p14:nvContentPartPr>
+            <p14:xfrm>
+              <a:off x="4492912" y="2987193"/>
+              <a:ext cx="135000" cy="1629360"/>
+            </p14:xfrm>
+          </p:contentPart>
+        </mc:Choice>
+        <mc:Fallback>
+          <p:pic>
+            <p:nvPicPr>
+              <p:cNvPr id="19" name="Ink 18">
+                <a:extLst>
+                  <a:ext uri="{FF2B5EF4-FFF2-40B4-BE49-F238E27FC236}">
+                    <a16:creationId xmlns:a16="http://schemas.microsoft.com/office/drawing/2014/main" id="{7BA9DABF-8C4F-F8BB-D874-498EDF14694D}"/>
+                  </a:ext>
+                </a:extLst>
+              </p:cNvPr>
+              <p:cNvPicPr/>
+              <p:nvPr/>
+            </p:nvPicPr>
+            <p:blipFill>
+              <a:blip r:embed="rId11"/>
+              <a:stretch>
+                <a:fillRect/>
+              </a:stretch>
+            </p:blipFill>
+            <p:spPr>
+              <a:xfrm>
+                <a:off x="4486792" y="2981073"/>
+                <a:ext cx="147240" cy="1641600"/>
+              </a:xfrm>
+              <a:prstGeom prst="rect">
+                <a:avLst/>
+              </a:prstGeom>
+            </p:spPr>
+          </p:pic>
+        </mc:Fallback>
+      </mc:AlternateContent>
+      <mc:AlternateContent xmlns:mc="http://schemas.openxmlformats.org/markup-compatibility/2006">
+        <mc:Choice xmlns:p14="http://schemas.microsoft.com/office/powerpoint/2010/main" Requires="p14">
+          <p:contentPart p14:bwMode="auto" r:id="rId12">
+            <p14:nvContentPartPr>
+              <p14:cNvPr id="20" name="Ink 19">
+                <a:extLst>
+                  <a:ext uri="{FF2B5EF4-FFF2-40B4-BE49-F238E27FC236}">
+                    <a16:creationId xmlns:a16="http://schemas.microsoft.com/office/drawing/2014/main" id="{EA660BF1-DE4D-6227-BE79-C119E9254C69}"/>
+                  </a:ext>
+                </a:extLst>
+              </p14:cNvPr>
+              <p14:cNvContentPartPr/>
+              <p14:nvPr/>
+            </p14:nvContentPartPr>
+            <p14:xfrm>
+              <a:off x="6896992" y="1923033"/>
+              <a:ext cx="110880" cy="251280"/>
+            </p14:xfrm>
+          </p:contentPart>
+        </mc:Choice>
+        <mc:Fallback>
+          <p:pic>
+            <p:nvPicPr>
+              <p:cNvPr id="20" name="Ink 19">
+                <a:extLst>
+                  <a:ext uri="{FF2B5EF4-FFF2-40B4-BE49-F238E27FC236}">
+                    <a16:creationId xmlns:a16="http://schemas.microsoft.com/office/drawing/2014/main" id="{EA660BF1-DE4D-6227-BE79-C119E9254C69}"/>
+                  </a:ext>
+                </a:extLst>
+              </p:cNvPr>
+              <p:cNvPicPr/>
+              <p:nvPr/>
+            </p:nvPicPr>
+            <p:blipFill>
+              <a:blip r:embed="rId13"/>
+              <a:stretch>
+                <a:fillRect/>
+              </a:stretch>
+            </p:blipFill>
+            <p:spPr>
+              <a:xfrm>
+                <a:off x="6890872" y="1916913"/>
+                <a:ext cx="123120" cy="263520"/>
+              </a:xfrm>
+              <a:prstGeom prst="rect">
+                <a:avLst/>
+              </a:prstGeom>
+            </p:spPr>
+          </p:pic>
+        </mc:Fallback>
+      </mc:AlternateContent>
+      <mc:AlternateContent xmlns:mc="http://schemas.openxmlformats.org/markup-compatibility/2006">
+        <mc:Choice xmlns:p14="http://schemas.microsoft.com/office/powerpoint/2010/main" Requires="p14">
+          <p:contentPart p14:bwMode="auto" r:id="rId14">
+            <p14:nvContentPartPr>
+              <p14:cNvPr id="21" name="Ink 20">
+                <a:extLst>
+                  <a:ext uri="{FF2B5EF4-FFF2-40B4-BE49-F238E27FC236}">
+                    <a16:creationId xmlns:a16="http://schemas.microsoft.com/office/drawing/2014/main" id="{ECCAE6BE-3A13-AA21-1214-5507BE5DE236}"/>
+                  </a:ext>
+                </a:extLst>
+              </p14:cNvPr>
+              <p14:cNvContentPartPr/>
+              <p14:nvPr/>
+            </p14:nvContentPartPr>
+            <p14:xfrm>
+              <a:off x="6897352" y="2798193"/>
+              <a:ext cx="90000" cy="370080"/>
+            </p14:xfrm>
+          </p:contentPart>
+        </mc:Choice>
+        <mc:Fallback>
+          <p:pic>
+            <p:nvPicPr>
+              <p:cNvPr id="21" name="Ink 20">
+                <a:extLst>
+                  <a:ext uri="{FF2B5EF4-FFF2-40B4-BE49-F238E27FC236}">
+                    <a16:creationId xmlns:a16="http://schemas.microsoft.com/office/drawing/2014/main" id="{ECCAE6BE-3A13-AA21-1214-5507BE5DE236}"/>
+                  </a:ext>
+                </a:extLst>
+              </p:cNvPr>
+              <p:cNvPicPr/>
+              <p:nvPr/>
+            </p:nvPicPr>
+            <p:blipFill>
+              <a:blip r:embed="rId15"/>
+              <a:stretch>
+                <a:fillRect/>
+              </a:stretch>
+            </p:blipFill>
+            <p:spPr>
+              <a:xfrm>
+                <a:off x="6891232" y="2792073"/>
+                <a:ext cx="102240" cy="382320"/>
+              </a:xfrm>
+              <a:prstGeom prst="rect">
+                <a:avLst/>
+              </a:prstGeom>
+            </p:spPr>
+          </p:pic>
+        </mc:Fallback>
+      </mc:AlternateContent>
+      <mc:AlternateContent xmlns:mc="http://schemas.openxmlformats.org/markup-compatibility/2006">
+        <mc:Choice xmlns:p14="http://schemas.microsoft.com/office/powerpoint/2010/main" Requires="p14">
+          <p:contentPart p14:bwMode="auto" r:id="rId16">
+            <p14:nvContentPartPr>
+              <p14:cNvPr id="23" name="Ink 22">
+                <a:extLst>
+                  <a:ext uri="{FF2B5EF4-FFF2-40B4-BE49-F238E27FC236}">
+                    <a16:creationId xmlns:a16="http://schemas.microsoft.com/office/drawing/2014/main" id="{3396B72D-59B6-30F4-BF72-529318EFD5EF}"/>
+                  </a:ext>
+                </a:extLst>
+              </p14:cNvPr>
+              <p14:cNvContentPartPr/>
+              <p14:nvPr/>
+            </p14:nvContentPartPr>
+            <p14:xfrm>
+              <a:off x="6841912" y="3490833"/>
+              <a:ext cx="144360" cy="1545120"/>
+            </p14:xfrm>
+          </p:contentPart>
+        </mc:Choice>
+        <mc:Fallback>
+          <p:pic>
+            <p:nvPicPr>
+              <p:cNvPr id="23" name="Ink 22">
+                <a:extLst>
+                  <a:ext uri="{FF2B5EF4-FFF2-40B4-BE49-F238E27FC236}">
+                    <a16:creationId xmlns:a16="http://schemas.microsoft.com/office/drawing/2014/main" id="{3396B72D-59B6-30F4-BF72-529318EFD5EF}"/>
+                  </a:ext>
+                </a:extLst>
+              </p:cNvPr>
+              <p:cNvPicPr/>
+              <p:nvPr/>
+            </p:nvPicPr>
+            <p:blipFill>
+              <a:blip r:embed="rId17"/>
+              <a:stretch>
+                <a:fillRect/>
+              </a:stretch>
+            </p:blipFill>
+            <p:spPr>
+              <a:xfrm>
+                <a:off x="6835792" y="3484713"/>
+                <a:ext cx="156600" cy="1557360"/>
+              </a:xfrm>
+              <a:prstGeom prst="rect">
+                <a:avLst/>
+              </a:prstGeom>
+            </p:spPr>
+          </p:pic>
+        </mc:Fallback>
+      </mc:AlternateContent>
+      <mc:AlternateContent xmlns:mc="http://schemas.openxmlformats.org/markup-compatibility/2006">
+        <mc:Choice xmlns:p14="http://schemas.microsoft.com/office/powerpoint/2010/main" Requires="p14">
+          <p:contentPart p14:bwMode="auto" r:id="rId18">
+            <p14:nvContentPartPr>
+              <p14:cNvPr id="26" name="Ink 25">
+                <a:extLst>
+                  <a:ext uri="{FF2B5EF4-FFF2-40B4-BE49-F238E27FC236}">
+                    <a16:creationId xmlns:a16="http://schemas.microsoft.com/office/drawing/2014/main" id="{E2FCF6B7-D0C5-43E9-2E53-8D243D0D5BCC}"/>
+                  </a:ext>
+                </a:extLst>
+              </p14:cNvPr>
+              <p14:cNvContentPartPr/>
+              <p14:nvPr/>
+            </p14:nvContentPartPr>
+            <p14:xfrm>
+              <a:off x="9017752" y="3136953"/>
+              <a:ext cx="720" cy="1365480"/>
+            </p14:xfrm>
+          </p:contentPart>
+        </mc:Choice>
+        <mc:Fallback>
+          <p:pic>
+            <p:nvPicPr>
+              <p:cNvPr id="26" name="Ink 25">
+                <a:extLst>
+                  <a:ext uri="{FF2B5EF4-FFF2-40B4-BE49-F238E27FC236}">
+                    <a16:creationId xmlns:a16="http://schemas.microsoft.com/office/drawing/2014/main" id="{E2FCF6B7-D0C5-43E9-2E53-8D243D0D5BCC}"/>
+                  </a:ext>
+                </a:extLst>
+              </p:cNvPr>
+              <p:cNvPicPr/>
+              <p:nvPr/>
+            </p:nvPicPr>
+            <p:blipFill>
+              <a:blip r:embed="rId19"/>
+              <a:stretch>
+                <a:fillRect/>
+              </a:stretch>
+            </p:blipFill>
+            <p:spPr>
+              <a:xfrm>
+                <a:off x="9005512" y="3130833"/>
+                <a:ext cx="25200" cy="1377720"/>
+              </a:xfrm>
+              <a:prstGeom prst="rect">
+                <a:avLst/>
+              </a:prstGeom>
+            </p:spPr>
+          </p:pic>
+        </mc:Fallback>
+      </mc:AlternateContent>
+      <mc:AlternateContent xmlns:mc="http://schemas.openxmlformats.org/markup-compatibility/2006">
+        <mc:Choice xmlns:p14="http://schemas.microsoft.com/office/powerpoint/2010/main" Requires="p14">
+          <p:contentPart p14:bwMode="auto" r:id="rId20">
+            <p14:nvContentPartPr>
+              <p14:cNvPr id="27" name="Ink 26">
+                <a:extLst>
+                  <a:ext uri="{FF2B5EF4-FFF2-40B4-BE49-F238E27FC236}">
+                    <a16:creationId xmlns:a16="http://schemas.microsoft.com/office/drawing/2014/main" id="{B6C04F4A-CFA7-CA96-CFD6-D61C6528255F}"/>
+                  </a:ext>
+                </a:extLst>
+              </p14:cNvPr>
+              <p14:cNvContentPartPr/>
+              <p14:nvPr/>
+            </p14:nvContentPartPr>
+            <p14:xfrm>
+              <a:off x="9003352" y="4666233"/>
+              <a:ext cx="63360" cy="182520"/>
+            </p14:xfrm>
+          </p:contentPart>
+        </mc:Choice>
+        <mc:Fallback>
+          <p:pic>
+            <p:nvPicPr>
+              <p:cNvPr id="27" name="Ink 26">
+                <a:extLst>
+                  <a:ext uri="{FF2B5EF4-FFF2-40B4-BE49-F238E27FC236}">
+                    <a16:creationId xmlns:a16="http://schemas.microsoft.com/office/drawing/2014/main" id="{B6C04F4A-CFA7-CA96-CFD6-D61C6528255F}"/>
+                  </a:ext>
+                </a:extLst>
+              </p:cNvPr>
+              <p:cNvPicPr/>
+              <p:nvPr/>
+            </p:nvPicPr>
+            <p:blipFill>
+              <a:blip r:embed="rId21"/>
+              <a:stretch>
+                <a:fillRect/>
+              </a:stretch>
+            </p:blipFill>
+            <p:spPr>
+              <a:xfrm>
+                <a:off x="8997232" y="4660113"/>
+                <a:ext cx="75600" cy="194760"/>
+              </a:xfrm>
+              <a:prstGeom prst="rect">
+                <a:avLst/>
+              </a:prstGeom>
+            </p:spPr>
+          </p:pic>
+        </mc:Fallback>
+      </mc:AlternateContent>
+    </p:spTree>
+    <p:extLst>
+      <p:ext uri="{BB962C8B-B14F-4D97-AF65-F5344CB8AC3E}">
+        <p14:creationId xmlns:p14="http://schemas.microsoft.com/office/powerpoint/2010/main" val="2058227531"/>
+      </p:ext>
+    </p:extLst>
+  </p:cSld>
+  <p:clrMapOvr>
+    <a:masterClrMapping/>
+  </p:clrMapOvr>
+</p:sld>
+</file>
+
+<file path=ppt/slides/slide7.xml><?xml version="1.0" encoding="utf-8"?>
+<p:sld xmlns:a="http://schemas.openxmlformats.org/drawingml/2006/main" xmlns:r="http://schemas.openxmlformats.org/officeDocument/2006/relationships" xmlns:p="http://schemas.openxmlformats.org/presentationml/2006/main">
+  <p:cSld>
+    <p:spTree>
+      <p:nvGrpSpPr>
+        <p:cNvPr id="1" name=""/>
+        <p:cNvGrpSpPr/>
+        <p:nvPr/>
+      </p:nvGrpSpPr>
+      <p:grpSpPr>
+        <a:xfrm>
+          <a:off x="0" y="0"/>
+          <a:ext cx="0" cy="0"/>
+          <a:chOff x="0" y="0"/>
+          <a:chExt cx="0" cy="0"/>
+        </a:xfrm>
+      </p:grpSpPr>
+      <p:sp>
+        <p:nvSpPr>
+          <p:cNvPr id="2" name="Title 1">
+            <a:extLst>
+              <a:ext uri="{FF2B5EF4-FFF2-40B4-BE49-F238E27FC236}">
+                <a16:creationId xmlns:a16="http://schemas.microsoft.com/office/drawing/2014/main" id="{C70C2901-5D21-9BD2-6690-2E440243B22F}"/>
+              </a:ext>
+            </a:extLst>
+          </p:cNvPr>
+          <p:cNvSpPr>
+            <a:spLocks noGrp="1"/>
+          </p:cNvSpPr>
+          <p:nvPr>
+            <p:ph type="title"/>
+          </p:nvPr>
+        </p:nvSpPr>
+        <p:spPr/>
+        <p:txBody>
+          <a:bodyPr/>
+          <a:lstStyle/>
+          <a:p>
+            <a:r>
+              <a:rPr lang="en-US" dirty="0"/>
+              <a:t>More things to test</a:t>
+            </a:r>
+            <a:endParaRPr lang="en-GB" dirty="0"/>
+          </a:p>
+        </p:txBody>
+      </p:sp>
+      <p:sp>
+        <p:nvSpPr>
+          <p:cNvPr id="3" name="Content Placeholder 2">
+            <a:extLst>
+              <a:ext uri="{FF2B5EF4-FFF2-40B4-BE49-F238E27FC236}">
+                <a16:creationId xmlns:a16="http://schemas.microsoft.com/office/drawing/2014/main" id="{F5C2DCD8-0F64-69D5-8F4B-FE1A582E1421}"/>
+              </a:ext>
+            </a:extLst>
+          </p:cNvPr>
+          <p:cNvSpPr>
+            <a:spLocks noGrp="1"/>
+          </p:cNvSpPr>
+          <p:nvPr>
+            <p:ph idx="1"/>
+          </p:nvPr>
+        </p:nvSpPr>
+        <p:spPr/>
+        <p:txBody>
+          <a:bodyPr/>
+          <a:lstStyle/>
+          <a:p>
+            <a:r>
+              <a:rPr lang="en-US" dirty="0"/>
+              <a:t>Carvalho 2023</a:t>
+            </a:r>
+          </a:p>
+          <a:p>
+            <a:pPr lvl="1"/>
+            <a:r>
+              <a:rPr lang="en-US" dirty="0"/>
+              <a:t>Preprocessing: </a:t>
+            </a:r>
+          </a:p>
+          <a:p>
+            <a:pPr lvl="2"/>
+            <a:r>
+              <a:rPr lang="en-US" dirty="0"/>
+              <a:t>Wavelet Transform</a:t>
+            </a:r>
+          </a:p>
+          <a:p>
+            <a:pPr lvl="2"/>
+            <a:r>
+              <a:rPr lang="en-US" dirty="0"/>
+              <a:t>Hilbert Filter</a:t>
+            </a:r>
+          </a:p>
+          <a:p>
+            <a:pPr lvl="2"/>
+            <a:r>
+              <a:rPr lang="en-US" dirty="0"/>
+              <a:t>Kalman filter</a:t>
+            </a:r>
+          </a:p>
+          <a:p>
+            <a:pPr lvl="1"/>
+            <a:r>
+              <a:rPr lang="en-US" dirty="0"/>
+              <a:t>Classification</a:t>
+            </a:r>
+          </a:p>
+          <a:p>
+            <a:pPr lvl="2"/>
+            <a:r>
+              <a:rPr lang="en-US" dirty="0"/>
+              <a:t>Threshold method?</a:t>
+            </a:r>
+            <a:endParaRPr lang="en-GB" dirty="0"/>
+          </a:p>
+        </p:txBody>
+      </p:sp>
+    </p:spTree>
+    <p:extLst>
+      <p:ext uri="{BB962C8B-B14F-4D97-AF65-F5344CB8AC3E}">
+        <p14:creationId xmlns:p14="http://schemas.microsoft.com/office/powerpoint/2010/main" val="2170923710"/>
+      </p:ext>
+    </p:extLst>
+  </p:cSld>
+  <p:clrMapOvr>
+    <a:masterClrMapping/>
+  </p:clrMapOvr>
+</p:sld>
+</file>
+
+<file path=ppt/slides/slide8.xml><?xml version="1.0" encoding="utf-8"?>
+<p:sld xmlns:a="http://schemas.openxmlformats.org/drawingml/2006/main" xmlns:r="http://schemas.openxmlformats.org/officeDocument/2006/relationships" xmlns:p="http://schemas.openxmlformats.org/presentationml/2006/main">
+  <p:cSld>
+    <p:spTree>
+      <p:nvGrpSpPr>
+        <p:cNvPr id="1" name=""/>
+        <p:cNvGrpSpPr/>
+        <p:nvPr/>
+      </p:nvGrpSpPr>
+      <p:grpSpPr>
+        <a:xfrm>
+          <a:off x="0" y="0"/>
+          <a:ext cx="0" cy="0"/>
+          <a:chOff x="0" y="0"/>
+          <a:chExt cx="0" cy="0"/>
+        </a:xfrm>
+      </p:grpSpPr>
+      <p:sp>
+        <p:nvSpPr>
+          <p:cNvPr id="5" name="TextBox 4">
+            <a:extLst>
+              <a:ext uri="{FF2B5EF4-FFF2-40B4-BE49-F238E27FC236}">
+                <a16:creationId xmlns:a16="http://schemas.microsoft.com/office/drawing/2014/main" id="{008F8D2D-EEFB-0C10-CF76-C74E308F3BFE}"/>
+              </a:ext>
+            </a:extLst>
+          </p:cNvPr>
+          <p:cNvSpPr txBox="1"/>
+          <p:nvPr/>
+        </p:nvSpPr>
+        <p:spPr>
+          <a:xfrm>
+            <a:off x="658541" y="370914"/>
+            <a:ext cx="10631129" cy="4801314"/>
+          </a:xfrm>
+          <a:prstGeom prst="rect">
+            <a:avLst/>
+          </a:prstGeom>
+          <a:noFill/>
+        </p:spPr>
+        <p:txBody>
+          <a:bodyPr wrap="square">
+            <a:spAutoFit/>
+          </a:bodyPr>
+          <a:lstStyle/>
+          <a:p>
+            <a:pPr marL="285750" indent="-285750" fontAlgn="base">
+              <a:buFont typeface="Arial" panose="020B0604020202020204" pitchFamily="34" charset="0"/>
+              <a:buChar char="•"/>
+            </a:pPr>
+            <a:endParaRPr lang="en-US" dirty="0"/>
+          </a:p>
+          <a:p>
+            <a:pPr marL="285750" indent="-285750" fontAlgn="base">
+              <a:buFont typeface="Arial" panose="020B0604020202020204" pitchFamily="34" charset="0"/>
+              <a:buChar char="•"/>
+            </a:pPr>
+            <a:r>
+              <a:rPr lang="en-US" b="1" dirty="0" err="1"/>
+              <a:t>Noraxon</a:t>
+            </a:r>
+            <a:endParaRPr lang="en-US" b="1" dirty="0"/>
+          </a:p>
+          <a:p>
+            <a:pPr marL="742950" lvl="1" indent="-285750" fontAlgn="base">
+              <a:buFont typeface="Arial" panose="020B0604020202020204" pitchFamily="34" charset="0"/>
+              <a:buChar char="•"/>
+            </a:pPr>
+            <a:r>
+              <a:rPr lang="en-US" dirty="0"/>
+              <a:t>Sampling rate: 4000Hz. That’s the main difference with </a:t>
+            </a:r>
+            <a:r>
+              <a:rPr lang="en-US" dirty="0" err="1"/>
+              <a:t>OpenBCI</a:t>
+            </a:r>
+            <a:r>
+              <a:rPr lang="en-US" dirty="0"/>
+              <a:t>.</a:t>
+            </a:r>
+          </a:p>
+          <a:p>
+            <a:pPr marL="1200150" lvl="2" indent="-285750" fontAlgn="base">
+              <a:buFont typeface="Arial" panose="020B0604020202020204" pitchFamily="34" charset="0"/>
+              <a:buChar char="•"/>
+            </a:pPr>
+            <a:r>
+              <a:rPr lang="en-US" dirty="0"/>
+              <a:t>Many studies use this sampling rate, or lower, around 2500 Hz.</a:t>
+            </a:r>
+          </a:p>
+          <a:p>
+            <a:pPr marL="742950" lvl="1" indent="-285750" fontAlgn="base">
+              <a:buFont typeface="Arial" panose="020B0604020202020204" pitchFamily="34" charset="0"/>
+              <a:buChar char="•"/>
+            </a:pPr>
+            <a:r>
+              <a:rPr lang="en-US" dirty="0"/>
+              <a:t>User test</a:t>
+            </a:r>
+          </a:p>
+          <a:p>
+            <a:pPr marL="742950" lvl="1" indent="-285750" fontAlgn="base">
+              <a:buFont typeface="Arial" panose="020B0604020202020204" pitchFamily="34" charset="0"/>
+              <a:buChar char="•"/>
+            </a:pPr>
+            <a:r>
+              <a:rPr lang="en-US" b="1" dirty="0"/>
+              <a:t>Can I take some electrodes? Mine arrive next week. </a:t>
+            </a:r>
+          </a:p>
+          <a:p>
+            <a:pPr marL="742950" lvl="1" indent="-285750" fontAlgn="base">
+              <a:buFont typeface="Arial" panose="020B0604020202020204" pitchFamily="34" charset="0"/>
+              <a:buChar char="•"/>
+            </a:pPr>
+            <a:endParaRPr lang="en-US" b="1" dirty="0"/>
+          </a:p>
+          <a:p>
+            <a:pPr marL="285750" indent="-285750" fontAlgn="base">
+              <a:buFont typeface="Arial" panose="020B0604020202020204" pitchFamily="34" charset="0"/>
+              <a:buChar char="•"/>
+            </a:pPr>
+            <a:r>
+              <a:rPr lang="en-US" dirty="0"/>
+              <a:t>How should </a:t>
+            </a:r>
+            <a:r>
+              <a:rPr lang="en-US" dirty="0" err="1"/>
+              <a:t>i</a:t>
+            </a:r>
+            <a:r>
+              <a:rPr lang="en-US" dirty="0"/>
+              <a:t> setup the UX environment? Talk about possible classes and inputs.</a:t>
+            </a:r>
+          </a:p>
+          <a:p>
+            <a:pPr marL="285750" indent="-285750" fontAlgn="base">
+              <a:buFont typeface="Arial" panose="020B0604020202020204" pitchFamily="34" charset="0"/>
+              <a:buChar char="•"/>
+            </a:pPr>
+            <a:endParaRPr lang="en-US" dirty="0"/>
+          </a:p>
+          <a:p>
+            <a:pPr fontAlgn="base"/>
+            <a:endParaRPr lang="en-US" dirty="0"/>
+          </a:p>
+          <a:p>
+            <a:pPr marL="285750" indent="-285750" fontAlgn="base">
+              <a:buFont typeface="Arial" panose="020B0604020202020204" pitchFamily="34" charset="0"/>
+              <a:buChar char="•"/>
+            </a:pPr>
+            <a:r>
+              <a:rPr lang="en-US" dirty="0"/>
+              <a:t>Try swings left to right. </a:t>
+            </a:r>
+          </a:p>
+          <a:p>
+            <a:pPr marL="285750" indent="-285750" fontAlgn="base">
+              <a:buFont typeface="Arial" panose="020B0604020202020204" pitchFamily="34" charset="0"/>
+              <a:buChar char="•"/>
+            </a:pPr>
+            <a:r>
+              <a:rPr lang="en-US" dirty="0"/>
+              <a:t>If we briefly pass </a:t>
+            </a:r>
+            <a:r>
+              <a:rPr lang="en-US" dirty="0" err="1"/>
+              <a:t>trhoug</a:t>
+            </a:r>
+            <a:r>
+              <a:rPr lang="en-US" dirty="0"/>
+              <a:t> the </a:t>
+            </a:r>
+            <a:r>
+              <a:rPr lang="en-US" dirty="0" err="1"/>
+              <a:t>classs</a:t>
+            </a:r>
+            <a:r>
+              <a:rPr lang="en-US" dirty="0"/>
+              <a:t> it is a class. </a:t>
+            </a:r>
+          </a:p>
+          <a:p>
+            <a:pPr marL="285750" indent="-285750" fontAlgn="base">
+              <a:buFont typeface="Arial" panose="020B0604020202020204" pitchFamily="34" charset="0"/>
+              <a:buChar char="•"/>
+            </a:pPr>
+            <a:endParaRPr lang="en-US" dirty="0"/>
+          </a:p>
+          <a:p>
+            <a:pPr fontAlgn="base"/>
+            <a:endParaRPr lang="en-US" dirty="0"/>
+          </a:p>
+          <a:p>
+            <a:pPr fontAlgn="base"/>
+            <a:r>
+              <a:rPr lang="en-US" dirty="0"/>
+              <a:t>FOCUS ON TESTING ON NEW USERS!</a:t>
+            </a:r>
+          </a:p>
+          <a:p>
+            <a:pPr fontAlgn="base"/>
+            <a:endParaRPr lang="en-US" dirty="0"/>
+          </a:p>
+          <a:p>
+            <a:pPr fontAlgn="base"/>
+            <a:endParaRPr lang="en-US"/>
+          </a:p>
+        </p:txBody>
+      </p:sp>
+    </p:spTree>
+    <p:extLst>
+      <p:ext uri="{BB962C8B-B14F-4D97-AF65-F5344CB8AC3E}">
+        <p14:creationId xmlns:p14="http://schemas.microsoft.com/office/powerpoint/2010/main" val="1117721018"/>
       </p:ext>
     </p:extLst>
   </p:cSld>

</xml_diff>

<commit_message>
recorded with a new user
</commit_message>
<xml_diff>
--- a/docs/pipeline.pptx
+++ b/docs/pipeline.pptx
@@ -13,6 +13,7 @@
     <p:sldId id="262" r:id="rId7"/>
     <p:sldId id="258" r:id="rId8"/>
     <p:sldId id="263" r:id="rId9"/>
+    <p:sldId id="264" r:id="rId10"/>
   </p:sldIdLst>
   <p:sldSz cx="12192000" cy="6858000"/>
   <p:notesSz cx="6858000" cy="9144000"/>
@@ -492,7 +493,7 @@
           <a:p>
             <a:fld id="{BE15E71B-42F9-4A17-848E-B7CB04EE6CEA}" type="datetimeFigureOut">
               <a:rPr lang="en-GB" smtClean="0"/>
-              <a:t>18/06/2025</a:t>
+              <a:t>20/06/2025</a:t>
             </a:fld>
             <a:endParaRPr lang="en-GB"/>
           </a:p>
@@ -692,7 +693,7 @@
           <a:p>
             <a:fld id="{BE15E71B-42F9-4A17-848E-B7CB04EE6CEA}" type="datetimeFigureOut">
               <a:rPr lang="en-GB" smtClean="0"/>
-              <a:t>18/06/2025</a:t>
+              <a:t>20/06/2025</a:t>
             </a:fld>
             <a:endParaRPr lang="en-GB"/>
           </a:p>
@@ -902,7 +903,7 @@
           <a:p>
             <a:fld id="{BE15E71B-42F9-4A17-848E-B7CB04EE6CEA}" type="datetimeFigureOut">
               <a:rPr lang="en-GB" smtClean="0"/>
-              <a:t>18/06/2025</a:t>
+              <a:t>20/06/2025</a:t>
             </a:fld>
             <a:endParaRPr lang="en-GB"/>
           </a:p>
@@ -1102,7 +1103,7 @@
           <a:p>
             <a:fld id="{BE15E71B-42F9-4A17-848E-B7CB04EE6CEA}" type="datetimeFigureOut">
               <a:rPr lang="en-GB" smtClean="0"/>
-              <a:t>18/06/2025</a:t>
+              <a:t>20/06/2025</a:t>
             </a:fld>
             <a:endParaRPr lang="en-GB"/>
           </a:p>
@@ -1378,7 +1379,7 @@
           <a:p>
             <a:fld id="{BE15E71B-42F9-4A17-848E-B7CB04EE6CEA}" type="datetimeFigureOut">
               <a:rPr lang="en-GB" smtClean="0"/>
-              <a:t>18/06/2025</a:t>
+              <a:t>20/06/2025</a:t>
             </a:fld>
             <a:endParaRPr lang="en-GB"/>
           </a:p>
@@ -1646,7 +1647,7 @@
           <a:p>
             <a:fld id="{BE15E71B-42F9-4A17-848E-B7CB04EE6CEA}" type="datetimeFigureOut">
               <a:rPr lang="en-GB" smtClean="0"/>
-              <a:t>18/06/2025</a:t>
+              <a:t>20/06/2025</a:t>
             </a:fld>
             <a:endParaRPr lang="en-GB"/>
           </a:p>
@@ -2061,7 +2062,7 @@
           <a:p>
             <a:fld id="{BE15E71B-42F9-4A17-848E-B7CB04EE6CEA}" type="datetimeFigureOut">
               <a:rPr lang="en-GB" smtClean="0"/>
-              <a:t>18/06/2025</a:t>
+              <a:t>20/06/2025</a:t>
             </a:fld>
             <a:endParaRPr lang="en-GB"/>
           </a:p>
@@ -2203,7 +2204,7 @@
           <a:p>
             <a:fld id="{BE15E71B-42F9-4A17-848E-B7CB04EE6CEA}" type="datetimeFigureOut">
               <a:rPr lang="en-GB" smtClean="0"/>
-              <a:t>18/06/2025</a:t>
+              <a:t>20/06/2025</a:t>
             </a:fld>
             <a:endParaRPr lang="en-GB"/>
           </a:p>
@@ -2316,7 +2317,7 @@
           <a:p>
             <a:fld id="{BE15E71B-42F9-4A17-848E-B7CB04EE6CEA}" type="datetimeFigureOut">
               <a:rPr lang="en-GB" smtClean="0"/>
-              <a:t>18/06/2025</a:t>
+              <a:t>20/06/2025</a:t>
             </a:fld>
             <a:endParaRPr lang="en-GB"/>
           </a:p>
@@ -2629,7 +2630,7 @@
           <a:p>
             <a:fld id="{BE15E71B-42F9-4A17-848E-B7CB04EE6CEA}" type="datetimeFigureOut">
               <a:rPr lang="en-GB" smtClean="0"/>
-              <a:t>18/06/2025</a:t>
+              <a:t>20/06/2025</a:t>
             </a:fld>
             <a:endParaRPr lang="en-GB"/>
           </a:p>
@@ -2918,7 +2919,7 @@
           <a:p>
             <a:fld id="{BE15E71B-42F9-4A17-848E-B7CB04EE6CEA}" type="datetimeFigureOut">
               <a:rPr lang="en-GB" smtClean="0"/>
-              <a:t>18/06/2025</a:t>
+              <a:t>20/06/2025</a:t>
             </a:fld>
             <a:endParaRPr lang="en-GB"/>
           </a:p>
@@ -3161,7 +3162,7 @@
           <a:p>
             <a:fld id="{BE15E71B-42F9-4A17-848E-B7CB04EE6CEA}" type="datetimeFigureOut">
               <a:rPr lang="en-GB" smtClean="0"/>
-              <a:t>18/06/2025</a:t>
+              <a:t>20/06/2025</a:t>
             </a:fld>
             <a:endParaRPr lang="en-GB"/>
           </a:p>
@@ -8439,8 +8440,8 @@
           </a:p>
         </p:txBody>
       </p:sp>
-      <mc:AlternateContent xmlns:mc="http://schemas.openxmlformats.org/markup-compatibility/2006">
-        <mc:Choice xmlns:p14="http://schemas.microsoft.com/office/powerpoint/2010/main" Requires="p14">
+      <mc:AlternateContent xmlns:mc="http://schemas.openxmlformats.org/markup-compatibility/2006" xmlns:p14="http://schemas.microsoft.com/office/powerpoint/2010/main">
+        <mc:Choice Requires="p14">
           <p:contentPart p14:bwMode="auto" r:id="rId6">
             <p14:nvContentPartPr>
               <p14:cNvPr id="17" name="Ink 16">
@@ -8459,7 +8460,7 @@
             </p14:xfrm>
           </p:contentPart>
         </mc:Choice>
-        <mc:Fallback>
+        <mc:Fallback xmlns="">
           <p:pic>
             <p:nvPicPr>
               <p:cNvPr id="17" name="Ink 16">
@@ -8490,8 +8491,8 @@
           </p:pic>
         </mc:Fallback>
       </mc:AlternateContent>
-      <mc:AlternateContent xmlns:mc="http://schemas.openxmlformats.org/markup-compatibility/2006">
-        <mc:Choice xmlns:p14="http://schemas.microsoft.com/office/powerpoint/2010/main" Requires="p14">
+      <mc:AlternateContent xmlns:mc="http://schemas.openxmlformats.org/markup-compatibility/2006" xmlns:p14="http://schemas.microsoft.com/office/powerpoint/2010/main">
+        <mc:Choice Requires="p14">
           <p:contentPart p14:bwMode="auto" r:id="rId8">
             <p14:nvContentPartPr>
               <p14:cNvPr id="18" name="Ink 17">
@@ -8510,7 +8511,7 @@
             </p14:xfrm>
           </p:contentPart>
         </mc:Choice>
-        <mc:Fallback>
+        <mc:Fallback xmlns="">
           <p:pic>
             <p:nvPicPr>
               <p:cNvPr id="18" name="Ink 17">
@@ -8541,8 +8542,8 @@
           </p:pic>
         </mc:Fallback>
       </mc:AlternateContent>
-      <mc:AlternateContent xmlns:mc="http://schemas.openxmlformats.org/markup-compatibility/2006">
-        <mc:Choice xmlns:p14="http://schemas.microsoft.com/office/powerpoint/2010/main" Requires="p14">
+      <mc:AlternateContent xmlns:mc="http://schemas.openxmlformats.org/markup-compatibility/2006" xmlns:p14="http://schemas.microsoft.com/office/powerpoint/2010/main">
+        <mc:Choice Requires="p14">
           <p:contentPart p14:bwMode="auto" r:id="rId10">
             <p14:nvContentPartPr>
               <p14:cNvPr id="19" name="Ink 18">
@@ -8561,7 +8562,7 @@
             </p14:xfrm>
           </p:contentPart>
         </mc:Choice>
-        <mc:Fallback>
+        <mc:Fallback xmlns="">
           <p:pic>
             <p:nvPicPr>
               <p:cNvPr id="19" name="Ink 18">
@@ -8592,8 +8593,8 @@
           </p:pic>
         </mc:Fallback>
       </mc:AlternateContent>
-      <mc:AlternateContent xmlns:mc="http://schemas.openxmlformats.org/markup-compatibility/2006">
-        <mc:Choice xmlns:p14="http://schemas.microsoft.com/office/powerpoint/2010/main" Requires="p14">
+      <mc:AlternateContent xmlns:mc="http://schemas.openxmlformats.org/markup-compatibility/2006" xmlns:p14="http://schemas.microsoft.com/office/powerpoint/2010/main">
+        <mc:Choice Requires="p14">
           <p:contentPart p14:bwMode="auto" r:id="rId12">
             <p14:nvContentPartPr>
               <p14:cNvPr id="20" name="Ink 19">
@@ -8612,7 +8613,7 @@
             </p14:xfrm>
           </p:contentPart>
         </mc:Choice>
-        <mc:Fallback>
+        <mc:Fallback xmlns="">
           <p:pic>
             <p:nvPicPr>
               <p:cNvPr id="20" name="Ink 19">
@@ -8643,8 +8644,8 @@
           </p:pic>
         </mc:Fallback>
       </mc:AlternateContent>
-      <mc:AlternateContent xmlns:mc="http://schemas.openxmlformats.org/markup-compatibility/2006">
-        <mc:Choice xmlns:p14="http://schemas.microsoft.com/office/powerpoint/2010/main" Requires="p14">
+      <mc:AlternateContent xmlns:mc="http://schemas.openxmlformats.org/markup-compatibility/2006" xmlns:p14="http://schemas.microsoft.com/office/powerpoint/2010/main">
+        <mc:Choice Requires="p14">
           <p:contentPart p14:bwMode="auto" r:id="rId14">
             <p14:nvContentPartPr>
               <p14:cNvPr id="21" name="Ink 20">
@@ -8663,7 +8664,7 @@
             </p14:xfrm>
           </p:contentPart>
         </mc:Choice>
-        <mc:Fallback>
+        <mc:Fallback xmlns="">
           <p:pic>
             <p:nvPicPr>
               <p:cNvPr id="21" name="Ink 20">
@@ -8694,8 +8695,8 @@
           </p:pic>
         </mc:Fallback>
       </mc:AlternateContent>
-      <mc:AlternateContent xmlns:mc="http://schemas.openxmlformats.org/markup-compatibility/2006">
-        <mc:Choice xmlns:p14="http://schemas.microsoft.com/office/powerpoint/2010/main" Requires="p14">
+      <mc:AlternateContent xmlns:mc="http://schemas.openxmlformats.org/markup-compatibility/2006" xmlns:p14="http://schemas.microsoft.com/office/powerpoint/2010/main">
+        <mc:Choice Requires="p14">
           <p:contentPart p14:bwMode="auto" r:id="rId16">
             <p14:nvContentPartPr>
               <p14:cNvPr id="23" name="Ink 22">
@@ -8714,7 +8715,7 @@
             </p14:xfrm>
           </p:contentPart>
         </mc:Choice>
-        <mc:Fallback>
+        <mc:Fallback xmlns="">
           <p:pic>
             <p:nvPicPr>
               <p:cNvPr id="23" name="Ink 22">
@@ -8745,8 +8746,8 @@
           </p:pic>
         </mc:Fallback>
       </mc:AlternateContent>
-      <mc:AlternateContent xmlns:mc="http://schemas.openxmlformats.org/markup-compatibility/2006">
-        <mc:Choice xmlns:p14="http://schemas.microsoft.com/office/powerpoint/2010/main" Requires="p14">
+      <mc:AlternateContent xmlns:mc="http://schemas.openxmlformats.org/markup-compatibility/2006" xmlns:p14="http://schemas.microsoft.com/office/powerpoint/2010/main">
+        <mc:Choice Requires="p14">
           <p:contentPart p14:bwMode="auto" r:id="rId18">
             <p14:nvContentPartPr>
               <p14:cNvPr id="26" name="Ink 25">
@@ -8765,7 +8766,7 @@
             </p14:xfrm>
           </p:contentPart>
         </mc:Choice>
-        <mc:Fallback>
+        <mc:Fallback xmlns="">
           <p:pic>
             <p:nvPicPr>
               <p:cNvPr id="26" name="Ink 25">
@@ -8796,8 +8797,8 @@
           </p:pic>
         </mc:Fallback>
       </mc:AlternateContent>
-      <mc:AlternateContent xmlns:mc="http://schemas.openxmlformats.org/markup-compatibility/2006">
-        <mc:Choice xmlns:p14="http://schemas.microsoft.com/office/powerpoint/2010/main" Requires="p14">
+      <mc:AlternateContent xmlns:mc="http://schemas.openxmlformats.org/markup-compatibility/2006" xmlns:p14="http://schemas.microsoft.com/office/powerpoint/2010/main">
+        <mc:Choice Requires="p14">
           <p:contentPart p14:bwMode="auto" r:id="rId20">
             <p14:nvContentPartPr>
               <p14:cNvPr id="27" name="Ink 26">
@@ -8816,7 +8817,7 @@
             </p14:xfrm>
           </p:contentPart>
         </mc:Choice>
-        <mc:Fallback>
+        <mc:Fallback xmlns="">
           <p:pic>
             <p:nvPicPr>
               <p:cNvPr id="27" name="Ink 26">
@@ -9204,6 +9205,643 @@
     <p:extLst>
       <p:ext uri="{BB962C8B-B14F-4D97-AF65-F5344CB8AC3E}">
         <p14:creationId xmlns:p14="http://schemas.microsoft.com/office/powerpoint/2010/main" val="1117721018"/>
+      </p:ext>
+    </p:extLst>
+  </p:cSld>
+  <p:clrMapOvr>
+    <a:masterClrMapping/>
+  </p:clrMapOvr>
+</p:sld>
+</file>
+
+<file path=ppt/slides/slide9.xml><?xml version="1.0" encoding="utf-8"?>
+<p:sld xmlns:a="http://schemas.openxmlformats.org/drawingml/2006/main" xmlns:r="http://schemas.openxmlformats.org/officeDocument/2006/relationships" xmlns:p="http://schemas.openxmlformats.org/presentationml/2006/main">
+  <p:cSld>
+    <p:spTree>
+      <p:nvGrpSpPr>
+        <p:cNvPr id="1" name="">
+          <a:extLst>
+            <a:ext uri="{FF2B5EF4-FFF2-40B4-BE49-F238E27FC236}">
+              <a16:creationId xmlns:a16="http://schemas.microsoft.com/office/drawing/2014/main" id="{7E173008-39A2-FB37-B535-C619E4177B95}"/>
+            </a:ext>
+          </a:extLst>
+        </p:cNvPr>
+        <p:cNvGrpSpPr/>
+        <p:nvPr/>
+      </p:nvGrpSpPr>
+      <p:grpSpPr>
+        <a:xfrm>
+          <a:off x="0" y="0"/>
+          <a:ext cx="0" cy="0"/>
+          <a:chOff x="0" y="0"/>
+          <a:chExt cx="0" cy="0"/>
+        </a:xfrm>
+      </p:grpSpPr>
+      <p:pic>
+        <p:nvPicPr>
+          <p:cNvPr id="6" name="Picture 5" descr="A diagram of the neck muscles&#10;&#10;AI-generated content may be incorrect.">
+            <a:extLst>
+              <a:ext uri="{FF2B5EF4-FFF2-40B4-BE49-F238E27FC236}">
+                <a16:creationId xmlns:a16="http://schemas.microsoft.com/office/drawing/2014/main" id="{429D084B-02CD-6290-2640-322ACBA1C4F4}"/>
+              </a:ext>
+            </a:extLst>
+          </p:cNvPr>
+          <p:cNvPicPr>
+            <a:picLocks noChangeAspect="1"/>
+          </p:cNvPicPr>
+          <p:nvPr/>
+        </p:nvPicPr>
+        <p:blipFill>
+          <a:blip r:embed="rId2">
+            <a:extLst>
+              <a:ext uri="{28A0092B-C50C-407E-A947-70E740481C1C}">
+                <a14:useLocalDpi xmlns:a14="http://schemas.microsoft.com/office/drawing/2010/main" val="0"/>
+              </a:ext>
+            </a:extLst>
+          </a:blip>
+          <a:stretch>
+            <a:fillRect/>
+          </a:stretch>
+        </p:blipFill>
+        <p:spPr>
+          <a:xfrm>
+            <a:off x="1914525" y="400050"/>
+            <a:ext cx="8362950" cy="6057900"/>
+          </a:xfrm>
+          <a:prstGeom prst="rect">
+            <a:avLst/>
+          </a:prstGeom>
+        </p:spPr>
+      </p:pic>
+      <p:sp>
+        <p:nvSpPr>
+          <p:cNvPr id="7" name="Oval 6">
+            <a:extLst>
+              <a:ext uri="{FF2B5EF4-FFF2-40B4-BE49-F238E27FC236}">
+                <a16:creationId xmlns:a16="http://schemas.microsoft.com/office/drawing/2014/main" id="{81EA4F1B-3751-5C09-9362-C0058BB3A766}"/>
+              </a:ext>
+            </a:extLst>
+          </p:cNvPr>
+          <p:cNvSpPr/>
+          <p:nvPr/>
+        </p:nvSpPr>
+        <p:spPr>
+          <a:xfrm>
+            <a:off x="5667474" y="1112067"/>
+            <a:ext cx="217284" cy="226337"/>
+          </a:xfrm>
+          <a:prstGeom prst="ellipse">
+            <a:avLst/>
+          </a:prstGeom>
+          <a:solidFill>
+            <a:srgbClr val="FF0000"/>
+          </a:solidFill>
+        </p:spPr>
+        <p:style>
+          <a:lnRef idx="2">
+            <a:schemeClr val="accent1">
+              <a:shade val="15000"/>
+            </a:schemeClr>
+          </a:lnRef>
+          <a:fillRef idx="1">
+            <a:schemeClr val="accent1"/>
+          </a:fillRef>
+          <a:effectRef idx="0">
+            <a:schemeClr val="accent1"/>
+          </a:effectRef>
+          <a:fontRef idx="minor">
+            <a:schemeClr val="lt1"/>
+          </a:fontRef>
+        </p:style>
+        <p:txBody>
+          <a:bodyPr rtlCol="0" anchor="ctr"/>
+          <a:lstStyle/>
+          <a:p>
+            <a:pPr algn="ctr"/>
+            <a:endParaRPr lang="en-GB"/>
+          </a:p>
+        </p:txBody>
+      </p:sp>
+      <p:sp>
+        <p:nvSpPr>
+          <p:cNvPr id="8" name="Oval 7">
+            <a:extLst>
+              <a:ext uri="{FF2B5EF4-FFF2-40B4-BE49-F238E27FC236}">
+                <a16:creationId xmlns:a16="http://schemas.microsoft.com/office/drawing/2014/main" id="{55261E96-8955-3E87-0F2D-F4B08CB2418E}"/>
+              </a:ext>
+            </a:extLst>
+          </p:cNvPr>
+          <p:cNvSpPr/>
+          <p:nvPr/>
+        </p:nvSpPr>
+        <p:spPr>
+          <a:xfrm>
+            <a:off x="5614058" y="1510420"/>
+            <a:ext cx="217284" cy="226337"/>
+          </a:xfrm>
+          <a:prstGeom prst="ellipse">
+            <a:avLst/>
+          </a:prstGeom>
+          <a:solidFill>
+            <a:srgbClr val="FF0000"/>
+          </a:solidFill>
+        </p:spPr>
+        <p:style>
+          <a:lnRef idx="2">
+            <a:schemeClr val="accent1">
+              <a:shade val="15000"/>
+            </a:schemeClr>
+          </a:lnRef>
+          <a:fillRef idx="1">
+            <a:schemeClr val="accent1"/>
+          </a:fillRef>
+          <a:effectRef idx="0">
+            <a:schemeClr val="accent1"/>
+          </a:effectRef>
+          <a:fontRef idx="minor">
+            <a:schemeClr val="lt1"/>
+          </a:fontRef>
+        </p:style>
+        <p:txBody>
+          <a:bodyPr rtlCol="0" anchor="ctr"/>
+          <a:lstStyle/>
+          <a:p>
+            <a:pPr algn="ctr"/>
+            <a:endParaRPr lang="en-GB"/>
+          </a:p>
+        </p:txBody>
+      </p:sp>
+      <p:sp>
+        <p:nvSpPr>
+          <p:cNvPr id="10" name="Rectangle 9">
+            <a:extLst>
+              <a:ext uri="{FF2B5EF4-FFF2-40B4-BE49-F238E27FC236}">
+                <a16:creationId xmlns:a16="http://schemas.microsoft.com/office/drawing/2014/main" id="{81E1534C-4730-3018-0142-4E17DD601B36}"/>
+              </a:ext>
+            </a:extLst>
+          </p:cNvPr>
+          <p:cNvSpPr/>
+          <p:nvPr/>
+        </p:nvSpPr>
+        <p:spPr>
+          <a:xfrm>
+            <a:off x="7451003" y="2199992"/>
+            <a:ext cx="2362954" cy="1557196"/>
+          </a:xfrm>
+          <a:prstGeom prst="rect">
+            <a:avLst/>
+          </a:prstGeom>
+          <a:solidFill>
+            <a:schemeClr val="bg1"/>
+          </a:solidFill>
+          <a:ln>
+            <a:solidFill>
+              <a:schemeClr val="bg1"/>
+            </a:solidFill>
+          </a:ln>
+        </p:spPr>
+        <p:style>
+          <a:lnRef idx="2">
+            <a:schemeClr val="accent1">
+              <a:shade val="15000"/>
+            </a:schemeClr>
+          </a:lnRef>
+          <a:fillRef idx="1">
+            <a:schemeClr val="accent1"/>
+          </a:fillRef>
+          <a:effectRef idx="0">
+            <a:schemeClr val="accent1"/>
+          </a:effectRef>
+          <a:fontRef idx="minor">
+            <a:schemeClr val="lt1"/>
+          </a:fontRef>
+        </p:style>
+        <p:txBody>
+          <a:bodyPr rtlCol="0" anchor="ctr"/>
+          <a:lstStyle/>
+          <a:p>
+            <a:pPr algn="ctr"/>
+            <a:endParaRPr lang="en-GB"/>
+          </a:p>
+        </p:txBody>
+      </p:sp>
+      <p:sp>
+        <p:nvSpPr>
+          <p:cNvPr id="11" name="Rectangle 10">
+            <a:extLst>
+              <a:ext uri="{FF2B5EF4-FFF2-40B4-BE49-F238E27FC236}">
+                <a16:creationId xmlns:a16="http://schemas.microsoft.com/office/drawing/2014/main" id="{65B47177-7BF1-752C-1298-8A321AF8E379}"/>
+              </a:ext>
+            </a:extLst>
+          </p:cNvPr>
+          <p:cNvSpPr/>
+          <p:nvPr/>
+        </p:nvSpPr>
+        <p:spPr>
+          <a:xfrm>
+            <a:off x="7682762" y="1421394"/>
+            <a:ext cx="2362954" cy="1557196"/>
+          </a:xfrm>
+          <a:prstGeom prst="rect">
+            <a:avLst/>
+          </a:prstGeom>
+          <a:solidFill>
+            <a:schemeClr val="bg1"/>
+          </a:solidFill>
+          <a:ln>
+            <a:solidFill>
+              <a:schemeClr val="bg1"/>
+            </a:solidFill>
+          </a:ln>
+        </p:spPr>
+        <p:style>
+          <a:lnRef idx="2">
+            <a:schemeClr val="accent1">
+              <a:shade val="15000"/>
+            </a:schemeClr>
+          </a:lnRef>
+          <a:fillRef idx="1">
+            <a:schemeClr val="accent1"/>
+          </a:fillRef>
+          <a:effectRef idx="0">
+            <a:schemeClr val="accent1"/>
+          </a:effectRef>
+          <a:fontRef idx="minor">
+            <a:schemeClr val="lt1"/>
+          </a:fontRef>
+        </p:style>
+        <p:txBody>
+          <a:bodyPr rtlCol="0" anchor="ctr"/>
+          <a:lstStyle/>
+          <a:p>
+            <a:pPr algn="ctr"/>
+            <a:endParaRPr lang="en-GB"/>
+          </a:p>
+        </p:txBody>
+      </p:sp>
+      <p:sp>
+        <p:nvSpPr>
+          <p:cNvPr id="12" name="Rectangle 11">
+            <a:extLst>
+              <a:ext uri="{FF2B5EF4-FFF2-40B4-BE49-F238E27FC236}">
+                <a16:creationId xmlns:a16="http://schemas.microsoft.com/office/drawing/2014/main" id="{B5DEBA71-9329-8D33-BCFB-0562C2F04DB5}"/>
+              </a:ext>
+            </a:extLst>
+          </p:cNvPr>
+          <p:cNvSpPr/>
+          <p:nvPr/>
+        </p:nvSpPr>
+        <p:spPr>
+          <a:xfrm>
+            <a:off x="2501471" y="-181067"/>
+            <a:ext cx="2362954" cy="1557196"/>
+          </a:xfrm>
+          <a:prstGeom prst="rect">
+            <a:avLst/>
+          </a:prstGeom>
+          <a:solidFill>
+            <a:schemeClr val="bg1"/>
+          </a:solidFill>
+          <a:ln>
+            <a:solidFill>
+              <a:schemeClr val="bg1"/>
+            </a:solidFill>
+          </a:ln>
+        </p:spPr>
+        <p:style>
+          <a:lnRef idx="2">
+            <a:schemeClr val="accent1">
+              <a:shade val="15000"/>
+            </a:schemeClr>
+          </a:lnRef>
+          <a:fillRef idx="1">
+            <a:schemeClr val="accent1"/>
+          </a:fillRef>
+          <a:effectRef idx="0">
+            <a:schemeClr val="accent1"/>
+          </a:effectRef>
+          <a:fontRef idx="minor">
+            <a:schemeClr val="lt1"/>
+          </a:fontRef>
+        </p:style>
+        <p:txBody>
+          <a:bodyPr rtlCol="0" anchor="ctr"/>
+          <a:lstStyle/>
+          <a:p>
+            <a:pPr algn="ctr"/>
+            <a:endParaRPr lang="en-GB"/>
+          </a:p>
+        </p:txBody>
+      </p:sp>
+      <p:sp>
+        <p:nvSpPr>
+          <p:cNvPr id="13" name="Oval 12">
+            <a:extLst>
+              <a:ext uri="{FF2B5EF4-FFF2-40B4-BE49-F238E27FC236}">
+                <a16:creationId xmlns:a16="http://schemas.microsoft.com/office/drawing/2014/main" id="{2728762F-D940-02CA-E6E8-34E0F7B0E571}"/>
+              </a:ext>
+            </a:extLst>
+          </p:cNvPr>
+          <p:cNvSpPr/>
+          <p:nvPr/>
+        </p:nvSpPr>
+        <p:spPr>
+          <a:xfrm>
+            <a:off x="5263698" y="1207132"/>
+            <a:ext cx="217284" cy="226337"/>
+          </a:xfrm>
+          <a:prstGeom prst="ellipse">
+            <a:avLst/>
+          </a:prstGeom>
+          <a:solidFill>
+            <a:schemeClr val="bg2">
+              <a:lumMod val="75000"/>
+            </a:schemeClr>
+          </a:solidFill>
+        </p:spPr>
+        <p:style>
+          <a:lnRef idx="2">
+            <a:schemeClr val="accent1">
+              <a:shade val="15000"/>
+            </a:schemeClr>
+          </a:lnRef>
+          <a:fillRef idx="1">
+            <a:schemeClr val="accent1"/>
+          </a:fillRef>
+          <a:effectRef idx="0">
+            <a:schemeClr val="accent1"/>
+          </a:effectRef>
+          <a:fontRef idx="minor">
+            <a:schemeClr val="lt1"/>
+          </a:fontRef>
+        </p:style>
+        <p:txBody>
+          <a:bodyPr rtlCol="0" anchor="ctr"/>
+          <a:lstStyle/>
+          <a:p>
+            <a:pPr algn="ctr"/>
+            <a:endParaRPr lang="en-GB"/>
+          </a:p>
+        </p:txBody>
+      </p:sp>
+      <p:sp>
+        <p:nvSpPr>
+          <p:cNvPr id="15" name="Oval 14">
+            <a:extLst>
+              <a:ext uri="{FF2B5EF4-FFF2-40B4-BE49-F238E27FC236}">
+                <a16:creationId xmlns:a16="http://schemas.microsoft.com/office/drawing/2014/main" id="{3E29C88C-2F75-C3F8-D664-C7D3EBDCF9E8}"/>
+              </a:ext>
+            </a:extLst>
+          </p:cNvPr>
+          <p:cNvSpPr/>
+          <p:nvPr/>
+        </p:nvSpPr>
+        <p:spPr>
+          <a:xfrm>
+            <a:off x="5014047" y="1487787"/>
+            <a:ext cx="217284" cy="226337"/>
+          </a:xfrm>
+          <a:prstGeom prst="ellipse">
+            <a:avLst/>
+          </a:prstGeom>
+          <a:solidFill>
+            <a:schemeClr val="bg2">
+              <a:lumMod val="75000"/>
+            </a:schemeClr>
+          </a:solidFill>
+        </p:spPr>
+        <p:style>
+          <a:lnRef idx="2">
+            <a:schemeClr val="accent1">
+              <a:shade val="15000"/>
+            </a:schemeClr>
+          </a:lnRef>
+          <a:fillRef idx="1">
+            <a:schemeClr val="accent1"/>
+          </a:fillRef>
+          <a:effectRef idx="0">
+            <a:schemeClr val="accent1"/>
+          </a:effectRef>
+          <a:fontRef idx="minor">
+            <a:schemeClr val="lt1"/>
+          </a:fontRef>
+        </p:style>
+        <p:txBody>
+          <a:bodyPr rtlCol="0" anchor="ctr"/>
+          <a:lstStyle/>
+          <a:p>
+            <a:pPr algn="ctr"/>
+            <a:endParaRPr lang="en-GB"/>
+          </a:p>
+        </p:txBody>
+      </p:sp>
+      <p:sp>
+        <p:nvSpPr>
+          <p:cNvPr id="16" name="Oval 15">
+            <a:extLst>
+              <a:ext uri="{FF2B5EF4-FFF2-40B4-BE49-F238E27FC236}">
+                <a16:creationId xmlns:a16="http://schemas.microsoft.com/office/drawing/2014/main" id="{77206D02-0D84-2ED0-6B4C-EEFF747875EC}"/>
+              </a:ext>
+            </a:extLst>
+          </p:cNvPr>
+          <p:cNvSpPr/>
+          <p:nvPr/>
+        </p:nvSpPr>
+        <p:spPr>
+          <a:xfrm>
+            <a:off x="6364588" y="1276542"/>
+            <a:ext cx="217284" cy="226337"/>
+          </a:xfrm>
+          <a:prstGeom prst="ellipse">
+            <a:avLst/>
+          </a:prstGeom>
+          <a:solidFill>
+            <a:schemeClr val="accent1">
+              <a:lumMod val="60000"/>
+              <a:lumOff val="40000"/>
+            </a:schemeClr>
+          </a:solidFill>
+        </p:spPr>
+        <p:style>
+          <a:lnRef idx="2">
+            <a:schemeClr val="accent1">
+              <a:shade val="15000"/>
+            </a:schemeClr>
+          </a:lnRef>
+          <a:fillRef idx="1">
+            <a:schemeClr val="accent1"/>
+          </a:fillRef>
+          <a:effectRef idx="0">
+            <a:schemeClr val="accent1"/>
+          </a:effectRef>
+          <a:fontRef idx="minor">
+            <a:schemeClr val="lt1"/>
+          </a:fontRef>
+        </p:style>
+        <p:txBody>
+          <a:bodyPr rtlCol="0" anchor="ctr"/>
+          <a:lstStyle/>
+          <a:p>
+            <a:pPr algn="ctr"/>
+            <a:endParaRPr lang="en-GB"/>
+          </a:p>
+        </p:txBody>
+      </p:sp>
+      <p:sp>
+        <p:nvSpPr>
+          <p:cNvPr id="17" name="Oval 16">
+            <a:extLst>
+              <a:ext uri="{FF2B5EF4-FFF2-40B4-BE49-F238E27FC236}">
+                <a16:creationId xmlns:a16="http://schemas.microsoft.com/office/drawing/2014/main" id="{83DA7E35-CC36-8CCD-5991-8DCEA7A59C2C}"/>
+              </a:ext>
+            </a:extLst>
+          </p:cNvPr>
+          <p:cNvSpPr/>
+          <p:nvPr/>
+        </p:nvSpPr>
+        <p:spPr>
+          <a:xfrm>
+            <a:off x="6551081" y="1557202"/>
+            <a:ext cx="217284" cy="226337"/>
+          </a:xfrm>
+          <a:prstGeom prst="ellipse">
+            <a:avLst/>
+          </a:prstGeom>
+          <a:solidFill>
+            <a:schemeClr val="tx2">
+              <a:lumMod val="50000"/>
+              <a:lumOff val="50000"/>
+            </a:schemeClr>
+          </a:solidFill>
+        </p:spPr>
+        <p:style>
+          <a:lnRef idx="2">
+            <a:schemeClr val="accent1">
+              <a:shade val="15000"/>
+            </a:schemeClr>
+          </a:lnRef>
+          <a:fillRef idx="1">
+            <a:schemeClr val="accent1"/>
+          </a:fillRef>
+          <a:effectRef idx="0">
+            <a:schemeClr val="accent1"/>
+          </a:effectRef>
+          <a:fontRef idx="minor">
+            <a:schemeClr val="lt1"/>
+          </a:fontRef>
+        </p:style>
+        <p:txBody>
+          <a:bodyPr rtlCol="0" anchor="ctr"/>
+          <a:lstStyle/>
+          <a:p>
+            <a:pPr algn="ctr"/>
+            <a:endParaRPr lang="en-GB"/>
+          </a:p>
+        </p:txBody>
+      </p:sp>
+      <p:sp>
+        <p:nvSpPr>
+          <p:cNvPr id="18" name="TextBox 17">
+            <a:extLst>
+              <a:ext uri="{FF2B5EF4-FFF2-40B4-BE49-F238E27FC236}">
+                <a16:creationId xmlns:a16="http://schemas.microsoft.com/office/drawing/2014/main" id="{9F5081CA-F9DD-8DD4-A4E5-7A19DF7DEA92}"/>
+              </a:ext>
+            </a:extLst>
+          </p:cNvPr>
+          <p:cNvSpPr txBox="1"/>
+          <p:nvPr/>
+        </p:nvSpPr>
+        <p:spPr>
+          <a:xfrm>
+            <a:off x="8062984" y="1602466"/>
+            <a:ext cx="2276050" cy="3139321"/>
+          </a:xfrm>
+          <a:prstGeom prst="rect">
+            <a:avLst/>
+          </a:prstGeom>
+          <a:noFill/>
+        </p:spPr>
+        <p:txBody>
+          <a:bodyPr wrap="square" rtlCol="0">
+            <a:spAutoFit/>
+          </a:bodyPr>
+          <a:lstStyle/>
+          <a:p>
+            <a:r>
+              <a:rPr lang="en-US" b="1" dirty="0">
+                <a:solidFill>
+                  <a:srgbClr val="FF0000"/>
+                </a:solidFill>
+              </a:rPr>
+              <a:t>Channel 1 (red): </a:t>
+            </a:r>
+            <a:r>
+              <a:rPr lang="en-US" dirty="0"/>
+              <a:t>Geniohyoid</a:t>
+            </a:r>
+          </a:p>
+          <a:p>
+            <a:endParaRPr lang="en-US" dirty="0"/>
+          </a:p>
+          <a:p>
+            <a:r>
+              <a:rPr lang="en-US" b="1" dirty="0">
+                <a:solidFill>
+                  <a:schemeClr val="bg2">
+                    <a:lumMod val="50000"/>
+                  </a:schemeClr>
+                </a:solidFill>
+              </a:rPr>
+              <a:t>Channel 2 (gray): </a:t>
+            </a:r>
+            <a:r>
+              <a:rPr lang="en-US" dirty="0"/>
+              <a:t>Right Mylohyoid</a:t>
+            </a:r>
+          </a:p>
+          <a:p>
+            <a:endParaRPr lang="en-US" dirty="0">
+              <a:solidFill>
+                <a:schemeClr val="accent4"/>
+              </a:solidFill>
+            </a:endParaRPr>
+          </a:p>
+          <a:p>
+            <a:r>
+              <a:rPr lang="en-US" b="1" dirty="0">
+                <a:solidFill>
+                  <a:schemeClr val="accent4"/>
+                </a:solidFill>
+              </a:rPr>
+              <a:t>Channel 3 (blue):</a:t>
+            </a:r>
+          </a:p>
+          <a:p>
+            <a:r>
+              <a:rPr lang="en-US" dirty="0"/>
+              <a:t>Left Mylohyoid</a:t>
+            </a:r>
+          </a:p>
+          <a:p>
+            <a:endParaRPr lang="en-US" dirty="0"/>
+          </a:p>
+          <a:p>
+            <a:r>
+              <a:rPr lang="en-US" dirty="0"/>
+              <a:t>Distance between electrodes: </a:t>
+            </a:r>
+            <a:r>
+              <a:rPr lang="en-US" b="1" dirty="0"/>
+              <a:t>3cm</a:t>
+            </a:r>
+            <a:endParaRPr lang="en-GB" b="1" dirty="0"/>
+          </a:p>
+        </p:txBody>
+      </p:sp>
+    </p:spTree>
+    <p:extLst>
+      <p:ext uri="{BB962C8B-B14F-4D97-AF65-F5344CB8AC3E}">
+        <p14:creationId xmlns:p14="http://schemas.microsoft.com/office/powerpoint/2010/main" val="842305808"/>
       </p:ext>
     </p:extLst>
   </p:cSld>

</xml_diff>